<commit_message>
update the readme file and rename the test case module name.
</commit_message>
<xml_diff>
--- a/BACnet_PLC_Simulator/doc/designDoc.pptx
+++ b/BACnet_PLC_Simulator/doc/designDoc.pptx
@@ -5,10 +5,12 @@
     <p:sldMasterId id="2147483648" r:id="rId1"/>
   </p:sldMasterIdLst>
   <p:notesMasterIdLst>
-    <p:notesMasterId r:id="rId3"/>
+    <p:notesMasterId r:id="rId5"/>
   </p:notesMasterIdLst>
   <p:sldIdLst>
     <p:sldId id="256" r:id="rId2"/>
+    <p:sldId id="257" r:id="rId3"/>
+    <p:sldId id="258" r:id="rId4"/>
   </p:sldIdLst>
   <p:sldSz cx="12192000" cy="6858000"/>
   <p:notesSz cx="6858000" cy="9144000"/>
@@ -107,6 +109,11 @@
       </a:defRPr>
     </a:lvl9pPr>
   </p:defaultTextStyle>
+  <p:extLst>
+    <p:ext uri="{EFAFB233-063F-42B5-8137-9DF3F51BA10A}">
+      <p15:sldGuideLst xmlns:p15="http://schemas.microsoft.com/office/powerpoint/2012/main"/>
+    </p:ext>
+  </p:extLst>
 </p:presentation>
 </file>
 
@@ -192,7 +199,7 @@
           <a:p>
             <a:fld id="{293D8FD3-42E6-4115-9E5E-A8FCCF6B73B5}" type="datetimeFigureOut">
               <a:rPr lang="en-SG" smtClean="0"/>
-              <a:t>9/1/2026</a:t>
+              <a:t>13/1/2026</a:t>
             </a:fld>
             <a:endParaRPr lang="en-SG"/>
           </a:p>
@@ -544,6 +551,90 @@
 </p:notes>
 </file>
 
+<file path=ppt/notesSlides/notesSlide2.xml><?xml version="1.0" encoding="utf-8"?>
+<p:notes xmlns:a="http://schemas.openxmlformats.org/drawingml/2006/main" xmlns:r="http://schemas.openxmlformats.org/officeDocument/2006/relationships" xmlns:p="http://schemas.openxmlformats.org/presentationml/2006/main">
+  <p:cSld>
+    <p:spTree>
+      <p:nvGrpSpPr>
+        <p:cNvPr id="1" name=""/>
+        <p:cNvGrpSpPr/>
+        <p:nvPr/>
+      </p:nvGrpSpPr>
+      <p:grpSpPr>
+        <a:xfrm>
+          <a:off x="0" y="0"/>
+          <a:ext cx="0" cy="0"/>
+          <a:chOff x="0" y="0"/>
+          <a:chExt cx="0" cy="0"/>
+        </a:xfrm>
+      </p:grpSpPr>
+      <p:sp>
+        <p:nvSpPr>
+          <p:cNvPr id="2" name="Slide Image Placeholder 1"/>
+          <p:cNvSpPr>
+            <a:spLocks noGrp="1" noRot="1" noChangeAspect="1"/>
+          </p:cNvSpPr>
+          <p:nvPr>
+            <p:ph type="sldImg"/>
+          </p:nvPr>
+        </p:nvSpPr>
+        <p:spPr/>
+      </p:sp>
+      <p:sp>
+        <p:nvSpPr>
+          <p:cNvPr id="3" name="Notes Placeholder 2"/>
+          <p:cNvSpPr>
+            <a:spLocks noGrp="1"/>
+          </p:cNvSpPr>
+          <p:nvPr>
+            <p:ph type="body" idx="1"/>
+          </p:nvPr>
+        </p:nvSpPr>
+        <p:spPr/>
+        <p:txBody>
+          <a:bodyPr/>
+          <a:lstStyle/>
+          <a:p>
+            <a:endParaRPr lang="en-SG"/>
+          </a:p>
+        </p:txBody>
+      </p:sp>
+      <p:sp>
+        <p:nvSpPr>
+          <p:cNvPr id="4" name="Slide Number Placeholder 3"/>
+          <p:cNvSpPr>
+            <a:spLocks noGrp="1"/>
+          </p:cNvSpPr>
+          <p:nvPr>
+            <p:ph type="sldNum" sz="quarter" idx="5"/>
+          </p:nvPr>
+        </p:nvSpPr>
+        <p:spPr/>
+        <p:txBody>
+          <a:bodyPr/>
+          <a:lstStyle/>
+          <a:p>
+            <a:fld id="{6E484150-ABA0-430E-8BFA-F7FBD0D35203}" type="slidenum">
+              <a:rPr lang="en-SG" smtClean="0"/>
+              <a:t>3</a:t>
+            </a:fld>
+            <a:endParaRPr lang="en-SG"/>
+          </a:p>
+        </p:txBody>
+      </p:sp>
+    </p:spTree>
+    <p:extLst>
+      <p:ext uri="{BB962C8B-B14F-4D97-AF65-F5344CB8AC3E}">
+        <p14:creationId xmlns:p14="http://schemas.microsoft.com/office/powerpoint/2010/main" val="872840914"/>
+      </p:ext>
+    </p:extLst>
+  </p:cSld>
+  <p:clrMapOvr>
+    <a:masterClrMapping/>
+  </p:clrMapOvr>
+</p:notes>
+</file>
+
 <file path=ppt/slideLayouts/slideLayout1.xml><?xml version="1.0" encoding="utf-8"?>
 <p:sldLayout xmlns:a="http://schemas.openxmlformats.org/drawingml/2006/main" xmlns:r="http://schemas.openxmlformats.org/officeDocument/2006/relationships" xmlns:p="http://schemas.openxmlformats.org/presentationml/2006/main" type="title" preserve="1">
   <p:cSld name="Title Slide">
@@ -693,7 +784,7 @@
           <a:p>
             <a:fld id="{FEFAAF38-9343-4D68-A973-A40334CBD430}" type="datetimeFigureOut">
               <a:rPr lang="en-SG" smtClean="0"/>
-              <a:t>9/1/2026</a:t>
+              <a:t>13/1/2026</a:t>
             </a:fld>
             <a:endParaRPr lang="en-SG"/>
           </a:p>
@@ -893,7 +984,7 @@
           <a:p>
             <a:fld id="{FEFAAF38-9343-4D68-A973-A40334CBD430}" type="datetimeFigureOut">
               <a:rPr lang="en-SG" smtClean="0"/>
-              <a:t>9/1/2026</a:t>
+              <a:t>13/1/2026</a:t>
             </a:fld>
             <a:endParaRPr lang="en-SG"/>
           </a:p>
@@ -1103,7 +1194,7 @@
           <a:p>
             <a:fld id="{FEFAAF38-9343-4D68-A973-A40334CBD430}" type="datetimeFigureOut">
               <a:rPr lang="en-SG" smtClean="0"/>
-              <a:t>9/1/2026</a:t>
+              <a:t>13/1/2026</a:t>
             </a:fld>
             <a:endParaRPr lang="en-SG"/>
           </a:p>
@@ -1303,7 +1394,7 @@
           <a:p>
             <a:fld id="{FEFAAF38-9343-4D68-A973-A40334CBD430}" type="datetimeFigureOut">
               <a:rPr lang="en-SG" smtClean="0"/>
-              <a:t>9/1/2026</a:t>
+              <a:t>13/1/2026</a:t>
             </a:fld>
             <a:endParaRPr lang="en-SG"/>
           </a:p>
@@ -1579,7 +1670,7 @@
           <a:p>
             <a:fld id="{FEFAAF38-9343-4D68-A973-A40334CBD430}" type="datetimeFigureOut">
               <a:rPr lang="en-SG" smtClean="0"/>
-              <a:t>9/1/2026</a:t>
+              <a:t>13/1/2026</a:t>
             </a:fld>
             <a:endParaRPr lang="en-SG"/>
           </a:p>
@@ -1847,7 +1938,7 @@
           <a:p>
             <a:fld id="{FEFAAF38-9343-4D68-A973-A40334CBD430}" type="datetimeFigureOut">
               <a:rPr lang="en-SG" smtClean="0"/>
-              <a:t>9/1/2026</a:t>
+              <a:t>13/1/2026</a:t>
             </a:fld>
             <a:endParaRPr lang="en-SG"/>
           </a:p>
@@ -2262,7 +2353,7 @@
           <a:p>
             <a:fld id="{FEFAAF38-9343-4D68-A973-A40334CBD430}" type="datetimeFigureOut">
               <a:rPr lang="en-SG" smtClean="0"/>
-              <a:t>9/1/2026</a:t>
+              <a:t>13/1/2026</a:t>
             </a:fld>
             <a:endParaRPr lang="en-SG"/>
           </a:p>
@@ -2404,7 +2495,7 @@
           <a:p>
             <a:fld id="{FEFAAF38-9343-4D68-A973-A40334CBD430}" type="datetimeFigureOut">
               <a:rPr lang="en-SG" smtClean="0"/>
-              <a:t>9/1/2026</a:t>
+              <a:t>13/1/2026</a:t>
             </a:fld>
             <a:endParaRPr lang="en-SG"/>
           </a:p>
@@ -2517,7 +2608,7 @@
           <a:p>
             <a:fld id="{FEFAAF38-9343-4D68-A973-A40334CBD430}" type="datetimeFigureOut">
               <a:rPr lang="en-SG" smtClean="0"/>
-              <a:t>9/1/2026</a:t>
+              <a:t>13/1/2026</a:t>
             </a:fld>
             <a:endParaRPr lang="en-SG"/>
           </a:p>
@@ -2830,7 +2921,7 @@
           <a:p>
             <a:fld id="{FEFAAF38-9343-4D68-A973-A40334CBD430}" type="datetimeFigureOut">
               <a:rPr lang="en-SG" smtClean="0"/>
-              <a:t>9/1/2026</a:t>
+              <a:t>13/1/2026</a:t>
             </a:fld>
             <a:endParaRPr lang="en-SG"/>
           </a:p>
@@ -3119,7 +3210,7 @@
           <a:p>
             <a:fld id="{FEFAAF38-9343-4D68-A973-A40334CBD430}" type="datetimeFigureOut">
               <a:rPr lang="en-SG" smtClean="0"/>
-              <a:t>9/1/2026</a:t>
+              <a:t>13/1/2026</a:t>
             </a:fld>
             <a:endParaRPr lang="en-SG"/>
           </a:p>
@@ -3362,7 +3453,7 @@
           <a:p>
             <a:fld id="{FEFAAF38-9343-4D68-A973-A40334CBD430}" type="datetimeFigureOut">
               <a:rPr lang="en-SG" smtClean="0"/>
-              <a:t>9/1/2026</a:t>
+              <a:t>13/1/2026</a:t>
             </a:fld>
             <a:endParaRPr lang="en-SG"/>
           </a:p>
@@ -4370,6 +4461,432 @@
     <p:extLst>
       <p:ext uri="{BB962C8B-B14F-4D97-AF65-F5344CB8AC3E}">
         <p14:creationId xmlns:p14="http://schemas.microsoft.com/office/powerpoint/2010/main" val="2528663945"/>
+      </p:ext>
+    </p:extLst>
+  </p:cSld>
+  <p:clrMapOvr>
+    <a:masterClrMapping/>
+  </p:clrMapOvr>
+</p:sld>
+</file>
+
+<file path=ppt/slides/slide2.xml><?xml version="1.0" encoding="utf-8"?>
+<p:sld xmlns:a="http://schemas.openxmlformats.org/drawingml/2006/main" xmlns:r="http://schemas.openxmlformats.org/officeDocument/2006/relationships" xmlns:p="http://schemas.openxmlformats.org/presentationml/2006/main">
+  <p:cSld>
+    <p:spTree>
+      <p:nvGrpSpPr>
+        <p:cNvPr id="1" name=""/>
+        <p:cNvGrpSpPr/>
+        <p:nvPr/>
+      </p:nvGrpSpPr>
+      <p:grpSpPr>
+        <a:xfrm>
+          <a:off x="0" y="0"/>
+          <a:ext cx="0" cy="0"/>
+          <a:chOff x="0" y="0"/>
+          <a:chExt cx="0" cy="0"/>
+        </a:xfrm>
+      </p:grpSpPr>
+      <p:sp>
+        <p:nvSpPr>
+          <p:cNvPr id="8" name="Rectangle 7">
+            <a:extLst>
+              <a:ext uri="{FF2B5EF4-FFF2-40B4-BE49-F238E27FC236}">
+                <a16:creationId xmlns:a16="http://schemas.microsoft.com/office/drawing/2014/main" id="{CB8F2139-5FB2-A488-50A4-CA081C68D190}"/>
+              </a:ext>
+            </a:extLst>
+          </p:cNvPr>
+          <p:cNvSpPr/>
+          <p:nvPr/>
+        </p:nvSpPr>
+        <p:spPr>
+          <a:xfrm>
+            <a:off x="144379" y="2029968"/>
+            <a:ext cx="11511815" cy="3054095"/>
+          </a:xfrm>
+          <a:prstGeom prst="rect">
+            <a:avLst/>
+          </a:prstGeom>
+        </p:spPr>
+        <p:style>
+          <a:lnRef idx="2">
+            <a:schemeClr val="accent1">
+              <a:shade val="15000"/>
+            </a:schemeClr>
+          </a:lnRef>
+          <a:fillRef idx="1">
+            <a:schemeClr val="accent1"/>
+          </a:fillRef>
+          <a:effectRef idx="0">
+            <a:schemeClr val="accent1"/>
+          </a:effectRef>
+          <a:fontRef idx="minor">
+            <a:schemeClr val="lt1"/>
+          </a:fontRef>
+        </p:style>
+        <p:txBody>
+          <a:bodyPr rtlCol="0" anchor="ctr"/>
+          <a:lstStyle/>
+          <a:p>
+            <a:pPr algn="ctr"/>
+            <a:endParaRPr lang="en-SG"/>
+          </a:p>
+        </p:txBody>
+      </p:sp>
+      <p:pic>
+        <p:nvPicPr>
+          <p:cNvPr id="5" name="Picture 4">
+            <a:extLst>
+              <a:ext uri="{FF2B5EF4-FFF2-40B4-BE49-F238E27FC236}">
+                <a16:creationId xmlns:a16="http://schemas.microsoft.com/office/drawing/2014/main" id="{B4AF0480-660D-9366-D231-51E9D05A000D}"/>
+              </a:ext>
+            </a:extLst>
+          </p:cNvPr>
+          <p:cNvPicPr>
+            <a:picLocks noChangeAspect="1"/>
+          </p:cNvPicPr>
+          <p:nvPr/>
+        </p:nvPicPr>
+        <p:blipFill>
+          <a:blip r:embed="rId2">
+            <a:extLst>
+              <a:ext uri="{28A0092B-C50C-407E-A947-70E740481C1C}">
+                <a14:useLocalDpi xmlns:a14="http://schemas.microsoft.com/office/drawing/2010/main" val="0"/>
+              </a:ext>
+            </a:extLst>
+          </a:blip>
+          <a:stretch>
+            <a:fillRect/>
+          </a:stretch>
+        </p:blipFill>
+        <p:spPr>
+          <a:xfrm>
+            <a:off x="301663" y="2151245"/>
+            <a:ext cx="5389104" cy="2816661"/>
+          </a:xfrm>
+          <a:prstGeom prst="rect">
+            <a:avLst/>
+          </a:prstGeom>
+        </p:spPr>
+      </p:pic>
+      <p:pic>
+        <p:nvPicPr>
+          <p:cNvPr id="7" name="Picture 6">
+            <a:extLst>
+              <a:ext uri="{FF2B5EF4-FFF2-40B4-BE49-F238E27FC236}">
+                <a16:creationId xmlns:a16="http://schemas.microsoft.com/office/drawing/2014/main" id="{9BF88B5A-B013-E01A-F2FD-384A7A0B6C1B}"/>
+              </a:ext>
+            </a:extLst>
+          </p:cNvPr>
+          <p:cNvPicPr>
+            <a:picLocks noChangeAspect="1"/>
+          </p:cNvPicPr>
+          <p:nvPr/>
+        </p:nvPicPr>
+        <p:blipFill>
+          <a:blip r:embed="rId3"/>
+          <a:stretch>
+            <a:fillRect/>
+          </a:stretch>
+        </p:blipFill>
+        <p:spPr>
+          <a:xfrm>
+            <a:off x="5340818" y="2148716"/>
+            <a:ext cx="6170997" cy="2819190"/>
+          </a:xfrm>
+          <a:prstGeom prst="rect">
+            <a:avLst/>
+          </a:prstGeom>
+        </p:spPr>
+      </p:pic>
+    </p:spTree>
+    <p:extLst>
+      <p:ext uri="{BB962C8B-B14F-4D97-AF65-F5344CB8AC3E}">
+        <p14:creationId xmlns:p14="http://schemas.microsoft.com/office/powerpoint/2010/main" val="182069704"/>
+      </p:ext>
+    </p:extLst>
+  </p:cSld>
+  <p:clrMapOvr>
+    <a:masterClrMapping/>
+  </p:clrMapOvr>
+</p:sld>
+</file>
+
+<file path=ppt/slides/slide3.xml><?xml version="1.0" encoding="utf-8"?>
+<p:sld xmlns:a="http://schemas.openxmlformats.org/drawingml/2006/main" xmlns:r="http://schemas.openxmlformats.org/officeDocument/2006/relationships" xmlns:p="http://schemas.openxmlformats.org/presentationml/2006/main">
+  <p:cSld>
+    <p:spTree>
+      <p:nvGrpSpPr>
+        <p:cNvPr id="1" name=""/>
+        <p:cNvGrpSpPr/>
+        <p:nvPr/>
+      </p:nvGrpSpPr>
+      <p:grpSpPr>
+        <a:xfrm>
+          <a:off x="0" y="0"/>
+          <a:ext cx="0" cy="0"/>
+          <a:chOff x="0" y="0"/>
+          <a:chExt cx="0" cy="0"/>
+        </a:xfrm>
+      </p:grpSpPr>
+      <p:pic>
+        <p:nvPicPr>
+          <p:cNvPr id="5" name="Picture 4">
+            <a:extLst>
+              <a:ext uri="{FF2B5EF4-FFF2-40B4-BE49-F238E27FC236}">
+                <a16:creationId xmlns:a16="http://schemas.microsoft.com/office/drawing/2014/main" id="{EA9AF108-E3E9-16C2-C63F-C1BABF085F44}"/>
+              </a:ext>
+            </a:extLst>
+          </p:cNvPr>
+          <p:cNvPicPr>
+            <a:picLocks noChangeAspect="1"/>
+          </p:cNvPicPr>
+          <p:nvPr/>
+        </p:nvPicPr>
+        <p:blipFill>
+          <a:blip r:embed="rId3"/>
+          <a:srcRect r="12150"/>
+          <a:stretch>
+            <a:fillRect/>
+          </a:stretch>
+        </p:blipFill>
+        <p:spPr>
+          <a:xfrm>
+            <a:off x="842166" y="1005394"/>
+            <a:ext cx="4861006" cy="5066667"/>
+          </a:xfrm>
+          <a:prstGeom prst="rect">
+            <a:avLst/>
+          </a:prstGeom>
+          <a:ln w="6350">
+            <a:solidFill>
+              <a:schemeClr val="tx1"/>
+            </a:solidFill>
+          </a:ln>
+        </p:spPr>
+      </p:pic>
+      <p:pic>
+        <p:nvPicPr>
+          <p:cNvPr id="7" name="Picture 6">
+            <a:extLst>
+              <a:ext uri="{FF2B5EF4-FFF2-40B4-BE49-F238E27FC236}">
+                <a16:creationId xmlns:a16="http://schemas.microsoft.com/office/drawing/2014/main" id="{D133FFCA-8E5F-AA08-2DC9-C1AC6BFB8418}"/>
+              </a:ext>
+            </a:extLst>
+          </p:cNvPr>
+          <p:cNvPicPr>
+            <a:picLocks noChangeAspect="1"/>
+          </p:cNvPicPr>
+          <p:nvPr/>
+        </p:nvPicPr>
+        <p:blipFill>
+          <a:blip r:embed="rId4"/>
+          <a:srcRect r="17543" b="2743"/>
+          <a:stretch>
+            <a:fillRect/>
+          </a:stretch>
+        </p:blipFill>
+        <p:spPr>
+          <a:xfrm>
+            <a:off x="5893870" y="1005394"/>
+            <a:ext cx="4861006" cy="5066667"/>
+          </a:xfrm>
+          <a:prstGeom prst="rect">
+            <a:avLst/>
+          </a:prstGeom>
+          <a:ln w="6350">
+            <a:solidFill>
+              <a:schemeClr val="tx1"/>
+            </a:solidFill>
+          </a:ln>
+        </p:spPr>
+      </p:pic>
+      <p:sp>
+        <p:nvSpPr>
+          <p:cNvPr id="8" name="Rectangle 7">
+            <a:extLst>
+              <a:ext uri="{FF2B5EF4-FFF2-40B4-BE49-F238E27FC236}">
+                <a16:creationId xmlns:a16="http://schemas.microsoft.com/office/drawing/2014/main" id="{4252FE0B-6B91-CCDC-B92D-5112A0A5E662}"/>
+              </a:ext>
+            </a:extLst>
+          </p:cNvPr>
+          <p:cNvSpPr/>
+          <p:nvPr/>
+        </p:nvSpPr>
+        <p:spPr>
+          <a:xfrm>
+            <a:off x="1143000" y="4745736"/>
+            <a:ext cx="2523744" cy="338328"/>
+          </a:xfrm>
+          <a:prstGeom prst="rect">
+            <a:avLst/>
+          </a:prstGeom>
+          <a:noFill/>
+          <a:ln>
+            <a:solidFill>
+              <a:srgbClr val="FF0000"/>
+            </a:solidFill>
+          </a:ln>
+        </p:spPr>
+        <p:style>
+          <a:lnRef idx="2">
+            <a:schemeClr val="accent1">
+              <a:shade val="15000"/>
+            </a:schemeClr>
+          </a:lnRef>
+          <a:fillRef idx="1">
+            <a:schemeClr val="accent1"/>
+          </a:fillRef>
+          <a:effectRef idx="0">
+            <a:schemeClr val="accent1"/>
+          </a:effectRef>
+          <a:fontRef idx="minor">
+            <a:schemeClr val="lt1"/>
+          </a:fontRef>
+        </p:style>
+        <p:txBody>
+          <a:bodyPr rtlCol="0" anchor="ctr"/>
+          <a:lstStyle/>
+          <a:p>
+            <a:pPr algn="ctr"/>
+            <a:endParaRPr lang="en-SG" dirty="0"/>
+          </a:p>
+        </p:txBody>
+      </p:sp>
+      <p:sp>
+        <p:nvSpPr>
+          <p:cNvPr id="9" name="Rectangle 8">
+            <a:extLst>
+              <a:ext uri="{FF2B5EF4-FFF2-40B4-BE49-F238E27FC236}">
+                <a16:creationId xmlns:a16="http://schemas.microsoft.com/office/drawing/2014/main" id="{F6D79EFF-6C47-9DFD-DAD4-ECFA70FC7362}"/>
+              </a:ext>
+            </a:extLst>
+          </p:cNvPr>
+          <p:cNvSpPr/>
+          <p:nvPr/>
+        </p:nvSpPr>
+        <p:spPr>
+          <a:xfrm>
+            <a:off x="6178296" y="4745736"/>
+            <a:ext cx="2523744" cy="338328"/>
+          </a:xfrm>
+          <a:prstGeom prst="rect">
+            <a:avLst/>
+          </a:prstGeom>
+          <a:noFill/>
+          <a:ln>
+            <a:solidFill>
+              <a:srgbClr val="FF0000"/>
+            </a:solidFill>
+          </a:ln>
+        </p:spPr>
+        <p:style>
+          <a:lnRef idx="2">
+            <a:schemeClr val="accent1">
+              <a:shade val="15000"/>
+            </a:schemeClr>
+          </a:lnRef>
+          <a:fillRef idx="1">
+            <a:schemeClr val="accent1"/>
+          </a:fillRef>
+          <a:effectRef idx="0">
+            <a:schemeClr val="accent1"/>
+          </a:effectRef>
+          <a:fontRef idx="minor">
+            <a:schemeClr val="lt1"/>
+          </a:fontRef>
+        </p:style>
+        <p:txBody>
+          <a:bodyPr rtlCol="0" anchor="ctr"/>
+          <a:lstStyle/>
+          <a:p>
+            <a:pPr algn="ctr"/>
+            <a:endParaRPr lang="en-SG" dirty="0"/>
+          </a:p>
+        </p:txBody>
+      </p:sp>
+      <p:sp>
+        <p:nvSpPr>
+          <p:cNvPr id="10" name="TextBox 9">
+            <a:extLst>
+              <a:ext uri="{FF2B5EF4-FFF2-40B4-BE49-F238E27FC236}">
+                <a16:creationId xmlns:a16="http://schemas.microsoft.com/office/drawing/2014/main" id="{36FCE1CA-B868-A72E-6964-EABCF2F6FEAE}"/>
+              </a:ext>
+            </a:extLst>
+          </p:cNvPr>
+          <p:cNvSpPr txBox="1"/>
+          <p:nvPr/>
+        </p:nvSpPr>
+        <p:spPr>
+          <a:xfrm>
+            <a:off x="769014" y="616662"/>
+            <a:ext cx="3720690" cy="338554"/>
+          </a:xfrm>
+          <a:prstGeom prst="rect">
+            <a:avLst/>
+          </a:prstGeom>
+          <a:noFill/>
+        </p:spPr>
+        <p:txBody>
+          <a:bodyPr wrap="square" rtlCol="0">
+            <a:spAutoFit/>
+          </a:bodyPr>
+          <a:lstStyle/>
+          <a:p>
+            <a:r>
+              <a:rPr lang="en-SG" sz="1600" b="1" dirty="0">
+                <a:solidFill>
+                  <a:srgbClr val="C00000"/>
+                </a:solidFill>
+              </a:rPr>
+              <a:t>Write Analog Value Property Request</a:t>
+            </a:r>
+          </a:p>
+        </p:txBody>
+      </p:sp>
+      <p:sp>
+        <p:nvSpPr>
+          <p:cNvPr id="11" name="TextBox 10">
+            <a:extLst>
+              <a:ext uri="{FF2B5EF4-FFF2-40B4-BE49-F238E27FC236}">
+                <a16:creationId xmlns:a16="http://schemas.microsoft.com/office/drawing/2014/main" id="{7C06D824-C753-3985-0755-BD7F8801EF4C}"/>
+              </a:ext>
+            </a:extLst>
+          </p:cNvPr>
+          <p:cNvSpPr txBox="1"/>
+          <p:nvPr/>
+        </p:nvSpPr>
+        <p:spPr>
+          <a:xfrm>
+            <a:off x="5841953" y="597929"/>
+            <a:ext cx="3720690" cy="338554"/>
+          </a:xfrm>
+          <a:prstGeom prst="rect">
+            <a:avLst/>
+          </a:prstGeom>
+          <a:noFill/>
+        </p:spPr>
+        <p:txBody>
+          <a:bodyPr wrap="square" rtlCol="0">
+            <a:spAutoFit/>
+          </a:bodyPr>
+          <a:lstStyle/>
+          <a:p>
+            <a:r>
+              <a:rPr lang="en-SG" sz="1600" b="1" dirty="0">
+                <a:solidFill>
+                  <a:srgbClr val="C00000"/>
+                </a:solidFill>
+              </a:rPr>
+              <a:t>Read Analog Value Property Request</a:t>
+            </a:r>
+          </a:p>
+        </p:txBody>
+      </p:sp>
+    </p:spTree>
+    <p:extLst>
+      <p:ext uri="{BB962C8B-B14F-4D97-AF65-F5344CB8AC3E}">
+        <p14:creationId xmlns:p14="http://schemas.microsoft.com/office/powerpoint/2010/main" val="2685213513"/>
       </p:ext>
     </p:extLst>
   </p:cSld>

</xml_diff>

<commit_message>
Update the read me doc and the image.
</commit_message>
<xml_diff>
--- a/BACnet_PLC_Simulator/doc/designDoc.pptx
+++ b/BACnet_PLC_Simulator/doc/designDoc.pptx
@@ -5,12 +5,13 @@
     <p:sldMasterId id="2147483648" r:id="rId1"/>
   </p:sldMasterIdLst>
   <p:notesMasterIdLst>
-    <p:notesMasterId r:id="rId5"/>
+    <p:notesMasterId r:id="rId6"/>
   </p:notesMasterIdLst>
   <p:sldIdLst>
     <p:sldId id="256" r:id="rId2"/>
     <p:sldId id="257" r:id="rId3"/>
     <p:sldId id="258" r:id="rId4"/>
+    <p:sldId id="259" r:id="rId5"/>
   </p:sldIdLst>
   <p:sldSz cx="12192000" cy="6858000"/>
   <p:notesSz cx="6858000" cy="9144000"/>
@@ -199,7 +200,7 @@
           <a:p>
             <a:fld id="{293D8FD3-42E6-4115-9E5E-A8FCCF6B73B5}" type="datetimeFigureOut">
               <a:rPr lang="en-SG" smtClean="0"/>
-              <a:t>13/1/2026</a:t>
+              <a:t>15/1/2026</a:t>
             </a:fld>
             <a:endParaRPr lang="en-SG"/>
           </a:p>
@@ -784,7 +785,7 @@
           <a:p>
             <a:fld id="{FEFAAF38-9343-4D68-A973-A40334CBD430}" type="datetimeFigureOut">
               <a:rPr lang="en-SG" smtClean="0"/>
-              <a:t>13/1/2026</a:t>
+              <a:t>15/1/2026</a:t>
             </a:fld>
             <a:endParaRPr lang="en-SG"/>
           </a:p>
@@ -984,7 +985,7 @@
           <a:p>
             <a:fld id="{FEFAAF38-9343-4D68-A973-A40334CBD430}" type="datetimeFigureOut">
               <a:rPr lang="en-SG" smtClean="0"/>
-              <a:t>13/1/2026</a:t>
+              <a:t>15/1/2026</a:t>
             </a:fld>
             <a:endParaRPr lang="en-SG"/>
           </a:p>
@@ -1194,7 +1195,7 @@
           <a:p>
             <a:fld id="{FEFAAF38-9343-4D68-A973-A40334CBD430}" type="datetimeFigureOut">
               <a:rPr lang="en-SG" smtClean="0"/>
-              <a:t>13/1/2026</a:t>
+              <a:t>15/1/2026</a:t>
             </a:fld>
             <a:endParaRPr lang="en-SG"/>
           </a:p>
@@ -1394,7 +1395,7 @@
           <a:p>
             <a:fld id="{FEFAAF38-9343-4D68-A973-A40334CBD430}" type="datetimeFigureOut">
               <a:rPr lang="en-SG" smtClean="0"/>
-              <a:t>13/1/2026</a:t>
+              <a:t>15/1/2026</a:t>
             </a:fld>
             <a:endParaRPr lang="en-SG"/>
           </a:p>
@@ -1670,7 +1671,7 @@
           <a:p>
             <a:fld id="{FEFAAF38-9343-4D68-A973-A40334CBD430}" type="datetimeFigureOut">
               <a:rPr lang="en-SG" smtClean="0"/>
-              <a:t>13/1/2026</a:t>
+              <a:t>15/1/2026</a:t>
             </a:fld>
             <a:endParaRPr lang="en-SG"/>
           </a:p>
@@ -1938,7 +1939,7 @@
           <a:p>
             <a:fld id="{FEFAAF38-9343-4D68-A973-A40334CBD430}" type="datetimeFigureOut">
               <a:rPr lang="en-SG" smtClean="0"/>
-              <a:t>13/1/2026</a:t>
+              <a:t>15/1/2026</a:t>
             </a:fld>
             <a:endParaRPr lang="en-SG"/>
           </a:p>
@@ -2353,7 +2354,7 @@
           <a:p>
             <a:fld id="{FEFAAF38-9343-4D68-A973-A40334CBD430}" type="datetimeFigureOut">
               <a:rPr lang="en-SG" smtClean="0"/>
-              <a:t>13/1/2026</a:t>
+              <a:t>15/1/2026</a:t>
             </a:fld>
             <a:endParaRPr lang="en-SG"/>
           </a:p>
@@ -2495,7 +2496,7 @@
           <a:p>
             <a:fld id="{FEFAAF38-9343-4D68-A973-A40334CBD430}" type="datetimeFigureOut">
               <a:rPr lang="en-SG" smtClean="0"/>
-              <a:t>13/1/2026</a:t>
+              <a:t>15/1/2026</a:t>
             </a:fld>
             <a:endParaRPr lang="en-SG"/>
           </a:p>
@@ -2608,7 +2609,7 @@
           <a:p>
             <a:fld id="{FEFAAF38-9343-4D68-A973-A40334CBD430}" type="datetimeFigureOut">
               <a:rPr lang="en-SG" smtClean="0"/>
-              <a:t>13/1/2026</a:t>
+              <a:t>15/1/2026</a:t>
             </a:fld>
             <a:endParaRPr lang="en-SG"/>
           </a:p>
@@ -2921,7 +2922,7 @@
           <a:p>
             <a:fld id="{FEFAAF38-9343-4D68-A973-A40334CBD430}" type="datetimeFigureOut">
               <a:rPr lang="en-SG" smtClean="0"/>
-              <a:t>13/1/2026</a:t>
+              <a:t>15/1/2026</a:t>
             </a:fld>
             <a:endParaRPr lang="en-SG"/>
           </a:p>
@@ -3210,7 +3211,7 @@
           <a:p>
             <a:fld id="{FEFAAF38-9343-4D68-A973-A40334CBD430}" type="datetimeFigureOut">
               <a:rPr lang="en-SG" smtClean="0"/>
-              <a:t>13/1/2026</a:t>
+              <a:t>15/1/2026</a:t>
             </a:fld>
             <a:endParaRPr lang="en-SG"/>
           </a:p>
@@ -3453,7 +3454,7 @@
           <a:p>
             <a:fld id="{FEFAAF38-9343-4D68-A973-A40334CBD430}" type="datetimeFigureOut">
               <a:rPr lang="en-SG" smtClean="0"/>
-              <a:t>13/1/2026</a:t>
+              <a:t>15/1/2026</a:t>
             </a:fld>
             <a:endParaRPr lang="en-SG"/>
           </a:p>
@@ -4887,6 +4888,3492 @@
     <p:extLst>
       <p:ext uri="{BB962C8B-B14F-4D97-AF65-F5344CB8AC3E}">
         <p14:creationId xmlns:p14="http://schemas.microsoft.com/office/powerpoint/2010/main" val="2685213513"/>
+      </p:ext>
+    </p:extLst>
+  </p:cSld>
+  <p:clrMapOvr>
+    <a:masterClrMapping/>
+  </p:clrMapOvr>
+</p:sld>
+</file>
+
+<file path=ppt/slides/slide4.xml><?xml version="1.0" encoding="utf-8"?>
+<p:sld xmlns:a="http://schemas.openxmlformats.org/drawingml/2006/main" xmlns:r="http://schemas.openxmlformats.org/officeDocument/2006/relationships" xmlns:p="http://schemas.openxmlformats.org/presentationml/2006/main">
+  <p:cSld>
+    <p:spTree>
+      <p:nvGrpSpPr>
+        <p:cNvPr id="1" name=""/>
+        <p:cNvGrpSpPr/>
+        <p:nvPr/>
+      </p:nvGrpSpPr>
+      <p:grpSpPr>
+        <a:xfrm>
+          <a:off x="0" y="0"/>
+          <a:ext cx="0" cy="0"/>
+          <a:chOff x="0" y="0"/>
+          <a:chExt cx="0" cy="0"/>
+        </a:xfrm>
+      </p:grpSpPr>
+      <p:sp>
+        <p:nvSpPr>
+          <p:cNvPr id="180" name="Rectangle 179">
+            <a:extLst>
+              <a:ext uri="{FF2B5EF4-FFF2-40B4-BE49-F238E27FC236}">
+                <a16:creationId xmlns:a16="http://schemas.microsoft.com/office/drawing/2014/main" id="{8BAD217F-7005-BB2B-F13E-7A9664C1020C}"/>
+              </a:ext>
+            </a:extLst>
+          </p:cNvPr>
+          <p:cNvSpPr/>
+          <p:nvPr/>
+        </p:nvSpPr>
+        <p:spPr>
+          <a:xfrm>
+            <a:off x="4384999" y="5499327"/>
+            <a:ext cx="2647306" cy="1076255"/>
+          </a:xfrm>
+          <a:prstGeom prst="rect">
+            <a:avLst/>
+          </a:prstGeom>
+          <a:solidFill>
+            <a:schemeClr val="accent5">
+              <a:lumMod val="20000"/>
+              <a:lumOff val="80000"/>
+            </a:schemeClr>
+          </a:solidFill>
+        </p:spPr>
+        <p:style>
+          <a:lnRef idx="2">
+            <a:schemeClr val="accent1">
+              <a:shade val="15000"/>
+            </a:schemeClr>
+          </a:lnRef>
+          <a:fillRef idx="1">
+            <a:schemeClr val="accent1"/>
+          </a:fillRef>
+          <a:effectRef idx="0">
+            <a:schemeClr val="accent1"/>
+          </a:effectRef>
+          <a:fontRef idx="minor">
+            <a:schemeClr val="lt1"/>
+          </a:fontRef>
+        </p:style>
+        <p:txBody>
+          <a:bodyPr rtlCol="0" anchor="ctr"/>
+          <a:lstStyle/>
+          <a:p>
+            <a:pPr algn="ctr"/>
+            <a:endParaRPr lang="en-SG" dirty="0"/>
+          </a:p>
+        </p:txBody>
+      </p:sp>
+      <p:sp>
+        <p:nvSpPr>
+          <p:cNvPr id="169" name="Rectangle 168">
+            <a:extLst>
+              <a:ext uri="{FF2B5EF4-FFF2-40B4-BE49-F238E27FC236}">
+                <a16:creationId xmlns:a16="http://schemas.microsoft.com/office/drawing/2014/main" id="{AD62D43B-87AF-8B47-C09B-D66D20BC37BD}"/>
+              </a:ext>
+            </a:extLst>
+          </p:cNvPr>
+          <p:cNvSpPr/>
+          <p:nvPr/>
+        </p:nvSpPr>
+        <p:spPr>
+          <a:xfrm>
+            <a:off x="8394789" y="4570224"/>
+            <a:ext cx="3211175" cy="1846356"/>
+          </a:xfrm>
+          <a:prstGeom prst="rect">
+            <a:avLst/>
+          </a:prstGeom>
+          <a:solidFill>
+            <a:schemeClr val="accent2">
+              <a:lumMod val="20000"/>
+              <a:lumOff val="80000"/>
+            </a:schemeClr>
+          </a:solidFill>
+        </p:spPr>
+        <p:style>
+          <a:lnRef idx="2">
+            <a:schemeClr val="accent1">
+              <a:shade val="15000"/>
+            </a:schemeClr>
+          </a:lnRef>
+          <a:fillRef idx="1">
+            <a:schemeClr val="accent1"/>
+          </a:fillRef>
+          <a:effectRef idx="0">
+            <a:schemeClr val="accent1"/>
+          </a:effectRef>
+          <a:fontRef idx="minor">
+            <a:schemeClr val="lt1"/>
+          </a:fontRef>
+        </p:style>
+        <p:txBody>
+          <a:bodyPr rtlCol="0" anchor="ctr"/>
+          <a:lstStyle/>
+          <a:p>
+            <a:pPr algn="ctr"/>
+            <a:endParaRPr lang="en-SG" dirty="0"/>
+          </a:p>
+        </p:txBody>
+      </p:sp>
+      <p:sp>
+        <p:nvSpPr>
+          <p:cNvPr id="66" name="Rectangle 65">
+            <a:extLst>
+              <a:ext uri="{FF2B5EF4-FFF2-40B4-BE49-F238E27FC236}">
+                <a16:creationId xmlns:a16="http://schemas.microsoft.com/office/drawing/2014/main" id="{837A8677-8040-C491-6D80-73149652E6CE}"/>
+              </a:ext>
+            </a:extLst>
+          </p:cNvPr>
+          <p:cNvSpPr/>
+          <p:nvPr/>
+        </p:nvSpPr>
+        <p:spPr>
+          <a:xfrm>
+            <a:off x="4478013" y="1314273"/>
+            <a:ext cx="2802779" cy="4044111"/>
+          </a:xfrm>
+          <a:prstGeom prst="rect">
+            <a:avLst/>
+          </a:prstGeom>
+          <a:solidFill>
+            <a:schemeClr val="accent6">
+              <a:lumMod val="20000"/>
+              <a:lumOff val="80000"/>
+            </a:schemeClr>
+          </a:solidFill>
+        </p:spPr>
+        <p:style>
+          <a:lnRef idx="2">
+            <a:schemeClr val="accent1">
+              <a:shade val="15000"/>
+            </a:schemeClr>
+          </a:lnRef>
+          <a:fillRef idx="1">
+            <a:schemeClr val="accent1"/>
+          </a:fillRef>
+          <a:effectRef idx="0">
+            <a:schemeClr val="accent1"/>
+          </a:effectRef>
+          <a:fontRef idx="minor">
+            <a:schemeClr val="lt1"/>
+          </a:fontRef>
+        </p:style>
+        <p:txBody>
+          <a:bodyPr rtlCol="0" anchor="ctr"/>
+          <a:lstStyle/>
+          <a:p>
+            <a:pPr algn="ctr"/>
+            <a:endParaRPr lang="en-SG" dirty="0"/>
+          </a:p>
+        </p:txBody>
+      </p:sp>
+      <p:sp>
+        <p:nvSpPr>
+          <p:cNvPr id="4" name="Rectangle 3">
+            <a:extLst>
+              <a:ext uri="{FF2B5EF4-FFF2-40B4-BE49-F238E27FC236}">
+                <a16:creationId xmlns:a16="http://schemas.microsoft.com/office/drawing/2014/main" id="{ED7DD3D4-6B5E-7CB5-E003-2C037546352E}"/>
+              </a:ext>
+            </a:extLst>
+          </p:cNvPr>
+          <p:cNvSpPr/>
+          <p:nvPr/>
+        </p:nvSpPr>
+        <p:spPr>
+          <a:xfrm>
+            <a:off x="703110" y="1319622"/>
+            <a:ext cx="3413179" cy="4475561"/>
+          </a:xfrm>
+          <a:prstGeom prst="rect">
+            <a:avLst/>
+          </a:prstGeom>
+          <a:solidFill>
+            <a:schemeClr val="accent1">
+              <a:lumMod val="20000"/>
+              <a:lumOff val="80000"/>
+            </a:schemeClr>
+          </a:solidFill>
+        </p:spPr>
+        <p:style>
+          <a:lnRef idx="2">
+            <a:schemeClr val="accent1">
+              <a:shade val="15000"/>
+            </a:schemeClr>
+          </a:lnRef>
+          <a:fillRef idx="1">
+            <a:schemeClr val="accent1"/>
+          </a:fillRef>
+          <a:effectRef idx="0">
+            <a:schemeClr val="accent1"/>
+          </a:effectRef>
+          <a:fontRef idx="minor">
+            <a:schemeClr val="lt1"/>
+          </a:fontRef>
+        </p:style>
+        <p:txBody>
+          <a:bodyPr rtlCol="0" anchor="ctr"/>
+          <a:lstStyle/>
+          <a:p>
+            <a:pPr algn="ctr"/>
+            <a:endParaRPr lang="en-SG" dirty="0"/>
+          </a:p>
+        </p:txBody>
+      </p:sp>
+      <p:sp>
+        <p:nvSpPr>
+          <p:cNvPr id="5" name="TextBox 4">
+            <a:extLst>
+              <a:ext uri="{FF2B5EF4-FFF2-40B4-BE49-F238E27FC236}">
+                <a16:creationId xmlns:a16="http://schemas.microsoft.com/office/drawing/2014/main" id="{31BC18DF-ABBF-4D82-87B5-E051CFF1E5E0}"/>
+              </a:ext>
+            </a:extLst>
+          </p:cNvPr>
+          <p:cNvSpPr txBox="1"/>
+          <p:nvPr/>
+        </p:nvSpPr>
+        <p:spPr>
+          <a:xfrm>
+            <a:off x="703110" y="1375901"/>
+            <a:ext cx="3060849" cy="523220"/>
+          </a:xfrm>
+          <a:prstGeom prst="rect">
+            <a:avLst/>
+          </a:prstGeom>
+          <a:noFill/>
+        </p:spPr>
+        <p:txBody>
+          <a:bodyPr wrap="square" rtlCol="0">
+            <a:spAutoFit/>
+          </a:bodyPr>
+          <a:lstStyle/>
+          <a:p>
+            <a:r>
+              <a:rPr lang="en-US" sz="1400" b="1" dirty="0">
+                <a:solidFill>
+                  <a:schemeClr val="tx2">
+                    <a:lumMod val="75000"/>
+                    <a:lumOff val="25000"/>
+                  </a:schemeClr>
+                </a:solidFill>
+              </a:rPr>
+              <a:t>Center HVAC Physical Components Simulation Modules</a:t>
+            </a:r>
+            <a:endParaRPr lang="en-SG" sz="1400" b="1" dirty="0">
+              <a:solidFill>
+                <a:schemeClr val="tx2">
+                  <a:lumMod val="75000"/>
+                  <a:lumOff val="25000"/>
+                </a:schemeClr>
+              </a:solidFill>
+            </a:endParaRPr>
+          </a:p>
+        </p:txBody>
+      </p:sp>
+      <p:pic>
+        <p:nvPicPr>
+          <p:cNvPr id="7" name="Picture 6">
+            <a:extLst>
+              <a:ext uri="{FF2B5EF4-FFF2-40B4-BE49-F238E27FC236}">
+                <a16:creationId xmlns:a16="http://schemas.microsoft.com/office/drawing/2014/main" id="{57A8BC0D-761B-63E8-6F7E-ABC7CD861418}"/>
+              </a:ext>
+            </a:extLst>
+          </p:cNvPr>
+          <p:cNvPicPr>
+            <a:picLocks noChangeAspect="1"/>
+          </p:cNvPicPr>
+          <p:nvPr/>
+        </p:nvPicPr>
+        <p:blipFill>
+          <a:blip r:embed="rId2"/>
+          <a:stretch>
+            <a:fillRect/>
+          </a:stretch>
+        </p:blipFill>
+        <p:spPr>
+          <a:xfrm>
+            <a:off x="949895" y="3691740"/>
+            <a:ext cx="738303" cy="636967"/>
+          </a:xfrm>
+          <a:prstGeom prst="rect">
+            <a:avLst/>
+          </a:prstGeom>
+          <a:ln w="9525">
+            <a:solidFill>
+              <a:schemeClr val="tx1"/>
+            </a:solidFill>
+          </a:ln>
+        </p:spPr>
+      </p:pic>
+      <p:sp>
+        <p:nvSpPr>
+          <p:cNvPr id="8" name="TextBox 7">
+            <a:extLst>
+              <a:ext uri="{FF2B5EF4-FFF2-40B4-BE49-F238E27FC236}">
+                <a16:creationId xmlns:a16="http://schemas.microsoft.com/office/drawing/2014/main" id="{F1A2F2BC-4E18-1456-396E-6304DD70671F}"/>
+              </a:ext>
+            </a:extLst>
+          </p:cNvPr>
+          <p:cNvSpPr txBox="1"/>
+          <p:nvPr/>
+        </p:nvSpPr>
+        <p:spPr>
+          <a:xfrm>
+            <a:off x="803067" y="3437250"/>
+            <a:ext cx="1069785" cy="276999"/>
+          </a:xfrm>
+          <a:prstGeom prst="rect">
+            <a:avLst/>
+          </a:prstGeom>
+          <a:noFill/>
+        </p:spPr>
+        <p:txBody>
+          <a:bodyPr wrap="square" rtlCol="0">
+            <a:spAutoFit/>
+          </a:bodyPr>
+          <a:lstStyle/>
+          <a:p>
+            <a:r>
+              <a:rPr lang="en-US" sz="1200" b="1" dirty="0"/>
+              <a:t>Compressor</a:t>
+            </a:r>
+            <a:endParaRPr lang="en-SG" sz="1200" b="1" dirty="0"/>
+          </a:p>
+        </p:txBody>
+      </p:sp>
+      <p:pic>
+        <p:nvPicPr>
+          <p:cNvPr id="10" name="Picture 9">
+            <a:extLst>
+              <a:ext uri="{FF2B5EF4-FFF2-40B4-BE49-F238E27FC236}">
+                <a16:creationId xmlns:a16="http://schemas.microsoft.com/office/drawing/2014/main" id="{1186A455-AFE0-FDF6-4EFF-FA08CFAEA6EB}"/>
+              </a:ext>
+            </a:extLst>
+          </p:cNvPr>
+          <p:cNvPicPr>
+            <a:picLocks noChangeAspect="1"/>
+          </p:cNvPicPr>
+          <p:nvPr/>
+        </p:nvPicPr>
+        <p:blipFill>
+          <a:blip r:embed="rId3"/>
+          <a:stretch>
+            <a:fillRect/>
+          </a:stretch>
+        </p:blipFill>
+        <p:spPr>
+          <a:xfrm>
+            <a:off x="1949663" y="3691739"/>
+            <a:ext cx="792504" cy="636967"/>
+          </a:xfrm>
+          <a:prstGeom prst="rect">
+            <a:avLst/>
+          </a:prstGeom>
+          <a:ln w="9525">
+            <a:solidFill>
+              <a:schemeClr val="tx1"/>
+            </a:solidFill>
+          </a:ln>
+        </p:spPr>
+      </p:pic>
+      <p:sp>
+        <p:nvSpPr>
+          <p:cNvPr id="11" name="TextBox 10">
+            <a:extLst>
+              <a:ext uri="{FF2B5EF4-FFF2-40B4-BE49-F238E27FC236}">
+                <a16:creationId xmlns:a16="http://schemas.microsoft.com/office/drawing/2014/main" id="{D96171B6-EAB6-491E-9B8B-70AF4907C9B2}"/>
+              </a:ext>
+            </a:extLst>
+          </p:cNvPr>
+          <p:cNvSpPr txBox="1"/>
+          <p:nvPr/>
+        </p:nvSpPr>
+        <p:spPr>
+          <a:xfrm>
+            <a:off x="1824261" y="3427455"/>
+            <a:ext cx="1289524" cy="276999"/>
+          </a:xfrm>
+          <a:prstGeom prst="rect">
+            <a:avLst/>
+          </a:prstGeom>
+          <a:noFill/>
+        </p:spPr>
+        <p:txBody>
+          <a:bodyPr wrap="square" rtlCol="0">
+            <a:spAutoFit/>
+          </a:bodyPr>
+          <a:lstStyle/>
+          <a:p>
+            <a:r>
+              <a:rPr lang="en-US" sz="1200" b="1" dirty="0"/>
+              <a:t>Air Conditioner</a:t>
+            </a:r>
+            <a:endParaRPr lang="en-SG" sz="1200" b="1" dirty="0"/>
+          </a:p>
+        </p:txBody>
+      </p:sp>
+      <p:pic>
+        <p:nvPicPr>
+          <p:cNvPr id="13" name="Picture 12">
+            <a:extLst>
+              <a:ext uri="{FF2B5EF4-FFF2-40B4-BE49-F238E27FC236}">
+                <a16:creationId xmlns:a16="http://schemas.microsoft.com/office/drawing/2014/main" id="{B3D75DA2-BA9A-0A54-0966-38990D22518F}"/>
+              </a:ext>
+            </a:extLst>
+          </p:cNvPr>
+          <p:cNvPicPr>
+            <a:picLocks noChangeAspect="1"/>
+          </p:cNvPicPr>
+          <p:nvPr/>
+        </p:nvPicPr>
+        <p:blipFill>
+          <a:blip r:embed="rId4"/>
+          <a:stretch>
+            <a:fillRect/>
+          </a:stretch>
+        </p:blipFill>
+        <p:spPr>
+          <a:xfrm>
+            <a:off x="2981165" y="3691738"/>
+            <a:ext cx="656466" cy="636967"/>
+          </a:xfrm>
+          <a:prstGeom prst="rect">
+            <a:avLst/>
+          </a:prstGeom>
+          <a:ln w="9525">
+            <a:solidFill>
+              <a:schemeClr val="tx1"/>
+            </a:solidFill>
+          </a:ln>
+        </p:spPr>
+      </p:pic>
+      <p:sp>
+        <p:nvSpPr>
+          <p:cNvPr id="14" name="TextBox 13">
+            <a:extLst>
+              <a:ext uri="{FF2B5EF4-FFF2-40B4-BE49-F238E27FC236}">
+                <a16:creationId xmlns:a16="http://schemas.microsoft.com/office/drawing/2014/main" id="{51D339F5-F883-3AEB-90D9-01270C42BF59}"/>
+              </a:ext>
+            </a:extLst>
+          </p:cNvPr>
+          <p:cNvSpPr txBox="1"/>
+          <p:nvPr/>
+        </p:nvSpPr>
+        <p:spPr>
+          <a:xfrm>
+            <a:off x="3077586" y="3414739"/>
+            <a:ext cx="534893" cy="276999"/>
+          </a:xfrm>
+          <a:prstGeom prst="rect">
+            <a:avLst/>
+          </a:prstGeom>
+          <a:noFill/>
+        </p:spPr>
+        <p:txBody>
+          <a:bodyPr wrap="square" rtlCol="0">
+            <a:spAutoFit/>
+          </a:bodyPr>
+          <a:lstStyle/>
+          <a:p>
+            <a:r>
+              <a:rPr lang="en-US" sz="1200" b="1" dirty="0"/>
+              <a:t>Fan</a:t>
+            </a:r>
+            <a:endParaRPr lang="en-SG" sz="1200" b="1" dirty="0"/>
+          </a:p>
+        </p:txBody>
+      </p:sp>
+      <p:pic>
+        <p:nvPicPr>
+          <p:cNvPr id="16" name="Picture 15">
+            <a:extLst>
+              <a:ext uri="{FF2B5EF4-FFF2-40B4-BE49-F238E27FC236}">
+                <a16:creationId xmlns:a16="http://schemas.microsoft.com/office/drawing/2014/main" id="{831D30AF-C4C2-25EC-BB0A-E91DADA90672}"/>
+              </a:ext>
+            </a:extLst>
+          </p:cNvPr>
+          <p:cNvPicPr>
+            <a:picLocks noChangeAspect="1"/>
+          </p:cNvPicPr>
+          <p:nvPr/>
+        </p:nvPicPr>
+        <p:blipFill>
+          <a:blip r:embed="rId5"/>
+          <a:stretch>
+            <a:fillRect/>
+          </a:stretch>
+        </p:blipFill>
+        <p:spPr>
+          <a:xfrm>
+            <a:off x="1991603" y="4798527"/>
+            <a:ext cx="646477" cy="659945"/>
+          </a:xfrm>
+          <a:prstGeom prst="rect">
+            <a:avLst/>
+          </a:prstGeom>
+          <a:ln w="6350">
+            <a:solidFill>
+              <a:schemeClr val="tx1"/>
+            </a:solidFill>
+          </a:ln>
+        </p:spPr>
+      </p:pic>
+      <p:sp>
+        <p:nvSpPr>
+          <p:cNvPr id="17" name="TextBox 16">
+            <a:extLst>
+              <a:ext uri="{FF2B5EF4-FFF2-40B4-BE49-F238E27FC236}">
+                <a16:creationId xmlns:a16="http://schemas.microsoft.com/office/drawing/2014/main" id="{7FAA98C1-3BD1-3E1D-2633-AF7B48605233}"/>
+              </a:ext>
+            </a:extLst>
+          </p:cNvPr>
+          <p:cNvSpPr txBox="1"/>
+          <p:nvPr/>
+        </p:nvSpPr>
+        <p:spPr>
+          <a:xfrm>
+            <a:off x="1949663" y="5518184"/>
+            <a:ext cx="730358" cy="276999"/>
+          </a:xfrm>
+          <a:prstGeom prst="rect">
+            <a:avLst/>
+          </a:prstGeom>
+          <a:noFill/>
+        </p:spPr>
+        <p:txBody>
+          <a:bodyPr wrap="square" rtlCol="0">
+            <a:spAutoFit/>
+          </a:bodyPr>
+          <a:lstStyle/>
+          <a:p>
+            <a:r>
+              <a:rPr lang="en-US" sz="1200" b="1" dirty="0"/>
+              <a:t>Heater</a:t>
+            </a:r>
+            <a:endParaRPr lang="en-SG" sz="1200" b="1" dirty="0"/>
+          </a:p>
+        </p:txBody>
+      </p:sp>
+      <p:pic>
+        <p:nvPicPr>
+          <p:cNvPr id="21" name="Picture 20">
+            <a:extLst>
+              <a:ext uri="{FF2B5EF4-FFF2-40B4-BE49-F238E27FC236}">
+                <a16:creationId xmlns:a16="http://schemas.microsoft.com/office/drawing/2014/main" id="{0F6F4042-F0F7-CDB5-3D29-147E0CB5CAC7}"/>
+              </a:ext>
+            </a:extLst>
+          </p:cNvPr>
+          <p:cNvPicPr>
+            <a:picLocks noChangeAspect="1"/>
+          </p:cNvPicPr>
+          <p:nvPr/>
+        </p:nvPicPr>
+        <p:blipFill>
+          <a:blip r:embed="rId6"/>
+          <a:stretch>
+            <a:fillRect/>
+          </a:stretch>
+        </p:blipFill>
+        <p:spPr>
+          <a:xfrm>
+            <a:off x="934456" y="4766628"/>
+            <a:ext cx="646478" cy="678802"/>
+          </a:xfrm>
+          <a:prstGeom prst="rect">
+            <a:avLst/>
+          </a:prstGeom>
+          <a:ln w="9525">
+            <a:solidFill>
+              <a:schemeClr val="tx1"/>
+            </a:solidFill>
+          </a:ln>
+        </p:spPr>
+      </p:pic>
+      <p:sp>
+        <p:nvSpPr>
+          <p:cNvPr id="22" name="TextBox 21">
+            <a:extLst>
+              <a:ext uri="{FF2B5EF4-FFF2-40B4-BE49-F238E27FC236}">
+                <a16:creationId xmlns:a16="http://schemas.microsoft.com/office/drawing/2014/main" id="{ED99147B-4472-BAB7-30D5-158F1C510868}"/>
+              </a:ext>
+            </a:extLst>
+          </p:cNvPr>
+          <p:cNvSpPr txBox="1"/>
+          <p:nvPr/>
+        </p:nvSpPr>
+        <p:spPr>
+          <a:xfrm>
+            <a:off x="775334" y="5479213"/>
+            <a:ext cx="1215911" cy="276999"/>
+          </a:xfrm>
+          <a:prstGeom prst="rect">
+            <a:avLst/>
+          </a:prstGeom>
+          <a:noFill/>
+        </p:spPr>
+        <p:txBody>
+          <a:bodyPr wrap="square" rtlCol="0">
+            <a:spAutoFit/>
+          </a:bodyPr>
+          <a:lstStyle/>
+          <a:p>
+            <a:r>
+              <a:rPr lang="en-US" sz="1200" b="1" dirty="0"/>
+              <a:t>Cooling pump</a:t>
+            </a:r>
+            <a:endParaRPr lang="en-SG" sz="1200" b="1" dirty="0"/>
+          </a:p>
+        </p:txBody>
+      </p:sp>
+      <p:pic>
+        <p:nvPicPr>
+          <p:cNvPr id="24" name="Picture 23">
+            <a:extLst>
+              <a:ext uri="{FF2B5EF4-FFF2-40B4-BE49-F238E27FC236}">
+                <a16:creationId xmlns:a16="http://schemas.microsoft.com/office/drawing/2014/main" id="{8792FD91-5D73-120B-10F7-569250FB33F9}"/>
+              </a:ext>
+            </a:extLst>
+          </p:cNvPr>
+          <p:cNvPicPr>
+            <a:picLocks noChangeAspect="1"/>
+          </p:cNvPicPr>
+          <p:nvPr/>
+        </p:nvPicPr>
+        <p:blipFill>
+          <a:blip r:embed="rId7"/>
+          <a:stretch>
+            <a:fillRect/>
+          </a:stretch>
+        </p:blipFill>
+        <p:spPr>
+          <a:xfrm>
+            <a:off x="2929141" y="4789426"/>
+            <a:ext cx="683338" cy="656004"/>
+          </a:xfrm>
+          <a:prstGeom prst="rect">
+            <a:avLst/>
+          </a:prstGeom>
+          <a:ln w="6350">
+            <a:solidFill>
+              <a:schemeClr val="tx1"/>
+            </a:solidFill>
+          </a:ln>
+        </p:spPr>
+      </p:pic>
+      <p:sp>
+        <p:nvSpPr>
+          <p:cNvPr id="25" name="TextBox 24">
+            <a:extLst>
+              <a:ext uri="{FF2B5EF4-FFF2-40B4-BE49-F238E27FC236}">
+                <a16:creationId xmlns:a16="http://schemas.microsoft.com/office/drawing/2014/main" id="{73FA293C-F436-9754-38D9-4C2167E34FF9}"/>
+              </a:ext>
+            </a:extLst>
+          </p:cNvPr>
+          <p:cNvSpPr txBox="1"/>
+          <p:nvPr/>
+        </p:nvSpPr>
+        <p:spPr>
+          <a:xfrm>
+            <a:off x="2860695" y="5518184"/>
+            <a:ext cx="1065879" cy="276999"/>
+          </a:xfrm>
+          <a:prstGeom prst="rect">
+            <a:avLst/>
+          </a:prstGeom>
+          <a:noFill/>
+        </p:spPr>
+        <p:txBody>
+          <a:bodyPr wrap="square" rtlCol="0">
+            <a:spAutoFit/>
+          </a:bodyPr>
+          <a:lstStyle/>
+          <a:p>
+            <a:r>
+              <a:rPr lang="en-US" sz="1200" b="1" dirty="0"/>
+              <a:t>Power Unit</a:t>
+            </a:r>
+            <a:endParaRPr lang="en-SG" sz="1200" b="1" dirty="0"/>
+          </a:p>
+        </p:txBody>
+      </p:sp>
+      <p:cxnSp>
+        <p:nvCxnSpPr>
+          <p:cNvPr id="28" name="Connector: Elbow 27">
+            <a:extLst>
+              <a:ext uri="{FF2B5EF4-FFF2-40B4-BE49-F238E27FC236}">
+                <a16:creationId xmlns:a16="http://schemas.microsoft.com/office/drawing/2014/main" id="{A2EA6981-93CF-9D67-8FD6-3BD51336EAEA}"/>
+              </a:ext>
+            </a:extLst>
+          </p:cNvPr>
+          <p:cNvCxnSpPr>
+            <a:cxnSpLocks/>
+            <a:stCxn id="7" idx="2"/>
+          </p:cNvCxnSpPr>
+          <p:nvPr/>
+        </p:nvCxnSpPr>
+        <p:spPr>
+          <a:xfrm rot="16200000" flipH="1">
+            <a:off x="2414008" y="3233746"/>
+            <a:ext cx="254991" cy="2444912"/>
+          </a:xfrm>
+          <a:prstGeom prst="bentConnector2">
+            <a:avLst/>
+          </a:prstGeom>
+        </p:spPr>
+        <p:style>
+          <a:lnRef idx="2">
+            <a:schemeClr val="dk1"/>
+          </a:lnRef>
+          <a:fillRef idx="0">
+            <a:schemeClr val="dk1"/>
+          </a:fillRef>
+          <a:effectRef idx="1">
+            <a:schemeClr val="dk1"/>
+          </a:effectRef>
+          <a:fontRef idx="minor">
+            <a:schemeClr val="tx1"/>
+          </a:fontRef>
+        </p:style>
+      </p:cxnSp>
+      <p:cxnSp>
+        <p:nvCxnSpPr>
+          <p:cNvPr id="30" name="Straight Connector 29">
+            <a:extLst>
+              <a:ext uri="{FF2B5EF4-FFF2-40B4-BE49-F238E27FC236}">
+                <a16:creationId xmlns:a16="http://schemas.microsoft.com/office/drawing/2014/main" id="{08ADA1C3-444A-A722-0A8F-3D98AEBF8C18}"/>
+              </a:ext>
+            </a:extLst>
+          </p:cNvPr>
+          <p:cNvCxnSpPr>
+            <a:stCxn id="10" idx="2"/>
+          </p:cNvCxnSpPr>
+          <p:nvPr/>
+        </p:nvCxnSpPr>
+        <p:spPr>
+          <a:xfrm>
+            <a:off x="2345915" y="4328706"/>
+            <a:ext cx="0" cy="254992"/>
+          </a:xfrm>
+          <a:prstGeom prst="line">
+            <a:avLst/>
+          </a:prstGeom>
+        </p:spPr>
+        <p:style>
+          <a:lnRef idx="2">
+            <a:schemeClr val="dk1"/>
+          </a:lnRef>
+          <a:fillRef idx="0">
+            <a:schemeClr val="dk1"/>
+          </a:fillRef>
+          <a:effectRef idx="1">
+            <a:schemeClr val="dk1"/>
+          </a:effectRef>
+          <a:fontRef idx="minor">
+            <a:schemeClr val="tx1"/>
+          </a:fontRef>
+        </p:style>
+      </p:cxnSp>
+      <p:cxnSp>
+        <p:nvCxnSpPr>
+          <p:cNvPr id="31" name="Straight Connector 30">
+            <a:extLst>
+              <a:ext uri="{FF2B5EF4-FFF2-40B4-BE49-F238E27FC236}">
+                <a16:creationId xmlns:a16="http://schemas.microsoft.com/office/drawing/2014/main" id="{BDDFDA80-E47F-113F-7792-D4651E326EFA}"/>
+              </a:ext>
+            </a:extLst>
+          </p:cNvPr>
+          <p:cNvCxnSpPr>
+            <a:cxnSpLocks/>
+            <a:stCxn id="13" idx="2"/>
+          </p:cNvCxnSpPr>
+          <p:nvPr/>
+        </p:nvCxnSpPr>
+        <p:spPr>
+          <a:xfrm>
+            <a:off x="3309398" y="4328705"/>
+            <a:ext cx="0" cy="254531"/>
+          </a:xfrm>
+          <a:prstGeom prst="line">
+            <a:avLst/>
+          </a:prstGeom>
+        </p:spPr>
+        <p:style>
+          <a:lnRef idx="2">
+            <a:schemeClr val="dk1"/>
+          </a:lnRef>
+          <a:fillRef idx="0">
+            <a:schemeClr val="dk1"/>
+          </a:fillRef>
+          <a:effectRef idx="1">
+            <a:schemeClr val="dk1"/>
+          </a:effectRef>
+          <a:fontRef idx="minor">
+            <a:schemeClr val="tx1"/>
+          </a:fontRef>
+        </p:style>
+      </p:cxnSp>
+      <p:cxnSp>
+        <p:nvCxnSpPr>
+          <p:cNvPr id="34" name="Straight Connector 33">
+            <a:extLst>
+              <a:ext uri="{FF2B5EF4-FFF2-40B4-BE49-F238E27FC236}">
+                <a16:creationId xmlns:a16="http://schemas.microsoft.com/office/drawing/2014/main" id="{D34C5B21-3A37-07BD-55C5-3B459AD481E7}"/>
+              </a:ext>
+            </a:extLst>
+          </p:cNvPr>
+          <p:cNvCxnSpPr>
+            <a:cxnSpLocks/>
+          </p:cNvCxnSpPr>
+          <p:nvPr/>
+        </p:nvCxnSpPr>
+        <p:spPr>
+          <a:xfrm flipH="1">
+            <a:off x="1312559" y="4583236"/>
+            <a:ext cx="0" cy="183392"/>
+          </a:xfrm>
+          <a:prstGeom prst="line">
+            <a:avLst/>
+          </a:prstGeom>
+        </p:spPr>
+        <p:style>
+          <a:lnRef idx="2">
+            <a:schemeClr val="dk1"/>
+          </a:lnRef>
+          <a:fillRef idx="0">
+            <a:schemeClr val="dk1"/>
+          </a:fillRef>
+          <a:effectRef idx="1">
+            <a:schemeClr val="dk1"/>
+          </a:effectRef>
+          <a:fontRef idx="minor">
+            <a:schemeClr val="tx1"/>
+          </a:fontRef>
+        </p:style>
+      </p:cxnSp>
+      <p:cxnSp>
+        <p:nvCxnSpPr>
+          <p:cNvPr id="36" name="Straight Connector 35">
+            <a:extLst>
+              <a:ext uri="{FF2B5EF4-FFF2-40B4-BE49-F238E27FC236}">
+                <a16:creationId xmlns:a16="http://schemas.microsoft.com/office/drawing/2014/main" id="{C4BBA968-CF89-EAE0-0133-FAAA26ADFE64}"/>
+              </a:ext>
+            </a:extLst>
+          </p:cNvPr>
+          <p:cNvCxnSpPr>
+            <a:cxnSpLocks/>
+            <a:endCxn id="16" idx="0"/>
+          </p:cNvCxnSpPr>
+          <p:nvPr/>
+        </p:nvCxnSpPr>
+        <p:spPr>
+          <a:xfrm flipH="1">
+            <a:off x="2314842" y="4576764"/>
+            <a:ext cx="0" cy="221763"/>
+          </a:xfrm>
+          <a:prstGeom prst="line">
+            <a:avLst/>
+          </a:prstGeom>
+        </p:spPr>
+        <p:style>
+          <a:lnRef idx="2">
+            <a:schemeClr val="dk1"/>
+          </a:lnRef>
+          <a:fillRef idx="0">
+            <a:schemeClr val="dk1"/>
+          </a:fillRef>
+          <a:effectRef idx="1">
+            <a:schemeClr val="dk1"/>
+          </a:effectRef>
+          <a:fontRef idx="minor">
+            <a:schemeClr val="tx1"/>
+          </a:fontRef>
+        </p:style>
+      </p:cxnSp>
+      <p:cxnSp>
+        <p:nvCxnSpPr>
+          <p:cNvPr id="39" name="Straight Connector 38">
+            <a:extLst>
+              <a:ext uri="{FF2B5EF4-FFF2-40B4-BE49-F238E27FC236}">
+                <a16:creationId xmlns:a16="http://schemas.microsoft.com/office/drawing/2014/main" id="{5AD5502D-DFCB-D51E-B3AC-F0E2DA7985E7}"/>
+              </a:ext>
+            </a:extLst>
+          </p:cNvPr>
+          <p:cNvCxnSpPr>
+            <a:cxnSpLocks/>
+            <a:endCxn id="24" idx="0"/>
+          </p:cNvCxnSpPr>
+          <p:nvPr/>
+        </p:nvCxnSpPr>
+        <p:spPr>
+          <a:xfrm flipH="1">
+            <a:off x="3270810" y="4583236"/>
+            <a:ext cx="0" cy="206190"/>
+          </a:xfrm>
+          <a:prstGeom prst="line">
+            <a:avLst/>
+          </a:prstGeom>
+        </p:spPr>
+        <p:style>
+          <a:lnRef idx="2">
+            <a:schemeClr val="dk1"/>
+          </a:lnRef>
+          <a:fillRef idx="0">
+            <a:schemeClr val="dk1"/>
+          </a:fillRef>
+          <a:effectRef idx="1">
+            <a:schemeClr val="dk1"/>
+          </a:effectRef>
+          <a:fontRef idx="minor">
+            <a:schemeClr val="tx1"/>
+          </a:fontRef>
+        </p:style>
+      </p:cxnSp>
+      <p:sp>
+        <p:nvSpPr>
+          <p:cNvPr id="43" name="Rectangle 42">
+            <a:extLst>
+              <a:ext uri="{FF2B5EF4-FFF2-40B4-BE49-F238E27FC236}">
+                <a16:creationId xmlns:a16="http://schemas.microsoft.com/office/drawing/2014/main" id="{7936CE23-B784-C485-55B3-F3F977C34EFF}"/>
+              </a:ext>
+            </a:extLst>
+          </p:cNvPr>
+          <p:cNvSpPr/>
+          <p:nvPr/>
+        </p:nvSpPr>
+        <p:spPr>
+          <a:xfrm>
+            <a:off x="3763959" y="2589254"/>
+            <a:ext cx="1187105" cy="543158"/>
+          </a:xfrm>
+          <a:prstGeom prst="rect">
+            <a:avLst/>
+          </a:prstGeom>
+          <a:solidFill>
+            <a:schemeClr val="accent2"/>
+          </a:solidFill>
+        </p:spPr>
+        <p:style>
+          <a:lnRef idx="2">
+            <a:schemeClr val="accent1">
+              <a:shade val="50000"/>
+            </a:schemeClr>
+          </a:lnRef>
+          <a:fillRef idx="1">
+            <a:schemeClr val="accent1"/>
+          </a:fillRef>
+          <a:effectRef idx="0">
+            <a:schemeClr val="accent1"/>
+          </a:effectRef>
+          <a:fontRef idx="minor">
+            <a:schemeClr val="lt1"/>
+          </a:fontRef>
+        </p:style>
+        <p:txBody>
+          <a:bodyPr rtlCol="0" anchor="ctr"/>
+          <a:lstStyle/>
+          <a:p>
+            <a:r>
+              <a:rPr lang="en-US" sz="1050" b="1" dirty="0"/>
+              <a:t>UDP Simulated  Electrical Signal RTU Input</a:t>
+            </a:r>
+            <a:endParaRPr lang="en-SG" sz="1050" b="1" dirty="0"/>
+          </a:p>
+        </p:txBody>
+      </p:sp>
+      <p:pic>
+        <p:nvPicPr>
+          <p:cNvPr id="45" name="Picture 44">
+            <a:extLst>
+              <a:ext uri="{FF2B5EF4-FFF2-40B4-BE49-F238E27FC236}">
+                <a16:creationId xmlns:a16="http://schemas.microsoft.com/office/drawing/2014/main" id="{A0A02168-7794-58A5-3EA7-23AC21B3B2B1}"/>
+              </a:ext>
+            </a:extLst>
+          </p:cNvPr>
+          <p:cNvPicPr>
+            <a:picLocks noChangeAspect="1"/>
+          </p:cNvPicPr>
+          <p:nvPr/>
+        </p:nvPicPr>
+        <p:blipFill>
+          <a:blip r:embed="rId8"/>
+          <a:stretch>
+            <a:fillRect/>
+          </a:stretch>
+        </p:blipFill>
+        <p:spPr>
+          <a:xfrm>
+            <a:off x="966750" y="2443558"/>
+            <a:ext cx="635020" cy="596141"/>
+          </a:xfrm>
+          <a:prstGeom prst="rect">
+            <a:avLst/>
+          </a:prstGeom>
+          <a:ln w="9525">
+            <a:solidFill>
+              <a:schemeClr val="tx1"/>
+            </a:solidFill>
+          </a:ln>
+        </p:spPr>
+      </p:pic>
+      <p:sp>
+        <p:nvSpPr>
+          <p:cNvPr id="47" name="Rectangle 46">
+            <a:extLst>
+              <a:ext uri="{FF2B5EF4-FFF2-40B4-BE49-F238E27FC236}">
+                <a16:creationId xmlns:a16="http://schemas.microsoft.com/office/drawing/2014/main" id="{28EDFDA0-9300-F494-EA4F-D0EDE6581CDA}"/>
+              </a:ext>
+            </a:extLst>
+          </p:cNvPr>
+          <p:cNvSpPr/>
+          <p:nvPr/>
+        </p:nvSpPr>
+        <p:spPr>
+          <a:xfrm>
+            <a:off x="3769035" y="4313826"/>
+            <a:ext cx="1187105" cy="543158"/>
+          </a:xfrm>
+          <a:prstGeom prst="rect">
+            <a:avLst/>
+          </a:prstGeom>
+          <a:solidFill>
+            <a:schemeClr val="accent2"/>
+          </a:solidFill>
+        </p:spPr>
+        <p:style>
+          <a:lnRef idx="2">
+            <a:schemeClr val="accent1">
+              <a:shade val="50000"/>
+            </a:schemeClr>
+          </a:lnRef>
+          <a:fillRef idx="1">
+            <a:schemeClr val="accent1"/>
+          </a:fillRef>
+          <a:effectRef idx="0">
+            <a:schemeClr val="accent1"/>
+          </a:effectRef>
+          <a:fontRef idx="minor">
+            <a:schemeClr val="lt1"/>
+          </a:fontRef>
+        </p:style>
+        <p:txBody>
+          <a:bodyPr rtlCol="0" anchor="ctr"/>
+          <a:lstStyle/>
+          <a:p>
+            <a:r>
+              <a:rPr lang="en-US" sz="1050" b="1" dirty="0"/>
+              <a:t>UDP Simulated  Electrical Signal RTU  Output </a:t>
+            </a:r>
+            <a:endParaRPr lang="en-SG" sz="1050" b="1" dirty="0"/>
+          </a:p>
+        </p:txBody>
+      </p:sp>
+      <p:sp>
+        <p:nvSpPr>
+          <p:cNvPr id="48" name="TextBox 47">
+            <a:extLst>
+              <a:ext uri="{FF2B5EF4-FFF2-40B4-BE49-F238E27FC236}">
+                <a16:creationId xmlns:a16="http://schemas.microsoft.com/office/drawing/2014/main" id="{35F7F9A7-BFF8-4BE3-8170-9CB5A71A21BE}"/>
+              </a:ext>
+            </a:extLst>
+          </p:cNvPr>
+          <p:cNvSpPr txBox="1"/>
+          <p:nvPr/>
+        </p:nvSpPr>
+        <p:spPr>
+          <a:xfrm>
+            <a:off x="843431" y="1973306"/>
+            <a:ext cx="1029421" cy="461665"/>
+          </a:xfrm>
+          <a:prstGeom prst="rect">
+            <a:avLst/>
+          </a:prstGeom>
+          <a:noFill/>
+        </p:spPr>
+        <p:txBody>
+          <a:bodyPr wrap="square" rtlCol="0">
+            <a:spAutoFit/>
+          </a:bodyPr>
+          <a:lstStyle/>
+          <a:p>
+            <a:r>
+              <a:rPr lang="en-US" sz="1200" b="1" dirty="0"/>
+              <a:t>Room Temp Sensor </a:t>
+            </a:r>
+            <a:endParaRPr lang="en-SG" sz="1200" b="1" dirty="0"/>
+          </a:p>
+        </p:txBody>
+      </p:sp>
+      <p:pic>
+        <p:nvPicPr>
+          <p:cNvPr id="50" name="Picture 49">
+            <a:extLst>
+              <a:ext uri="{FF2B5EF4-FFF2-40B4-BE49-F238E27FC236}">
+                <a16:creationId xmlns:a16="http://schemas.microsoft.com/office/drawing/2014/main" id="{E455C9A7-8C2F-FE9D-D321-A850D2A53AD4}"/>
+              </a:ext>
+            </a:extLst>
+          </p:cNvPr>
+          <p:cNvPicPr>
+            <a:picLocks noChangeAspect="1"/>
+          </p:cNvPicPr>
+          <p:nvPr/>
+        </p:nvPicPr>
+        <p:blipFill>
+          <a:blip r:embed="rId9"/>
+          <a:stretch>
+            <a:fillRect/>
+          </a:stretch>
+        </p:blipFill>
+        <p:spPr>
+          <a:xfrm>
+            <a:off x="1924722" y="2443558"/>
+            <a:ext cx="635020" cy="570343"/>
+          </a:xfrm>
+          <a:prstGeom prst="rect">
+            <a:avLst/>
+          </a:prstGeom>
+          <a:ln w="9525">
+            <a:solidFill>
+              <a:schemeClr val="tx1"/>
+            </a:solidFill>
+          </a:ln>
+        </p:spPr>
+      </p:pic>
+      <p:sp>
+        <p:nvSpPr>
+          <p:cNvPr id="51" name="TextBox 50">
+            <a:extLst>
+              <a:ext uri="{FF2B5EF4-FFF2-40B4-BE49-F238E27FC236}">
+                <a16:creationId xmlns:a16="http://schemas.microsoft.com/office/drawing/2014/main" id="{4CC778D8-CCCA-10A4-7D93-D251B3A78B78}"/>
+              </a:ext>
+            </a:extLst>
+          </p:cNvPr>
+          <p:cNvSpPr txBox="1"/>
+          <p:nvPr/>
+        </p:nvSpPr>
+        <p:spPr>
+          <a:xfrm>
+            <a:off x="1753718" y="1980656"/>
+            <a:ext cx="1289525" cy="461665"/>
+          </a:xfrm>
+          <a:prstGeom prst="rect">
+            <a:avLst/>
+          </a:prstGeom>
+          <a:noFill/>
+        </p:spPr>
+        <p:txBody>
+          <a:bodyPr wrap="square" rtlCol="0">
+            <a:spAutoFit/>
+          </a:bodyPr>
+          <a:lstStyle/>
+          <a:p>
+            <a:r>
+              <a:rPr lang="en-US" sz="1200" b="1" dirty="0"/>
+              <a:t>Room Humidity Sensor </a:t>
+            </a:r>
+            <a:endParaRPr lang="en-SG" sz="1200" b="1" dirty="0"/>
+          </a:p>
+        </p:txBody>
+      </p:sp>
+      <p:pic>
+        <p:nvPicPr>
+          <p:cNvPr id="53" name="Picture 52">
+            <a:extLst>
+              <a:ext uri="{FF2B5EF4-FFF2-40B4-BE49-F238E27FC236}">
+                <a16:creationId xmlns:a16="http://schemas.microsoft.com/office/drawing/2014/main" id="{DBCF5973-959A-325A-BB6E-4E6E35A76938}"/>
+              </a:ext>
+            </a:extLst>
+          </p:cNvPr>
+          <p:cNvPicPr>
+            <a:picLocks noChangeAspect="1"/>
+          </p:cNvPicPr>
+          <p:nvPr/>
+        </p:nvPicPr>
+        <p:blipFill>
+          <a:blip r:embed="rId10"/>
+          <a:stretch>
+            <a:fillRect/>
+          </a:stretch>
+        </p:blipFill>
+        <p:spPr>
+          <a:xfrm>
+            <a:off x="2924108" y="2402216"/>
+            <a:ext cx="635020" cy="635020"/>
+          </a:xfrm>
+          <a:prstGeom prst="rect">
+            <a:avLst/>
+          </a:prstGeom>
+          <a:ln w="9525">
+            <a:solidFill>
+              <a:schemeClr val="tx1"/>
+            </a:solidFill>
+          </a:ln>
+        </p:spPr>
+      </p:pic>
+      <p:sp>
+        <p:nvSpPr>
+          <p:cNvPr id="54" name="TextBox 53">
+            <a:extLst>
+              <a:ext uri="{FF2B5EF4-FFF2-40B4-BE49-F238E27FC236}">
+                <a16:creationId xmlns:a16="http://schemas.microsoft.com/office/drawing/2014/main" id="{E6C53178-38A7-8F13-0F16-FD8BBC2E0F59}"/>
+              </a:ext>
+            </a:extLst>
+          </p:cNvPr>
+          <p:cNvSpPr txBox="1"/>
+          <p:nvPr/>
+        </p:nvSpPr>
+        <p:spPr>
+          <a:xfrm>
+            <a:off x="2917671" y="1944933"/>
+            <a:ext cx="1008903" cy="461665"/>
+          </a:xfrm>
+          <a:prstGeom prst="rect">
+            <a:avLst/>
+          </a:prstGeom>
+          <a:noFill/>
+        </p:spPr>
+        <p:txBody>
+          <a:bodyPr wrap="square" rtlCol="0">
+            <a:spAutoFit/>
+          </a:bodyPr>
+          <a:lstStyle/>
+          <a:p>
+            <a:r>
+              <a:rPr lang="en-US" sz="1200" b="1" dirty="0"/>
+              <a:t>System OP</a:t>
+            </a:r>
+          </a:p>
+          <a:p>
+            <a:r>
+              <a:rPr lang="en-US" sz="1200" b="1" dirty="0"/>
+              <a:t>Sensors</a:t>
+            </a:r>
+            <a:endParaRPr lang="en-SG" sz="1200" b="1" dirty="0"/>
+          </a:p>
+        </p:txBody>
+      </p:sp>
+      <p:cxnSp>
+        <p:nvCxnSpPr>
+          <p:cNvPr id="56" name="Connector: Elbow 55">
+            <a:extLst>
+              <a:ext uri="{FF2B5EF4-FFF2-40B4-BE49-F238E27FC236}">
+                <a16:creationId xmlns:a16="http://schemas.microsoft.com/office/drawing/2014/main" id="{44801186-F328-A116-50AC-1FC36ED215D0}"/>
+              </a:ext>
+            </a:extLst>
+          </p:cNvPr>
+          <p:cNvCxnSpPr>
+            <a:cxnSpLocks/>
+            <a:endCxn id="53" idx="1"/>
+          </p:cNvCxnSpPr>
+          <p:nvPr/>
+        </p:nvCxnSpPr>
+        <p:spPr>
+          <a:xfrm rot="5400000" flipH="1" flipV="1">
+            <a:off x="1936312" y="3588968"/>
+            <a:ext cx="1857038" cy="118554"/>
+          </a:xfrm>
+          <a:prstGeom prst="bentConnector2">
+            <a:avLst/>
+          </a:prstGeom>
+        </p:spPr>
+        <p:style>
+          <a:lnRef idx="2">
+            <a:schemeClr val="dk1"/>
+          </a:lnRef>
+          <a:fillRef idx="0">
+            <a:schemeClr val="dk1"/>
+          </a:fillRef>
+          <a:effectRef idx="1">
+            <a:schemeClr val="dk1"/>
+          </a:effectRef>
+          <a:fontRef idx="minor">
+            <a:schemeClr val="tx1"/>
+          </a:fontRef>
+        </p:style>
+      </p:cxnSp>
+      <p:cxnSp>
+        <p:nvCxnSpPr>
+          <p:cNvPr id="59" name="Connector: Elbow 58">
+            <a:extLst>
+              <a:ext uri="{FF2B5EF4-FFF2-40B4-BE49-F238E27FC236}">
+                <a16:creationId xmlns:a16="http://schemas.microsoft.com/office/drawing/2014/main" id="{6E7BCFFE-EB2E-1E24-3C3D-FCCF507D373D}"/>
+              </a:ext>
+            </a:extLst>
+          </p:cNvPr>
+          <p:cNvCxnSpPr>
+            <a:stCxn id="45" idx="2"/>
+            <a:endCxn id="43" idx="1"/>
+          </p:cNvCxnSpPr>
+          <p:nvPr/>
+        </p:nvCxnSpPr>
+        <p:spPr>
+          <a:xfrm rot="5400000" flipH="1" flipV="1">
+            <a:off x="2434676" y="1710416"/>
+            <a:ext cx="178866" cy="2479699"/>
+          </a:xfrm>
+          <a:prstGeom prst="bentConnector4">
+            <a:avLst>
+              <a:gd name="adj1" fmla="val -168704"/>
+              <a:gd name="adj2" fmla="val 96965"/>
+            </a:avLst>
+          </a:prstGeom>
+        </p:spPr>
+        <p:style>
+          <a:lnRef idx="2">
+            <a:schemeClr val="accent2"/>
+          </a:lnRef>
+          <a:fillRef idx="0">
+            <a:schemeClr val="accent2"/>
+          </a:fillRef>
+          <a:effectRef idx="1">
+            <a:schemeClr val="accent2"/>
+          </a:effectRef>
+          <a:fontRef idx="minor">
+            <a:schemeClr val="tx1"/>
+          </a:fontRef>
+        </p:style>
+      </p:cxnSp>
+      <p:cxnSp>
+        <p:nvCxnSpPr>
+          <p:cNvPr id="63" name="Straight Connector 62">
+            <a:extLst>
+              <a:ext uri="{FF2B5EF4-FFF2-40B4-BE49-F238E27FC236}">
+                <a16:creationId xmlns:a16="http://schemas.microsoft.com/office/drawing/2014/main" id="{285F7552-D3C2-9DD2-B319-323F84F3A299}"/>
+              </a:ext>
+            </a:extLst>
+          </p:cNvPr>
+          <p:cNvCxnSpPr>
+            <a:stCxn id="50" idx="2"/>
+          </p:cNvCxnSpPr>
+          <p:nvPr/>
+        </p:nvCxnSpPr>
+        <p:spPr>
+          <a:xfrm>
+            <a:off x="2242232" y="3013901"/>
+            <a:ext cx="0" cy="332803"/>
+          </a:xfrm>
+          <a:prstGeom prst="line">
+            <a:avLst/>
+          </a:prstGeom>
+        </p:spPr>
+        <p:style>
+          <a:lnRef idx="2">
+            <a:schemeClr val="accent2"/>
+          </a:lnRef>
+          <a:fillRef idx="0">
+            <a:schemeClr val="accent2"/>
+          </a:fillRef>
+          <a:effectRef idx="1">
+            <a:schemeClr val="accent2"/>
+          </a:effectRef>
+          <a:fontRef idx="minor">
+            <a:schemeClr val="tx1"/>
+          </a:fontRef>
+        </p:style>
+      </p:cxnSp>
+      <p:cxnSp>
+        <p:nvCxnSpPr>
+          <p:cNvPr id="64" name="Straight Connector 63">
+            <a:extLst>
+              <a:ext uri="{FF2B5EF4-FFF2-40B4-BE49-F238E27FC236}">
+                <a16:creationId xmlns:a16="http://schemas.microsoft.com/office/drawing/2014/main" id="{7B1296FD-8899-F46E-3BFE-F06BFA0DCC70}"/>
+              </a:ext>
+            </a:extLst>
+          </p:cNvPr>
+          <p:cNvCxnSpPr>
+            <a:cxnSpLocks/>
+          </p:cNvCxnSpPr>
+          <p:nvPr/>
+        </p:nvCxnSpPr>
+        <p:spPr>
+          <a:xfrm>
+            <a:off x="3249666" y="3037236"/>
+            <a:ext cx="0" cy="309468"/>
+          </a:xfrm>
+          <a:prstGeom prst="line">
+            <a:avLst/>
+          </a:prstGeom>
+        </p:spPr>
+        <p:style>
+          <a:lnRef idx="2">
+            <a:schemeClr val="accent2"/>
+          </a:lnRef>
+          <a:fillRef idx="0">
+            <a:schemeClr val="accent2"/>
+          </a:fillRef>
+          <a:effectRef idx="1">
+            <a:schemeClr val="accent2"/>
+          </a:effectRef>
+          <a:fontRef idx="minor">
+            <a:schemeClr val="tx1"/>
+          </a:fontRef>
+        </p:style>
+      </p:cxnSp>
+      <p:sp>
+        <p:nvSpPr>
+          <p:cNvPr id="67" name="TextBox 66">
+            <a:extLst>
+              <a:ext uri="{FF2B5EF4-FFF2-40B4-BE49-F238E27FC236}">
+                <a16:creationId xmlns:a16="http://schemas.microsoft.com/office/drawing/2014/main" id="{E83D0994-FFC7-B371-BE19-4F804F4F3BC3}"/>
+              </a:ext>
+            </a:extLst>
+          </p:cNvPr>
+          <p:cNvSpPr txBox="1"/>
+          <p:nvPr/>
+        </p:nvSpPr>
+        <p:spPr>
+          <a:xfrm>
+            <a:off x="4547915" y="1344194"/>
+            <a:ext cx="2732878" cy="523220"/>
+          </a:xfrm>
+          <a:prstGeom prst="rect">
+            <a:avLst/>
+          </a:prstGeom>
+          <a:noFill/>
+        </p:spPr>
+        <p:txBody>
+          <a:bodyPr wrap="square" rtlCol="0">
+            <a:spAutoFit/>
+          </a:bodyPr>
+          <a:lstStyle/>
+          <a:p>
+            <a:r>
+              <a:rPr lang="en-US" sz="1400" b="1" dirty="0">
+                <a:solidFill>
+                  <a:schemeClr val="accent6">
+                    <a:lumMod val="50000"/>
+                  </a:schemeClr>
+                </a:solidFill>
+              </a:rPr>
+              <a:t>BACnet HVAC RTU Simulation Framework</a:t>
+            </a:r>
+            <a:endParaRPr lang="en-SG" sz="1400" b="1" dirty="0">
+              <a:solidFill>
+                <a:schemeClr val="accent6">
+                  <a:lumMod val="50000"/>
+                </a:schemeClr>
+              </a:solidFill>
+            </a:endParaRPr>
+          </a:p>
+        </p:txBody>
+      </p:sp>
+      <p:sp>
+        <p:nvSpPr>
+          <p:cNvPr id="68" name="TextBox 67">
+            <a:extLst>
+              <a:ext uri="{FF2B5EF4-FFF2-40B4-BE49-F238E27FC236}">
+                <a16:creationId xmlns:a16="http://schemas.microsoft.com/office/drawing/2014/main" id="{785B9271-91E4-96A0-FFD7-67E7E3B97AB1}"/>
+              </a:ext>
+            </a:extLst>
+          </p:cNvPr>
+          <p:cNvSpPr txBox="1"/>
+          <p:nvPr/>
+        </p:nvSpPr>
+        <p:spPr>
+          <a:xfrm>
+            <a:off x="4396189" y="902222"/>
+            <a:ext cx="2884604" cy="307777"/>
+          </a:xfrm>
+          <a:prstGeom prst="rect">
+            <a:avLst/>
+          </a:prstGeom>
+          <a:noFill/>
+        </p:spPr>
+        <p:txBody>
+          <a:bodyPr wrap="square" rtlCol="0">
+            <a:spAutoFit/>
+          </a:bodyPr>
+          <a:lstStyle/>
+          <a:p>
+            <a:r>
+              <a:rPr lang="en-US" sz="1400" b="1" dirty="0"/>
+              <a:t>Level1 OT Controller Devices </a:t>
+            </a:r>
+            <a:endParaRPr lang="en-SG" sz="1400" b="1" dirty="0"/>
+          </a:p>
+        </p:txBody>
+      </p:sp>
+      <p:sp>
+        <p:nvSpPr>
+          <p:cNvPr id="69" name="Rectangle 68">
+            <a:extLst>
+              <a:ext uri="{FF2B5EF4-FFF2-40B4-BE49-F238E27FC236}">
+                <a16:creationId xmlns:a16="http://schemas.microsoft.com/office/drawing/2014/main" id="{13B1F21D-3FFF-311D-0F28-364F99BC07E2}"/>
+              </a:ext>
+            </a:extLst>
+          </p:cNvPr>
+          <p:cNvSpPr/>
+          <p:nvPr/>
+        </p:nvSpPr>
+        <p:spPr>
+          <a:xfrm>
+            <a:off x="5167544" y="2323810"/>
+            <a:ext cx="1627509" cy="295727"/>
+          </a:xfrm>
+          <a:prstGeom prst="rect">
+            <a:avLst/>
+          </a:prstGeom>
+          <a:solidFill>
+            <a:schemeClr val="accent6">
+              <a:lumMod val="75000"/>
+            </a:schemeClr>
+          </a:solidFill>
+          <a:ln>
+            <a:solidFill>
+              <a:schemeClr val="tx1"/>
+            </a:solidFill>
+          </a:ln>
+        </p:spPr>
+        <p:style>
+          <a:lnRef idx="2">
+            <a:schemeClr val="accent1">
+              <a:shade val="50000"/>
+            </a:schemeClr>
+          </a:lnRef>
+          <a:fillRef idx="1">
+            <a:schemeClr val="accent1"/>
+          </a:fillRef>
+          <a:effectRef idx="0">
+            <a:schemeClr val="accent1"/>
+          </a:effectRef>
+          <a:fontRef idx="minor">
+            <a:schemeClr val="lt1"/>
+          </a:fontRef>
+        </p:style>
+        <p:txBody>
+          <a:bodyPr rtlCol="0" anchor="ctr"/>
+          <a:lstStyle/>
+          <a:p>
+            <a:pPr algn="ctr"/>
+            <a:r>
+              <a:rPr lang="en-US" sz="1050" b="1" dirty="0"/>
+              <a:t>BAC  Input Objects [R] </a:t>
+            </a:r>
+            <a:endParaRPr lang="en-SG" sz="1050" b="1" dirty="0"/>
+          </a:p>
+        </p:txBody>
+      </p:sp>
+      <p:sp>
+        <p:nvSpPr>
+          <p:cNvPr id="73" name="Rectangle 72">
+            <a:extLst>
+              <a:ext uri="{FF2B5EF4-FFF2-40B4-BE49-F238E27FC236}">
+                <a16:creationId xmlns:a16="http://schemas.microsoft.com/office/drawing/2014/main" id="{59E975E3-A302-4742-D3FF-AD860728FC10}"/>
+              </a:ext>
+            </a:extLst>
+          </p:cNvPr>
+          <p:cNvSpPr/>
+          <p:nvPr/>
+        </p:nvSpPr>
+        <p:spPr>
+          <a:xfrm>
+            <a:off x="6446017" y="1808164"/>
+            <a:ext cx="1077844" cy="281016"/>
+          </a:xfrm>
+          <a:prstGeom prst="rect">
+            <a:avLst/>
+          </a:prstGeom>
+          <a:solidFill>
+            <a:schemeClr val="accent2"/>
+          </a:solidFill>
+        </p:spPr>
+        <p:style>
+          <a:lnRef idx="2">
+            <a:schemeClr val="accent1">
+              <a:shade val="50000"/>
+            </a:schemeClr>
+          </a:lnRef>
+          <a:fillRef idx="1">
+            <a:schemeClr val="accent1"/>
+          </a:fillRef>
+          <a:effectRef idx="0">
+            <a:schemeClr val="accent1"/>
+          </a:effectRef>
+          <a:fontRef idx="minor">
+            <a:schemeClr val="lt1"/>
+          </a:fontRef>
+        </p:style>
+        <p:txBody>
+          <a:bodyPr rtlCol="0" anchor="ctr"/>
+          <a:lstStyle/>
+          <a:p>
+            <a:r>
+              <a:rPr lang="en-US" sz="1050" b="1" dirty="0"/>
+              <a:t>BACnet Server </a:t>
+            </a:r>
+            <a:endParaRPr lang="en-SG" sz="1050" b="1" dirty="0"/>
+          </a:p>
+        </p:txBody>
+      </p:sp>
+      <p:sp>
+        <p:nvSpPr>
+          <p:cNvPr id="80" name="Rectangle 79">
+            <a:extLst>
+              <a:ext uri="{FF2B5EF4-FFF2-40B4-BE49-F238E27FC236}">
+                <a16:creationId xmlns:a16="http://schemas.microsoft.com/office/drawing/2014/main" id="{410193F1-FCF7-0996-4AFD-5FEB7922A1DC}"/>
+              </a:ext>
+            </a:extLst>
+          </p:cNvPr>
+          <p:cNvSpPr/>
+          <p:nvPr/>
+        </p:nvSpPr>
+        <p:spPr>
+          <a:xfrm>
+            <a:off x="5155895" y="2802401"/>
+            <a:ext cx="1660432" cy="295727"/>
+          </a:xfrm>
+          <a:prstGeom prst="rect">
+            <a:avLst/>
+          </a:prstGeom>
+          <a:solidFill>
+            <a:schemeClr val="accent6">
+              <a:lumMod val="75000"/>
+            </a:schemeClr>
+          </a:solidFill>
+          <a:ln>
+            <a:solidFill>
+              <a:schemeClr val="tx1"/>
+            </a:solidFill>
+          </a:ln>
+        </p:spPr>
+        <p:style>
+          <a:lnRef idx="2">
+            <a:schemeClr val="accent1">
+              <a:shade val="50000"/>
+            </a:schemeClr>
+          </a:lnRef>
+          <a:fillRef idx="1">
+            <a:schemeClr val="accent1"/>
+          </a:fillRef>
+          <a:effectRef idx="0">
+            <a:schemeClr val="accent1"/>
+          </a:effectRef>
+          <a:fontRef idx="minor">
+            <a:schemeClr val="lt1"/>
+          </a:fontRef>
+        </p:style>
+        <p:txBody>
+          <a:bodyPr rtlCol="0" anchor="ctr"/>
+          <a:lstStyle/>
+          <a:p>
+            <a:pPr algn="ctr"/>
+            <a:r>
+              <a:rPr lang="en-US" sz="1050" b="1" dirty="0"/>
+              <a:t>BAC Analog Objects [R]</a:t>
+            </a:r>
+            <a:endParaRPr lang="en-SG" sz="1050" b="1" dirty="0"/>
+          </a:p>
+        </p:txBody>
+      </p:sp>
+      <p:pic>
+        <p:nvPicPr>
+          <p:cNvPr id="82" name="Picture 81">
+            <a:extLst>
+              <a:ext uri="{FF2B5EF4-FFF2-40B4-BE49-F238E27FC236}">
+                <a16:creationId xmlns:a16="http://schemas.microsoft.com/office/drawing/2014/main" id="{0C4944A4-AC6E-C358-AD9C-F8CDE9B6C9A5}"/>
+              </a:ext>
+            </a:extLst>
+          </p:cNvPr>
+          <p:cNvPicPr>
+            <a:picLocks noChangeAspect="1"/>
+          </p:cNvPicPr>
+          <p:nvPr/>
+        </p:nvPicPr>
+        <p:blipFill>
+          <a:blip r:embed="rId11"/>
+          <a:stretch>
+            <a:fillRect/>
+          </a:stretch>
+        </p:blipFill>
+        <p:spPr>
+          <a:xfrm>
+            <a:off x="5309054" y="3463704"/>
+            <a:ext cx="762864" cy="663898"/>
+          </a:xfrm>
+          <a:prstGeom prst="rect">
+            <a:avLst/>
+          </a:prstGeom>
+          <a:ln w="19050">
+            <a:solidFill>
+              <a:schemeClr val="tx1"/>
+            </a:solidFill>
+          </a:ln>
+        </p:spPr>
+      </p:pic>
+      <p:cxnSp>
+        <p:nvCxnSpPr>
+          <p:cNvPr id="84" name="Straight Arrow Connector 83">
+            <a:extLst>
+              <a:ext uri="{FF2B5EF4-FFF2-40B4-BE49-F238E27FC236}">
+                <a16:creationId xmlns:a16="http://schemas.microsoft.com/office/drawing/2014/main" id="{4D271E74-DEAC-DBC5-E155-98AC307DE59C}"/>
+              </a:ext>
+            </a:extLst>
+          </p:cNvPr>
+          <p:cNvCxnSpPr>
+            <a:cxnSpLocks/>
+          </p:cNvCxnSpPr>
+          <p:nvPr/>
+        </p:nvCxnSpPr>
+        <p:spPr>
+          <a:xfrm>
+            <a:off x="5565202" y="3098128"/>
+            <a:ext cx="0" cy="316611"/>
+          </a:xfrm>
+          <a:prstGeom prst="straightConnector1">
+            <a:avLst/>
+          </a:prstGeom>
+          <a:ln>
+            <a:prstDash val="sysDash"/>
+            <a:tailEnd type="triangle"/>
+          </a:ln>
+        </p:spPr>
+        <p:style>
+          <a:lnRef idx="2">
+            <a:schemeClr val="dk1"/>
+          </a:lnRef>
+          <a:fillRef idx="0">
+            <a:schemeClr val="dk1"/>
+          </a:fillRef>
+          <a:effectRef idx="1">
+            <a:schemeClr val="dk1"/>
+          </a:effectRef>
+          <a:fontRef idx="minor">
+            <a:schemeClr val="tx1"/>
+          </a:fontRef>
+        </p:style>
+      </p:cxnSp>
+      <p:sp>
+        <p:nvSpPr>
+          <p:cNvPr id="85" name="Rectangle 84">
+            <a:extLst>
+              <a:ext uri="{FF2B5EF4-FFF2-40B4-BE49-F238E27FC236}">
+                <a16:creationId xmlns:a16="http://schemas.microsoft.com/office/drawing/2014/main" id="{CCF8B580-F10B-631A-B37B-F25334061A92}"/>
+              </a:ext>
+            </a:extLst>
+          </p:cNvPr>
+          <p:cNvSpPr/>
+          <p:nvPr/>
+        </p:nvSpPr>
+        <p:spPr>
+          <a:xfrm>
+            <a:off x="5225918" y="4460716"/>
+            <a:ext cx="1668722" cy="295727"/>
+          </a:xfrm>
+          <a:prstGeom prst="rect">
+            <a:avLst/>
+          </a:prstGeom>
+          <a:solidFill>
+            <a:schemeClr val="accent6">
+              <a:lumMod val="75000"/>
+            </a:schemeClr>
+          </a:solidFill>
+          <a:ln>
+            <a:solidFill>
+              <a:schemeClr val="tx1"/>
+            </a:solidFill>
+          </a:ln>
+        </p:spPr>
+        <p:style>
+          <a:lnRef idx="2">
+            <a:schemeClr val="accent1">
+              <a:shade val="50000"/>
+            </a:schemeClr>
+          </a:lnRef>
+          <a:fillRef idx="1">
+            <a:schemeClr val="accent1"/>
+          </a:fillRef>
+          <a:effectRef idx="0">
+            <a:schemeClr val="accent1"/>
+          </a:effectRef>
+          <a:fontRef idx="minor">
+            <a:schemeClr val="lt1"/>
+          </a:fontRef>
+        </p:style>
+        <p:txBody>
+          <a:bodyPr rtlCol="0" anchor="ctr"/>
+          <a:lstStyle/>
+          <a:p>
+            <a:pPr algn="ctr"/>
+            <a:r>
+              <a:rPr lang="en-US" sz="1050" b="1" dirty="0"/>
+              <a:t>BAC Output Objects [W] </a:t>
+            </a:r>
+            <a:endParaRPr lang="en-SG" sz="1050" b="1" dirty="0"/>
+          </a:p>
+        </p:txBody>
+      </p:sp>
+      <p:cxnSp>
+        <p:nvCxnSpPr>
+          <p:cNvPr id="118" name="Straight Connector 117">
+            <a:extLst>
+              <a:ext uri="{FF2B5EF4-FFF2-40B4-BE49-F238E27FC236}">
+                <a16:creationId xmlns:a16="http://schemas.microsoft.com/office/drawing/2014/main" id="{F09589C9-9FFB-B9B3-97C0-16FA1BAA3988}"/>
+              </a:ext>
+            </a:extLst>
+          </p:cNvPr>
+          <p:cNvCxnSpPr>
+            <a:cxnSpLocks/>
+          </p:cNvCxnSpPr>
+          <p:nvPr/>
+        </p:nvCxnSpPr>
+        <p:spPr>
+          <a:xfrm>
+            <a:off x="7063098" y="2098324"/>
+            <a:ext cx="0" cy="2977643"/>
+          </a:xfrm>
+          <a:prstGeom prst="line">
+            <a:avLst/>
+          </a:prstGeom>
+          <a:ln>
+            <a:solidFill>
+              <a:schemeClr val="tx1"/>
+            </a:solidFill>
+            <a:prstDash val="sysDash"/>
+          </a:ln>
+        </p:spPr>
+        <p:style>
+          <a:lnRef idx="2">
+            <a:schemeClr val="accent1"/>
+          </a:lnRef>
+          <a:fillRef idx="0">
+            <a:schemeClr val="accent1"/>
+          </a:fillRef>
+          <a:effectRef idx="1">
+            <a:schemeClr val="accent1"/>
+          </a:effectRef>
+          <a:fontRef idx="minor">
+            <a:schemeClr val="tx1"/>
+          </a:fontRef>
+        </p:style>
+      </p:cxnSp>
+      <p:sp>
+        <p:nvSpPr>
+          <p:cNvPr id="125" name="TextBox 124">
+            <a:extLst>
+              <a:ext uri="{FF2B5EF4-FFF2-40B4-BE49-F238E27FC236}">
+                <a16:creationId xmlns:a16="http://schemas.microsoft.com/office/drawing/2014/main" id="{587F13EF-BB40-8784-CA1E-3F7F9B4EDF0E}"/>
+              </a:ext>
+            </a:extLst>
+          </p:cNvPr>
+          <p:cNvSpPr txBox="1"/>
+          <p:nvPr/>
+        </p:nvSpPr>
+        <p:spPr>
+          <a:xfrm>
+            <a:off x="594002" y="913025"/>
+            <a:ext cx="3211175" cy="307777"/>
+          </a:xfrm>
+          <a:prstGeom prst="rect">
+            <a:avLst/>
+          </a:prstGeom>
+          <a:noFill/>
+        </p:spPr>
+        <p:txBody>
+          <a:bodyPr wrap="square" rtlCol="0">
+            <a:spAutoFit/>
+          </a:bodyPr>
+          <a:lstStyle/>
+          <a:p>
+            <a:r>
+              <a:rPr lang="en-US" sz="1400" b="1" dirty="0"/>
+              <a:t>Level0 OT Physical Field I/O Devices </a:t>
+            </a:r>
+            <a:endParaRPr lang="en-SG" sz="1400" b="1" dirty="0"/>
+          </a:p>
+        </p:txBody>
+      </p:sp>
+      <p:cxnSp>
+        <p:nvCxnSpPr>
+          <p:cNvPr id="128" name="Connector: Elbow 127">
+            <a:extLst>
+              <a:ext uri="{FF2B5EF4-FFF2-40B4-BE49-F238E27FC236}">
+                <a16:creationId xmlns:a16="http://schemas.microsoft.com/office/drawing/2014/main" id="{6D873836-042B-9484-0DD9-AF0C3451A2E5}"/>
+              </a:ext>
+            </a:extLst>
+          </p:cNvPr>
+          <p:cNvCxnSpPr>
+            <a:cxnSpLocks/>
+            <a:stCxn id="43" idx="3"/>
+            <a:endCxn id="69" idx="1"/>
+          </p:cNvCxnSpPr>
+          <p:nvPr/>
+        </p:nvCxnSpPr>
+        <p:spPr>
+          <a:xfrm flipV="1">
+            <a:off x="4951064" y="2471674"/>
+            <a:ext cx="216480" cy="389159"/>
+          </a:xfrm>
+          <a:prstGeom prst="bentConnector3">
+            <a:avLst/>
+          </a:prstGeom>
+        </p:spPr>
+        <p:style>
+          <a:lnRef idx="2">
+            <a:schemeClr val="accent1"/>
+          </a:lnRef>
+          <a:fillRef idx="0">
+            <a:schemeClr val="accent1"/>
+          </a:fillRef>
+          <a:effectRef idx="1">
+            <a:schemeClr val="accent1"/>
+          </a:effectRef>
+          <a:fontRef idx="minor">
+            <a:schemeClr val="tx1"/>
+          </a:fontRef>
+        </p:style>
+      </p:cxnSp>
+      <p:cxnSp>
+        <p:nvCxnSpPr>
+          <p:cNvPr id="129" name="Connector: Elbow 128">
+            <a:extLst>
+              <a:ext uri="{FF2B5EF4-FFF2-40B4-BE49-F238E27FC236}">
+                <a16:creationId xmlns:a16="http://schemas.microsoft.com/office/drawing/2014/main" id="{F6590D67-DF94-127E-8AF7-7E585D1F315C}"/>
+              </a:ext>
+            </a:extLst>
+          </p:cNvPr>
+          <p:cNvCxnSpPr>
+            <a:cxnSpLocks/>
+            <a:stCxn id="43" idx="3"/>
+            <a:endCxn id="80" idx="1"/>
+          </p:cNvCxnSpPr>
+          <p:nvPr/>
+        </p:nvCxnSpPr>
+        <p:spPr>
+          <a:xfrm>
+            <a:off x="4951064" y="2860833"/>
+            <a:ext cx="204831" cy="89432"/>
+          </a:xfrm>
+          <a:prstGeom prst="bentConnector3">
+            <a:avLst/>
+          </a:prstGeom>
+        </p:spPr>
+        <p:style>
+          <a:lnRef idx="2">
+            <a:schemeClr val="accent1"/>
+          </a:lnRef>
+          <a:fillRef idx="0">
+            <a:schemeClr val="accent1"/>
+          </a:fillRef>
+          <a:effectRef idx="1">
+            <a:schemeClr val="accent1"/>
+          </a:effectRef>
+          <a:fontRef idx="minor">
+            <a:schemeClr val="tx1"/>
+          </a:fontRef>
+        </p:style>
+      </p:cxnSp>
+      <p:cxnSp>
+        <p:nvCxnSpPr>
+          <p:cNvPr id="140" name="Straight Arrow Connector 139">
+            <a:extLst>
+              <a:ext uri="{FF2B5EF4-FFF2-40B4-BE49-F238E27FC236}">
+                <a16:creationId xmlns:a16="http://schemas.microsoft.com/office/drawing/2014/main" id="{1E0484F0-F943-2911-B04A-E1A91B05D9CF}"/>
+              </a:ext>
+            </a:extLst>
+          </p:cNvPr>
+          <p:cNvCxnSpPr>
+            <a:cxnSpLocks/>
+          </p:cNvCxnSpPr>
+          <p:nvPr/>
+        </p:nvCxnSpPr>
+        <p:spPr>
+          <a:xfrm>
+            <a:off x="5565202" y="4139359"/>
+            <a:ext cx="0" cy="316611"/>
+          </a:xfrm>
+          <a:prstGeom prst="straightConnector1">
+            <a:avLst/>
+          </a:prstGeom>
+          <a:ln>
+            <a:prstDash val="sysDash"/>
+            <a:tailEnd type="triangle"/>
+          </a:ln>
+        </p:spPr>
+        <p:style>
+          <a:lnRef idx="2">
+            <a:schemeClr val="dk1"/>
+          </a:lnRef>
+          <a:fillRef idx="0">
+            <a:schemeClr val="dk1"/>
+          </a:fillRef>
+          <a:effectRef idx="1">
+            <a:schemeClr val="dk1"/>
+          </a:effectRef>
+          <a:fontRef idx="minor">
+            <a:schemeClr val="tx1"/>
+          </a:fontRef>
+        </p:style>
+      </p:cxnSp>
+      <p:cxnSp>
+        <p:nvCxnSpPr>
+          <p:cNvPr id="141" name="Connector: Elbow 140">
+            <a:extLst>
+              <a:ext uri="{FF2B5EF4-FFF2-40B4-BE49-F238E27FC236}">
+                <a16:creationId xmlns:a16="http://schemas.microsoft.com/office/drawing/2014/main" id="{A2DDB0E7-DFA4-D5BF-E084-D3F78877A55D}"/>
+              </a:ext>
+            </a:extLst>
+          </p:cNvPr>
+          <p:cNvCxnSpPr>
+            <a:cxnSpLocks/>
+            <a:stCxn id="47" idx="3"/>
+            <a:endCxn id="83" idx="1"/>
+          </p:cNvCxnSpPr>
+          <p:nvPr/>
+        </p:nvCxnSpPr>
+        <p:spPr>
+          <a:xfrm>
+            <a:off x="4956140" y="4585405"/>
+            <a:ext cx="262965" cy="481418"/>
+          </a:xfrm>
+          <a:prstGeom prst="bentConnector3">
+            <a:avLst>
+              <a:gd name="adj1" fmla="val 50000"/>
+            </a:avLst>
+          </a:prstGeom>
+        </p:spPr>
+        <p:style>
+          <a:lnRef idx="2">
+            <a:schemeClr val="accent1"/>
+          </a:lnRef>
+          <a:fillRef idx="0">
+            <a:schemeClr val="accent1"/>
+          </a:fillRef>
+          <a:effectRef idx="1">
+            <a:schemeClr val="accent1"/>
+          </a:effectRef>
+          <a:fontRef idx="minor">
+            <a:schemeClr val="tx1"/>
+          </a:fontRef>
+        </p:style>
+      </p:cxnSp>
+      <p:cxnSp>
+        <p:nvCxnSpPr>
+          <p:cNvPr id="144" name="Straight Connector 143">
+            <a:extLst>
+              <a:ext uri="{FF2B5EF4-FFF2-40B4-BE49-F238E27FC236}">
+                <a16:creationId xmlns:a16="http://schemas.microsoft.com/office/drawing/2014/main" id="{0146575D-3CEF-BC28-64A1-D6E8A64BE166}"/>
+              </a:ext>
+            </a:extLst>
+          </p:cNvPr>
+          <p:cNvCxnSpPr>
+            <a:cxnSpLocks/>
+          </p:cNvCxnSpPr>
+          <p:nvPr/>
+        </p:nvCxnSpPr>
+        <p:spPr>
+          <a:xfrm flipV="1">
+            <a:off x="5075122" y="4590292"/>
+            <a:ext cx="141652" cy="0"/>
+          </a:xfrm>
+          <a:prstGeom prst="line">
+            <a:avLst/>
+          </a:prstGeom>
+        </p:spPr>
+        <p:style>
+          <a:lnRef idx="2">
+            <a:schemeClr val="dk1"/>
+          </a:lnRef>
+          <a:fillRef idx="0">
+            <a:schemeClr val="dk1"/>
+          </a:fillRef>
+          <a:effectRef idx="1">
+            <a:schemeClr val="dk1"/>
+          </a:effectRef>
+          <a:fontRef idx="minor">
+            <a:schemeClr val="tx1"/>
+          </a:fontRef>
+        </p:style>
+      </p:cxnSp>
+      <p:sp>
+        <p:nvSpPr>
+          <p:cNvPr id="147" name="TextBox 146">
+            <a:extLst>
+              <a:ext uri="{FF2B5EF4-FFF2-40B4-BE49-F238E27FC236}">
+                <a16:creationId xmlns:a16="http://schemas.microsoft.com/office/drawing/2014/main" id="{1F3F8CEA-5153-AC11-AF51-CD52A1B03C19}"/>
+              </a:ext>
+            </a:extLst>
+          </p:cNvPr>
+          <p:cNvSpPr txBox="1"/>
+          <p:nvPr/>
+        </p:nvSpPr>
+        <p:spPr>
+          <a:xfrm>
+            <a:off x="4791610" y="2034959"/>
+            <a:ext cx="1539240" cy="276999"/>
+          </a:xfrm>
+          <a:prstGeom prst="rect">
+            <a:avLst/>
+          </a:prstGeom>
+          <a:noFill/>
+        </p:spPr>
+        <p:txBody>
+          <a:bodyPr wrap="square" rtlCol="0">
+            <a:spAutoFit/>
+          </a:bodyPr>
+          <a:lstStyle/>
+          <a:p>
+            <a:r>
+              <a:rPr lang="en-US" sz="1200" b="1" dirty="0"/>
+              <a:t>RTU input variables</a:t>
+            </a:r>
+            <a:endParaRPr lang="en-SG" sz="1200" b="1" dirty="0"/>
+          </a:p>
+        </p:txBody>
+      </p:sp>
+      <p:sp>
+        <p:nvSpPr>
+          <p:cNvPr id="148" name="TextBox 147">
+            <a:extLst>
+              <a:ext uri="{FF2B5EF4-FFF2-40B4-BE49-F238E27FC236}">
+                <a16:creationId xmlns:a16="http://schemas.microsoft.com/office/drawing/2014/main" id="{C0089D7C-7E8D-AD1C-D162-A3C3BE67C8FF}"/>
+              </a:ext>
+            </a:extLst>
+          </p:cNvPr>
+          <p:cNvSpPr txBox="1"/>
+          <p:nvPr/>
+        </p:nvSpPr>
+        <p:spPr>
+          <a:xfrm>
+            <a:off x="6060633" y="3433582"/>
+            <a:ext cx="875441" cy="646331"/>
+          </a:xfrm>
+          <a:prstGeom prst="rect">
+            <a:avLst/>
+          </a:prstGeom>
+          <a:noFill/>
+        </p:spPr>
+        <p:txBody>
+          <a:bodyPr wrap="square" rtlCol="0">
+            <a:spAutoFit/>
+          </a:bodyPr>
+          <a:lstStyle/>
+          <a:p>
+            <a:r>
+              <a:rPr lang="en-US" sz="1200" b="1" dirty="0"/>
+              <a:t>HVA Auto</a:t>
+            </a:r>
+          </a:p>
+          <a:p>
+            <a:r>
+              <a:rPr lang="en-US" sz="1200" b="1" dirty="0"/>
+              <a:t>Control </a:t>
+            </a:r>
+          </a:p>
+          <a:p>
+            <a:r>
+              <a:rPr lang="en-US" sz="1200" b="1" dirty="0"/>
+              <a:t>Logic</a:t>
+            </a:r>
+            <a:endParaRPr lang="en-SG" sz="1200" b="1" dirty="0"/>
+          </a:p>
+        </p:txBody>
+      </p:sp>
+      <p:sp>
+        <p:nvSpPr>
+          <p:cNvPr id="149" name="TextBox 148">
+            <a:extLst>
+              <a:ext uri="{FF2B5EF4-FFF2-40B4-BE49-F238E27FC236}">
+                <a16:creationId xmlns:a16="http://schemas.microsoft.com/office/drawing/2014/main" id="{F002F075-6911-295D-F809-BAEC0FAA70C2}"/>
+              </a:ext>
+            </a:extLst>
+          </p:cNvPr>
+          <p:cNvSpPr txBox="1"/>
+          <p:nvPr/>
+        </p:nvSpPr>
+        <p:spPr>
+          <a:xfrm>
+            <a:off x="5128901" y="4167463"/>
+            <a:ext cx="1934197" cy="276999"/>
+          </a:xfrm>
+          <a:prstGeom prst="rect">
+            <a:avLst/>
+          </a:prstGeom>
+          <a:noFill/>
+        </p:spPr>
+        <p:txBody>
+          <a:bodyPr wrap="square" rtlCol="0">
+            <a:spAutoFit/>
+          </a:bodyPr>
+          <a:lstStyle/>
+          <a:p>
+            <a:r>
+              <a:rPr lang="en-US" sz="1200" b="1" dirty="0"/>
+              <a:t>RTU output variables</a:t>
+            </a:r>
+            <a:endParaRPr lang="en-SG" sz="1200" b="1" dirty="0"/>
+          </a:p>
+        </p:txBody>
+      </p:sp>
+      <p:cxnSp>
+        <p:nvCxnSpPr>
+          <p:cNvPr id="150" name="Straight Connector 149">
+            <a:extLst>
+              <a:ext uri="{FF2B5EF4-FFF2-40B4-BE49-F238E27FC236}">
+                <a16:creationId xmlns:a16="http://schemas.microsoft.com/office/drawing/2014/main" id="{0197F58A-E129-2F19-8935-1E1D60639C17}"/>
+              </a:ext>
+            </a:extLst>
+          </p:cNvPr>
+          <p:cNvCxnSpPr>
+            <a:cxnSpLocks/>
+          </p:cNvCxnSpPr>
+          <p:nvPr/>
+        </p:nvCxnSpPr>
+        <p:spPr>
+          <a:xfrm>
+            <a:off x="6813341" y="2471674"/>
+            <a:ext cx="237252" cy="0"/>
+          </a:xfrm>
+          <a:prstGeom prst="line">
+            <a:avLst/>
+          </a:prstGeom>
+          <a:ln>
+            <a:solidFill>
+              <a:schemeClr val="tx1"/>
+            </a:solidFill>
+            <a:prstDash val="sysDash"/>
+          </a:ln>
+        </p:spPr>
+        <p:style>
+          <a:lnRef idx="2">
+            <a:schemeClr val="accent1"/>
+          </a:lnRef>
+          <a:fillRef idx="0">
+            <a:schemeClr val="accent1"/>
+          </a:fillRef>
+          <a:effectRef idx="1">
+            <a:schemeClr val="accent1"/>
+          </a:effectRef>
+          <a:fontRef idx="minor">
+            <a:schemeClr val="tx1"/>
+          </a:fontRef>
+        </p:style>
+      </p:cxnSp>
+      <p:cxnSp>
+        <p:nvCxnSpPr>
+          <p:cNvPr id="154" name="Straight Connector 153">
+            <a:extLst>
+              <a:ext uri="{FF2B5EF4-FFF2-40B4-BE49-F238E27FC236}">
+                <a16:creationId xmlns:a16="http://schemas.microsoft.com/office/drawing/2014/main" id="{182898AE-B790-94D8-B424-EF50CBE55BB6}"/>
+              </a:ext>
+            </a:extLst>
+          </p:cNvPr>
+          <p:cNvCxnSpPr>
+            <a:cxnSpLocks/>
+          </p:cNvCxnSpPr>
+          <p:nvPr/>
+        </p:nvCxnSpPr>
+        <p:spPr>
+          <a:xfrm>
+            <a:off x="6820029" y="2924389"/>
+            <a:ext cx="237550" cy="0"/>
+          </a:xfrm>
+          <a:prstGeom prst="line">
+            <a:avLst/>
+          </a:prstGeom>
+          <a:ln>
+            <a:solidFill>
+              <a:schemeClr val="tx1"/>
+            </a:solidFill>
+            <a:prstDash val="sysDash"/>
+          </a:ln>
+        </p:spPr>
+        <p:style>
+          <a:lnRef idx="2">
+            <a:schemeClr val="accent1"/>
+          </a:lnRef>
+          <a:fillRef idx="0">
+            <a:schemeClr val="accent1"/>
+          </a:fillRef>
+          <a:effectRef idx="1">
+            <a:schemeClr val="accent1"/>
+          </a:effectRef>
+          <a:fontRef idx="minor">
+            <a:schemeClr val="tx1"/>
+          </a:fontRef>
+        </p:style>
+      </p:cxnSp>
+      <p:cxnSp>
+        <p:nvCxnSpPr>
+          <p:cNvPr id="155" name="Straight Connector 154">
+            <a:extLst>
+              <a:ext uri="{FF2B5EF4-FFF2-40B4-BE49-F238E27FC236}">
+                <a16:creationId xmlns:a16="http://schemas.microsoft.com/office/drawing/2014/main" id="{91188FDD-6E34-0FCF-CA78-CF6DB524880E}"/>
+              </a:ext>
+            </a:extLst>
+          </p:cNvPr>
+          <p:cNvCxnSpPr>
+            <a:cxnSpLocks/>
+          </p:cNvCxnSpPr>
+          <p:nvPr/>
+        </p:nvCxnSpPr>
+        <p:spPr>
+          <a:xfrm flipV="1">
+            <a:off x="6894640" y="4602183"/>
+            <a:ext cx="154258" cy="6396"/>
+          </a:xfrm>
+          <a:prstGeom prst="line">
+            <a:avLst/>
+          </a:prstGeom>
+          <a:ln>
+            <a:solidFill>
+              <a:schemeClr val="tx1"/>
+            </a:solidFill>
+            <a:prstDash val="sysDash"/>
+          </a:ln>
+        </p:spPr>
+        <p:style>
+          <a:lnRef idx="2">
+            <a:schemeClr val="accent1"/>
+          </a:lnRef>
+          <a:fillRef idx="0">
+            <a:schemeClr val="accent1"/>
+          </a:fillRef>
+          <a:effectRef idx="1">
+            <a:schemeClr val="accent1"/>
+          </a:effectRef>
+          <a:fontRef idx="minor">
+            <a:schemeClr val="tx1"/>
+          </a:fontRef>
+        </p:style>
+      </p:cxnSp>
+      <p:cxnSp>
+        <p:nvCxnSpPr>
+          <p:cNvPr id="157" name="Straight Connector 156">
+            <a:extLst>
+              <a:ext uri="{FF2B5EF4-FFF2-40B4-BE49-F238E27FC236}">
+                <a16:creationId xmlns:a16="http://schemas.microsoft.com/office/drawing/2014/main" id="{2E4C8557-4F12-F03E-6973-992D741AB918}"/>
+              </a:ext>
+            </a:extLst>
+          </p:cNvPr>
+          <p:cNvCxnSpPr>
+            <a:cxnSpLocks/>
+          </p:cNvCxnSpPr>
+          <p:nvPr/>
+        </p:nvCxnSpPr>
+        <p:spPr>
+          <a:xfrm>
+            <a:off x="6784409" y="5066823"/>
+            <a:ext cx="273170" cy="0"/>
+          </a:xfrm>
+          <a:prstGeom prst="line">
+            <a:avLst/>
+          </a:prstGeom>
+          <a:ln>
+            <a:solidFill>
+              <a:schemeClr val="tx1"/>
+            </a:solidFill>
+            <a:prstDash val="sysDash"/>
+          </a:ln>
+        </p:spPr>
+        <p:style>
+          <a:lnRef idx="2">
+            <a:schemeClr val="accent1"/>
+          </a:lnRef>
+          <a:fillRef idx="0">
+            <a:schemeClr val="accent1"/>
+          </a:fillRef>
+          <a:effectRef idx="1">
+            <a:schemeClr val="accent1"/>
+          </a:effectRef>
+          <a:fontRef idx="minor">
+            <a:schemeClr val="tx1"/>
+          </a:fontRef>
+        </p:style>
+      </p:cxnSp>
+      <p:sp>
+        <p:nvSpPr>
+          <p:cNvPr id="161" name="Rectangle 160">
+            <a:extLst>
+              <a:ext uri="{FF2B5EF4-FFF2-40B4-BE49-F238E27FC236}">
+                <a16:creationId xmlns:a16="http://schemas.microsoft.com/office/drawing/2014/main" id="{32ADACBF-6CD1-7C6A-393E-8FDE39B7951F}"/>
+              </a:ext>
+            </a:extLst>
+          </p:cNvPr>
+          <p:cNvSpPr/>
+          <p:nvPr/>
+        </p:nvSpPr>
+        <p:spPr>
+          <a:xfrm>
+            <a:off x="8394789" y="1314274"/>
+            <a:ext cx="3211175" cy="2995813"/>
+          </a:xfrm>
+          <a:prstGeom prst="rect">
+            <a:avLst/>
+          </a:prstGeom>
+          <a:solidFill>
+            <a:schemeClr val="accent2">
+              <a:lumMod val="20000"/>
+              <a:lumOff val="80000"/>
+            </a:schemeClr>
+          </a:solidFill>
+        </p:spPr>
+        <p:style>
+          <a:lnRef idx="2">
+            <a:schemeClr val="accent1">
+              <a:shade val="15000"/>
+            </a:schemeClr>
+          </a:lnRef>
+          <a:fillRef idx="1">
+            <a:schemeClr val="accent1"/>
+          </a:fillRef>
+          <a:effectRef idx="0">
+            <a:schemeClr val="accent1"/>
+          </a:effectRef>
+          <a:fontRef idx="minor">
+            <a:schemeClr val="lt1"/>
+          </a:fontRef>
+        </p:style>
+        <p:txBody>
+          <a:bodyPr rtlCol="0" anchor="ctr"/>
+          <a:lstStyle/>
+          <a:p>
+            <a:pPr algn="ctr"/>
+            <a:endParaRPr lang="en-SG" dirty="0"/>
+          </a:p>
+        </p:txBody>
+      </p:sp>
+      <p:sp>
+        <p:nvSpPr>
+          <p:cNvPr id="162" name="TextBox 161">
+            <a:extLst>
+              <a:ext uri="{FF2B5EF4-FFF2-40B4-BE49-F238E27FC236}">
+                <a16:creationId xmlns:a16="http://schemas.microsoft.com/office/drawing/2014/main" id="{5089A106-CF1F-EBEA-140F-03132C4ED2DD}"/>
+              </a:ext>
+            </a:extLst>
+          </p:cNvPr>
+          <p:cNvSpPr txBox="1"/>
+          <p:nvPr/>
+        </p:nvSpPr>
+        <p:spPr>
+          <a:xfrm>
+            <a:off x="8259427" y="913025"/>
+            <a:ext cx="3211175" cy="307777"/>
+          </a:xfrm>
+          <a:prstGeom prst="rect">
+            <a:avLst/>
+          </a:prstGeom>
+          <a:noFill/>
+        </p:spPr>
+        <p:txBody>
+          <a:bodyPr wrap="square" rtlCol="0">
+            <a:spAutoFit/>
+          </a:bodyPr>
+          <a:lstStyle/>
+          <a:p>
+            <a:r>
+              <a:rPr lang="en-US" sz="1400" b="1" dirty="0"/>
+              <a:t>Level2 OT Control Console/HMI/</a:t>
+            </a:r>
+            <a:endParaRPr lang="en-SG" sz="1400" b="1" dirty="0"/>
+          </a:p>
+        </p:txBody>
+      </p:sp>
+      <p:pic>
+        <p:nvPicPr>
+          <p:cNvPr id="164" name="Picture 163">
+            <a:extLst>
+              <a:ext uri="{FF2B5EF4-FFF2-40B4-BE49-F238E27FC236}">
+                <a16:creationId xmlns:a16="http://schemas.microsoft.com/office/drawing/2014/main" id="{C159AB26-9062-1561-2624-20E1AA4FE3F3}"/>
+              </a:ext>
+            </a:extLst>
+          </p:cNvPr>
+          <p:cNvPicPr>
+            <a:picLocks noChangeAspect="1"/>
+          </p:cNvPicPr>
+          <p:nvPr/>
+        </p:nvPicPr>
+        <p:blipFill>
+          <a:blip r:embed="rId12"/>
+          <a:stretch>
+            <a:fillRect/>
+          </a:stretch>
+        </p:blipFill>
+        <p:spPr>
+          <a:xfrm>
+            <a:off x="8540660" y="1872901"/>
+            <a:ext cx="2919432" cy="2207012"/>
+          </a:xfrm>
+          <a:prstGeom prst="rect">
+            <a:avLst/>
+          </a:prstGeom>
+          <a:ln w="6350">
+            <a:solidFill>
+              <a:schemeClr val="tx1"/>
+            </a:solidFill>
+          </a:ln>
+        </p:spPr>
+      </p:pic>
+      <p:sp>
+        <p:nvSpPr>
+          <p:cNvPr id="165" name="TextBox 164">
+            <a:extLst>
+              <a:ext uri="{FF2B5EF4-FFF2-40B4-BE49-F238E27FC236}">
+                <a16:creationId xmlns:a16="http://schemas.microsoft.com/office/drawing/2014/main" id="{5D28B1DA-AD16-4DCE-5DEA-6030DDF090AC}"/>
+              </a:ext>
+            </a:extLst>
+          </p:cNvPr>
+          <p:cNvSpPr txBox="1"/>
+          <p:nvPr/>
+        </p:nvSpPr>
+        <p:spPr>
+          <a:xfrm>
+            <a:off x="8394789" y="1313531"/>
+            <a:ext cx="2732878" cy="523220"/>
+          </a:xfrm>
+          <a:prstGeom prst="rect">
+            <a:avLst/>
+          </a:prstGeom>
+          <a:noFill/>
+        </p:spPr>
+        <p:txBody>
+          <a:bodyPr wrap="square" rtlCol="0">
+            <a:spAutoFit/>
+          </a:bodyPr>
+          <a:lstStyle/>
+          <a:p>
+            <a:r>
+              <a:rPr lang="en-US" sz="1400" b="1" dirty="0">
+                <a:solidFill>
+                  <a:schemeClr val="accent2">
+                    <a:lumMod val="50000"/>
+                  </a:schemeClr>
+                </a:solidFill>
+              </a:rPr>
+              <a:t>BACnet HVAC Wall Remote Thermostat Controller/App</a:t>
+            </a:r>
+            <a:endParaRPr lang="en-SG" sz="1400" b="1" dirty="0">
+              <a:solidFill>
+                <a:schemeClr val="accent2">
+                  <a:lumMod val="50000"/>
+                </a:schemeClr>
+              </a:solidFill>
+            </a:endParaRPr>
+          </a:p>
+        </p:txBody>
+      </p:sp>
+      <p:sp>
+        <p:nvSpPr>
+          <p:cNvPr id="166" name="Rectangle 165">
+            <a:extLst>
+              <a:ext uri="{FF2B5EF4-FFF2-40B4-BE49-F238E27FC236}">
+                <a16:creationId xmlns:a16="http://schemas.microsoft.com/office/drawing/2014/main" id="{9D14EDD7-105B-6AB3-8E26-57943A3B6F89}"/>
+              </a:ext>
+            </a:extLst>
+          </p:cNvPr>
+          <p:cNvSpPr/>
+          <p:nvPr/>
+        </p:nvSpPr>
+        <p:spPr>
+          <a:xfrm>
+            <a:off x="8151720" y="3869713"/>
+            <a:ext cx="1161346" cy="281016"/>
+          </a:xfrm>
+          <a:prstGeom prst="rect">
+            <a:avLst/>
+          </a:prstGeom>
+          <a:solidFill>
+            <a:schemeClr val="accent2"/>
+          </a:solidFill>
+        </p:spPr>
+        <p:style>
+          <a:lnRef idx="2">
+            <a:schemeClr val="accent1">
+              <a:shade val="50000"/>
+            </a:schemeClr>
+          </a:lnRef>
+          <a:fillRef idx="1">
+            <a:schemeClr val="accent1"/>
+          </a:fillRef>
+          <a:effectRef idx="0">
+            <a:schemeClr val="accent1"/>
+          </a:effectRef>
+          <a:fontRef idx="minor">
+            <a:schemeClr val="lt1"/>
+          </a:fontRef>
+        </p:style>
+        <p:txBody>
+          <a:bodyPr rtlCol="0" anchor="ctr"/>
+          <a:lstStyle/>
+          <a:p>
+            <a:r>
+              <a:rPr lang="en-US" sz="1050" b="1" dirty="0"/>
+              <a:t>BACnet Client</a:t>
+            </a:r>
+            <a:endParaRPr lang="en-SG" sz="1050" b="1" dirty="0"/>
+          </a:p>
+        </p:txBody>
+      </p:sp>
+      <p:pic>
+        <p:nvPicPr>
+          <p:cNvPr id="167" name="Picture 166">
+            <a:extLst>
+              <a:ext uri="{FF2B5EF4-FFF2-40B4-BE49-F238E27FC236}">
+                <a16:creationId xmlns:a16="http://schemas.microsoft.com/office/drawing/2014/main" id="{C3CC61CC-D108-C376-D0C3-7B49D5F871F8}"/>
+              </a:ext>
+            </a:extLst>
+          </p:cNvPr>
+          <p:cNvPicPr>
+            <a:picLocks noChangeAspect="1"/>
+          </p:cNvPicPr>
+          <p:nvPr/>
+        </p:nvPicPr>
+        <p:blipFill>
+          <a:blip r:embed="rId13"/>
+          <a:stretch>
+            <a:fillRect/>
+          </a:stretch>
+        </p:blipFill>
+        <p:spPr>
+          <a:xfrm>
+            <a:off x="8477174" y="4899140"/>
+            <a:ext cx="3046404" cy="1446494"/>
+          </a:xfrm>
+          <a:prstGeom prst="rect">
+            <a:avLst/>
+          </a:prstGeom>
+        </p:spPr>
+      </p:pic>
+      <p:sp>
+        <p:nvSpPr>
+          <p:cNvPr id="168" name="Rectangle 167">
+            <a:extLst>
+              <a:ext uri="{FF2B5EF4-FFF2-40B4-BE49-F238E27FC236}">
+                <a16:creationId xmlns:a16="http://schemas.microsoft.com/office/drawing/2014/main" id="{880BC46E-8EC1-FEC8-49B2-4025510628A4}"/>
+              </a:ext>
+            </a:extLst>
+          </p:cNvPr>
+          <p:cNvSpPr/>
+          <p:nvPr/>
+        </p:nvSpPr>
+        <p:spPr>
+          <a:xfrm>
+            <a:off x="8137067" y="4913751"/>
+            <a:ext cx="1161346" cy="281016"/>
+          </a:xfrm>
+          <a:prstGeom prst="rect">
+            <a:avLst/>
+          </a:prstGeom>
+          <a:solidFill>
+            <a:schemeClr val="accent2"/>
+          </a:solidFill>
+        </p:spPr>
+        <p:style>
+          <a:lnRef idx="2">
+            <a:schemeClr val="accent1">
+              <a:shade val="50000"/>
+            </a:schemeClr>
+          </a:lnRef>
+          <a:fillRef idx="1">
+            <a:schemeClr val="accent1"/>
+          </a:fillRef>
+          <a:effectRef idx="0">
+            <a:schemeClr val="accent1"/>
+          </a:effectRef>
+          <a:fontRef idx="minor">
+            <a:schemeClr val="lt1"/>
+          </a:fontRef>
+        </p:style>
+        <p:txBody>
+          <a:bodyPr rtlCol="0" anchor="ctr"/>
+          <a:lstStyle/>
+          <a:p>
+            <a:r>
+              <a:rPr lang="en-US" sz="1050" b="1" dirty="0"/>
+              <a:t>BACnet Client</a:t>
+            </a:r>
+            <a:endParaRPr lang="en-SG" sz="1050" b="1" dirty="0"/>
+          </a:p>
+        </p:txBody>
+      </p:sp>
+      <p:sp>
+        <p:nvSpPr>
+          <p:cNvPr id="170" name="TextBox 169">
+            <a:extLst>
+              <a:ext uri="{FF2B5EF4-FFF2-40B4-BE49-F238E27FC236}">
+                <a16:creationId xmlns:a16="http://schemas.microsoft.com/office/drawing/2014/main" id="{BF67B0A4-9BDE-D860-4B67-4C201A2CAB06}"/>
+              </a:ext>
+            </a:extLst>
+          </p:cNvPr>
+          <p:cNvSpPr txBox="1"/>
+          <p:nvPr/>
+        </p:nvSpPr>
+        <p:spPr>
+          <a:xfrm>
+            <a:off x="8394789" y="4573363"/>
+            <a:ext cx="3211174" cy="307777"/>
+          </a:xfrm>
+          <a:prstGeom prst="rect">
+            <a:avLst/>
+          </a:prstGeom>
+          <a:noFill/>
+        </p:spPr>
+        <p:txBody>
+          <a:bodyPr wrap="square" rtlCol="0">
+            <a:spAutoFit/>
+          </a:bodyPr>
+          <a:lstStyle/>
+          <a:p>
+            <a:r>
+              <a:rPr lang="en-US" sz="1400" b="1" dirty="0">
+                <a:solidFill>
+                  <a:schemeClr val="accent2">
+                    <a:lumMod val="50000"/>
+                  </a:schemeClr>
+                </a:solidFill>
+              </a:rPr>
+              <a:t>Building Management Dashboard</a:t>
+            </a:r>
+            <a:endParaRPr lang="en-SG" sz="1400" b="1" dirty="0">
+              <a:solidFill>
+                <a:schemeClr val="accent2">
+                  <a:lumMod val="50000"/>
+                </a:schemeClr>
+              </a:solidFill>
+            </a:endParaRPr>
+          </a:p>
+        </p:txBody>
+      </p:sp>
+      <p:sp>
+        <p:nvSpPr>
+          <p:cNvPr id="173" name="Rectangle 172">
+            <a:extLst>
+              <a:ext uri="{FF2B5EF4-FFF2-40B4-BE49-F238E27FC236}">
+                <a16:creationId xmlns:a16="http://schemas.microsoft.com/office/drawing/2014/main" id="{4D9C156E-A7F9-C9E9-74E4-50458F26F093}"/>
+              </a:ext>
+            </a:extLst>
+          </p:cNvPr>
+          <p:cNvSpPr/>
+          <p:nvPr/>
+        </p:nvSpPr>
+        <p:spPr>
+          <a:xfrm>
+            <a:off x="7807002" y="1291996"/>
+            <a:ext cx="97947" cy="5124832"/>
+          </a:xfrm>
+          <a:prstGeom prst="rect">
+            <a:avLst/>
+          </a:prstGeom>
+        </p:spPr>
+        <p:style>
+          <a:lnRef idx="2">
+            <a:schemeClr val="accent2">
+              <a:shade val="15000"/>
+            </a:schemeClr>
+          </a:lnRef>
+          <a:fillRef idx="1">
+            <a:schemeClr val="accent2"/>
+          </a:fillRef>
+          <a:effectRef idx="0">
+            <a:schemeClr val="accent2"/>
+          </a:effectRef>
+          <a:fontRef idx="minor">
+            <a:schemeClr val="lt1"/>
+          </a:fontRef>
+        </p:style>
+        <p:txBody>
+          <a:bodyPr rtlCol="0" anchor="ctr"/>
+          <a:lstStyle/>
+          <a:p>
+            <a:pPr algn="ctr"/>
+            <a:endParaRPr lang="en-SG"/>
+          </a:p>
+        </p:txBody>
+      </p:sp>
+      <p:pic>
+        <p:nvPicPr>
+          <p:cNvPr id="179" name="Picture 178">
+            <a:extLst>
+              <a:ext uri="{FF2B5EF4-FFF2-40B4-BE49-F238E27FC236}">
+                <a16:creationId xmlns:a16="http://schemas.microsoft.com/office/drawing/2014/main" id="{6E4DF9AF-9F50-2120-3D29-F57B68761734}"/>
+              </a:ext>
+            </a:extLst>
+          </p:cNvPr>
+          <p:cNvPicPr>
+            <a:picLocks noChangeAspect="1"/>
+          </p:cNvPicPr>
+          <p:nvPr/>
+        </p:nvPicPr>
+        <p:blipFill>
+          <a:blip r:embed="rId14"/>
+          <a:stretch>
+            <a:fillRect/>
+          </a:stretch>
+        </p:blipFill>
+        <p:spPr>
+          <a:xfrm>
+            <a:off x="4547337" y="5834610"/>
+            <a:ext cx="607957" cy="525802"/>
+          </a:xfrm>
+          <a:prstGeom prst="rect">
+            <a:avLst/>
+          </a:prstGeom>
+          <a:ln w="9525">
+            <a:solidFill>
+              <a:schemeClr val="tx1"/>
+            </a:solidFill>
+          </a:ln>
+        </p:spPr>
+      </p:pic>
+      <p:sp>
+        <p:nvSpPr>
+          <p:cNvPr id="181" name="TextBox 180">
+            <a:extLst>
+              <a:ext uri="{FF2B5EF4-FFF2-40B4-BE49-F238E27FC236}">
+                <a16:creationId xmlns:a16="http://schemas.microsoft.com/office/drawing/2014/main" id="{63213DE7-E1E2-1978-0A4E-CA41F0A24FB5}"/>
+              </a:ext>
+            </a:extLst>
+          </p:cNvPr>
+          <p:cNvSpPr txBox="1"/>
+          <p:nvPr/>
+        </p:nvSpPr>
+        <p:spPr>
+          <a:xfrm>
+            <a:off x="4357511" y="5474094"/>
+            <a:ext cx="2001435" cy="307777"/>
+          </a:xfrm>
+          <a:prstGeom prst="rect">
+            <a:avLst/>
+          </a:prstGeom>
+          <a:noFill/>
+        </p:spPr>
+        <p:txBody>
+          <a:bodyPr wrap="square" rtlCol="0">
+            <a:spAutoFit/>
+          </a:bodyPr>
+          <a:lstStyle/>
+          <a:p>
+            <a:r>
+              <a:rPr lang="en-US" sz="1400" b="1" dirty="0"/>
+              <a:t>Other Building Device</a:t>
+            </a:r>
+            <a:endParaRPr lang="en-SG" sz="1400" b="1" dirty="0"/>
+          </a:p>
+        </p:txBody>
+      </p:sp>
+      <p:pic>
+        <p:nvPicPr>
+          <p:cNvPr id="182" name="Picture 181">
+            <a:extLst>
+              <a:ext uri="{FF2B5EF4-FFF2-40B4-BE49-F238E27FC236}">
+                <a16:creationId xmlns:a16="http://schemas.microsoft.com/office/drawing/2014/main" id="{B755D9D6-3B04-4432-C2D2-0DDD566AAF98}"/>
+              </a:ext>
+            </a:extLst>
+          </p:cNvPr>
+          <p:cNvPicPr>
+            <a:picLocks noChangeAspect="1"/>
+          </p:cNvPicPr>
+          <p:nvPr/>
+        </p:nvPicPr>
+        <p:blipFill>
+          <a:blip r:embed="rId15"/>
+          <a:stretch>
+            <a:fillRect/>
+          </a:stretch>
+        </p:blipFill>
+        <p:spPr>
+          <a:xfrm rot="5400000">
+            <a:off x="5428504" y="5781393"/>
+            <a:ext cx="523963" cy="607957"/>
+          </a:xfrm>
+          <a:prstGeom prst="rect">
+            <a:avLst/>
+          </a:prstGeom>
+          <a:ln w="6350">
+            <a:solidFill>
+              <a:schemeClr val="tx1"/>
+            </a:solidFill>
+          </a:ln>
+        </p:spPr>
+      </p:pic>
+      <p:sp>
+        <p:nvSpPr>
+          <p:cNvPr id="183" name="TextBox 182">
+            <a:extLst>
+              <a:ext uri="{FF2B5EF4-FFF2-40B4-BE49-F238E27FC236}">
+                <a16:creationId xmlns:a16="http://schemas.microsoft.com/office/drawing/2014/main" id="{75A10AB6-4B53-79C3-874B-C9C0010E02DB}"/>
+              </a:ext>
+            </a:extLst>
+          </p:cNvPr>
+          <p:cNvSpPr txBox="1"/>
+          <p:nvPr/>
+        </p:nvSpPr>
+        <p:spPr>
+          <a:xfrm>
+            <a:off x="4396189" y="6336455"/>
+            <a:ext cx="2737454" cy="276999"/>
+          </a:xfrm>
+          <a:prstGeom prst="rect">
+            <a:avLst/>
+          </a:prstGeom>
+          <a:noFill/>
+        </p:spPr>
+        <p:txBody>
+          <a:bodyPr wrap="square" rtlCol="0">
+            <a:spAutoFit/>
+          </a:bodyPr>
+          <a:lstStyle/>
+          <a:p>
+            <a:r>
+              <a:rPr lang="en-US" sz="1200" b="1" dirty="0"/>
+              <a:t>People Detection and Count Radar</a:t>
+            </a:r>
+            <a:endParaRPr lang="en-SG" sz="1200" b="1" dirty="0"/>
+          </a:p>
+        </p:txBody>
+      </p:sp>
+      <p:sp>
+        <p:nvSpPr>
+          <p:cNvPr id="184" name="Rectangle 183">
+            <a:extLst>
+              <a:ext uri="{FF2B5EF4-FFF2-40B4-BE49-F238E27FC236}">
+                <a16:creationId xmlns:a16="http://schemas.microsoft.com/office/drawing/2014/main" id="{1C0B8B44-FD6D-FA38-56E5-9E2EB31E7766}"/>
+              </a:ext>
+            </a:extLst>
+          </p:cNvPr>
+          <p:cNvSpPr/>
+          <p:nvPr/>
+        </p:nvSpPr>
+        <p:spPr>
+          <a:xfrm>
+            <a:off x="6258308" y="5819980"/>
+            <a:ext cx="1098611" cy="281016"/>
+          </a:xfrm>
+          <a:prstGeom prst="rect">
+            <a:avLst/>
+          </a:prstGeom>
+          <a:solidFill>
+            <a:schemeClr val="accent2"/>
+          </a:solidFill>
+        </p:spPr>
+        <p:style>
+          <a:lnRef idx="2">
+            <a:schemeClr val="accent1">
+              <a:shade val="50000"/>
+            </a:schemeClr>
+          </a:lnRef>
+          <a:fillRef idx="1">
+            <a:schemeClr val="accent1"/>
+          </a:fillRef>
+          <a:effectRef idx="0">
+            <a:schemeClr val="accent1"/>
+          </a:effectRef>
+          <a:fontRef idx="minor">
+            <a:schemeClr val="lt1"/>
+          </a:fontRef>
+        </p:style>
+        <p:txBody>
+          <a:bodyPr rtlCol="0" anchor="ctr"/>
+          <a:lstStyle/>
+          <a:p>
+            <a:r>
+              <a:rPr lang="en-US" sz="1050" b="1" dirty="0"/>
+              <a:t>BACnet Server </a:t>
+            </a:r>
+            <a:endParaRPr lang="en-SG" sz="1050" b="1" dirty="0"/>
+          </a:p>
+        </p:txBody>
+      </p:sp>
+      <p:sp>
+        <p:nvSpPr>
+          <p:cNvPr id="188" name="TextBox 187">
+            <a:extLst>
+              <a:ext uri="{FF2B5EF4-FFF2-40B4-BE49-F238E27FC236}">
+                <a16:creationId xmlns:a16="http://schemas.microsoft.com/office/drawing/2014/main" id="{E4B9A740-29B9-234D-9D2F-357456646760}"/>
+              </a:ext>
+            </a:extLst>
+          </p:cNvPr>
+          <p:cNvSpPr txBox="1"/>
+          <p:nvPr/>
+        </p:nvSpPr>
+        <p:spPr>
+          <a:xfrm>
+            <a:off x="7386435" y="851571"/>
+            <a:ext cx="841133" cy="523220"/>
+          </a:xfrm>
+          <a:prstGeom prst="rect">
+            <a:avLst/>
+          </a:prstGeom>
+          <a:noFill/>
+        </p:spPr>
+        <p:txBody>
+          <a:bodyPr wrap="square" rtlCol="0">
+            <a:spAutoFit/>
+          </a:bodyPr>
+          <a:lstStyle/>
+          <a:p>
+            <a:r>
+              <a:rPr lang="en-US" sz="1400" b="1" dirty="0">
+                <a:solidFill>
+                  <a:schemeClr val="accent2">
+                    <a:lumMod val="75000"/>
+                  </a:schemeClr>
+                </a:solidFill>
+              </a:rPr>
+              <a:t>BACnet Bus</a:t>
+            </a:r>
+            <a:endParaRPr lang="en-SG" sz="1400" b="1" dirty="0">
+              <a:solidFill>
+                <a:schemeClr val="accent2">
+                  <a:lumMod val="75000"/>
+                </a:schemeClr>
+              </a:solidFill>
+            </a:endParaRPr>
+          </a:p>
+        </p:txBody>
+      </p:sp>
+      <p:cxnSp>
+        <p:nvCxnSpPr>
+          <p:cNvPr id="191" name="Straight Arrow Connector 190">
+            <a:extLst>
+              <a:ext uri="{FF2B5EF4-FFF2-40B4-BE49-F238E27FC236}">
+                <a16:creationId xmlns:a16="http://schemas.microsoft.com/office/drawing/2014/main" id="{BC0D387E-FB86-AD03-07C0-5961675525B4}"/>
+              </a:ext>
+            </a:extLst>
+          </p:cNvPr>
+          <p:cNvCxnSpPr>
+            <a:cxnSpLocks/>
+          </p:cNvCxnSpPr>
+          <p:nvPr/>
+        </p:nvCxnSpPr>
+        <p:spPr>
+          <a:xfrm>
+            <a:off x="7356919" y="5942003"/>
+            <a:ext cx="450083" cy="0"/>
+          </a:xfrm>
+          <a:prstGeom prst="straightConnector1">
+            <a:avLst/>
+          </a:prstGeom>
+          <a:ln>
+            <a:prstDash val="sysDash"/>
+            <a:tailEnd type="triangle"/>
+          </a:ln>
+        </p:spPr>
+        <p:style>
+          <a:lnRef idx="2">
+            <a:schemeClr val="dk1"/>
+          </a:lnRef>
+          <a:fillRef idx="0">
+            <a:schemeClr val="dk1"/>
+          </a:fillRef>
+          <a:effectRef idx="1">
+            <a:schemeClr val="dk1"/>
+          </a:effectRef>
+          <a:fontRef idx="minor">
+            <a:schemeClr val="tx1"/>
+          </a:fontRef>
+        </p:style>
+      </p:cxnSp>
+      <p:cxnSp>
+        <p:nvCxnSpPr>
+          <p:cNvPr id="196" name="Connector: Elbow 195">
+            <a:extLst>
+              <a:ext uri="{FF2B5EF4-FFF2-40B4-BE49-F238E27FC236}">
+                <a16:creationId xmlns:a16="http://schemas.microsoft.com/office/drawing/2014/main" id="{024C5735-AD2C-B6FB-4ECA-439E3AB5AAFD}"/>
+              </a:ext>
+            </a:extLst>
+          </p:cNvPr>
+          <p:cNvCxnSpPr/>
+          <p:nvPr/>
+        </p:nvCxnSpPr>
+        <p:spPr>
+          <a:xfrm flipV="1">
+            <a:off x="7386435" y="1609344"/>
+            <a:ext cx="420567" cy="198820"/>
+          </a:xfrm>
+          <a:prstGeom prst="bentConnector3">
+            <a:avLst>
+              <a:gd name="adj1" fmla="val 4342"/>
+            </a:avLst>
+          </a:prstGeom>
+          <a:ln>
+            <a:prstDash val="sysDash"/>
+            <a:tailEnd type="triangle"/>
+          </a:ln>
+        </p:spPr>
+        <p:style>
+          <a:lnRef idx="2">
+            <a:schemeClr val="dk1"/>
+          </a:lnRef>
+          <a:fillRef idx="0">
+            <a:schemeClr val="dk1"/>
+          </a:fillRef>
+          <a:effectRef idx="1">
+            <a:schemeClr val="dk1"/>
+          </a:effectRef>
+          <a:fontRef idx="minor">
+            <a:schemeClr val="tx1"/>
+          </a:fontRef>
+        </p:style>
+      </p:cxnSp>
+      <p:cxnSp>
+        <p:nvCxnSpPr>
+          <p:cNvPr id="198" name="Connector: Elbow 197">
+            <a:extLst>
+              <a:ext uri="{FF2B5EF4-FFF2-40B4-BE49-F238E27FC236}">
+                <a16:creationId xmlns:a16="http://schemas.microsoft.com/office/drawing/2014/main" id="{85ED9079-7095-C641-4EF7-90F9BCC729E6}"/>
+              </a:ext>
+            </a:extLst>
+          </p:cNvPr>
+          <p:cNvCxnSpPr>
+            <a:cxnSpLocks/>
+          </p:cNvCxnSpPr>
+          <p:nvPr/>
+        </p:nvCxnSpPr>
+        <p:spPr>
+          <a:xfrm rot="10800000">
+            <a:off x="7392958" y="2106842"/>
+            <a:ext cx="385949" cy="266950"/>
+          </a:xfrm>
+          <a:prstGeom prst="bentConnector3">
+            <a:avLst>
+              <a:gd name="adj1" fmla="val 99754"/>
+            </a:avLst>
+          </a:prstGeom>
+          <a:ln>
+            <a:prstDash val="sysDash"/>
+            <a:tailEnd type="triangle"/>
+          </a:ln>
+        </p:spPr>
+        <p:style>
+          <a:lnRef idx="2">
+            <a:schemeClr val="dk1"/>
+          </a:lnRef>
+          <a:fillRef idx="0">
+            <a:schemeClr val="dk1"/>
+          </a:fillRef>
+          <a:effectRef idx="1">
+            <a:schemeClr val="dk1"/>
+          </a:effectRef>
+          <a:fontRef idx="minor">
+            <a:schemeClr val="tx1"/>
+          </a:fontRef>
+        </p:style>
+      </p:cxnSp>
+      <p:cxnSp>
+        <p:nvCxnSpPr>
+          <p:cNvPr id="203" name="Connector: Elbow 202">
+            <a:extLst>
+              <a:ext uri="{FF2B5EF4-FFF2-40B4-BE49-F238E27FC236}">
+                <a16:creationId xmlns:a16="http://schemas.microsoft.com/office/drawing/2014/main" id="{734FC539-F07F-C8E1-3602-F1B9A7E9A14A}"/>
+              </a:ext>
+            </a:extLst>
+          </p:cNvPr>
+          <p:cNvCxnSpPr>
+            <a:cxnSpLocks/>
+          </p:cNvCxnSpPr>
+          <p:nvPr/>
+        </p:nvCxnSpPr>
+        <p:spPr>
+          <a:xfrm>
+            <a:off x="7904951" y="3507494"/>
+            <a:ext cx="322616" cy="288159"/>
+          </a:xfrm>
+          <a:prstGeom prst="bentConnector3">
+            <a:avLst>
+              <a:gd name="adj1" fmla="val 98184"/>
+            </a:avLst>
+          </a:prstGeom>
+          <a:ln>
+            <a:prstDash val="sysDash"/>
+            <a:tailEnd type="triangle"/>
+          </a:ln>
+        </p:spPr>
+        <p:style>
+          <a:lnRef idx="2">
+            <a:schemeClr val="dk1"/>
+          </a:lnRef>
+          <a:fillRef idx="0">
+            <a:schemeClr val="dk1"/>
+          </a:fillRef>
+          <a:effectRef idx="1">
+            <a:schemeClr val="dk1"/>
+          </a:effectRef>
+          <a:fontRef idx="minor">
+            <a:schemeClr val="tx1"/>
+          </a:fontRef>
+        </p:style>
+      </p:cxnSp>
+      <p:cxnSp>
+        <p:nvCxnSpPr>
+          <p:cNvPr id="210" name="Connector: Elbow 209">
+            <a:extLst>
+              <a:ext uri="{FF2B5EF4-FFF2-40B4-BE49-F238E27FC236}">
+                <a16:creationId xmlns:a16="http://schemas.microsoft.com/office/drawing/2014/main" id="{99401C88-BFC4-00AF-FCC5-AB53334A86FC}"/>
+              </a:ext>
+            </a:extLst>
+          </p:cNvPr>
+          <p:cNvCxnSpPr>
+            <a:cxnSpLocks/>
+          </p:cNvCxnSpPr>
+          <p:nvPr/>
+        </p:nvCxnSpPr>
+        <p:spPr>
+          <a:xfrm rot="10800000" flipV="1">
+            <a:off x="7902066" y="4165339"/>
+            <a:ext cx="325500" cy="233977"/>
+          </a:xfrm>
+          <a:prstGeom prst="bentConnector3">
+            <a:avLst>
+              <a:gd name="adj1" fmla="val -3375"/>
+            </a:avLst>
+          </a:prstGeom>
+          <a:ln>
+            <a:prstDash val="sysDash"/>
+            <a:tailEnd type="triangle"/>
+          </a:ln>
+        </p:spPr>
+        <p:style>
+          <a:lnRef idx="2">
+            <a:schemeClr val="dk1"/>
+          </a:lnRef>
+          <a:fillRef idx="0">
+            <a:schemeClr val="dk1"/>
+          </a:fillRef>
+          <a:effectRef idx="1">
+            <a:schemeClr val="dk1"/>
+          </a:effectRef>
+          <a:fontRef idx="minor">
+            <a:schemeClr val="tx1"/>
+          </a:fontRef>
+        </p:style>
+      </p:cxnSp>
+      <p:cxnSp>
+        <p:nvCxnSpPr>
+          <p:cNvPr id="215" name="Connector: Elbow 214">
+            <a:extLst>
+              <a:ext uri="{FF2B5EF4-FFF2-40B4-BE49-F238E27FC236}">
+                <a16:creationId xmlns:a16="http://schemas.microsoft.com/office/drawing/2014/main" id="{7467BD9A-2D4E-C186-20B8-9DD897109CEC}"/>
+              </a:ext>
+            </a:extLst>
+          </p:cNvPr>
+          <p:cNvCxnSpPr>
+            <a:cxnSpLocks/>
+          </p:cNvCxnSpPr>
+          <p:nvPr/>
+        </p:nvCxnSpPr>
+        <p:spPr>
+          <a:xfrm>
+            <a:off x="7904951" y="4634525"/>
+            <a:ext cx="322616" cy="288159"/>
+          </a:xfrm>
+          <a:prstGeom prst="bentConnector3">
+            <a:avLst>
+              <a:gd name="adj1" fmla="val 98184"/>
+            </a:avLst>
+          </a:prstGeom>
+          <a:ln>
+            <a:prstDash val="sysDash"/>
+            <a:tailEnd type="triangle"/>
+          </a:ln>
+        </p:spPr>
+        <p:style>
+          <a:lnRef idx="2">
+            <a:schemeClr val="dk1"/>
+          </a:lnRef>
+          <a:fillRef idx="0">
+            <a:schemeClr val="dk1"/>
+          </a:fillRef>
+          <a:effectRef idx="1">
+            <a:schemeClr val="dk1"/>
+          </a:effectRef>
+          <a:fontRef idx="minor">
+            <a:schemeClr val="tx1"/>
+          </a:fontRef>
+        </p:style>
+      </p:cxnSp>
+      <p:cxnSp>
+        <p:nvCxnSpPr>
+          <p:cNvPr id="216" name="Connector: Elbow 215">
+            <a:extLst>
+              <a:ext uri="{FF2B5EF4-FFF2-40B4-BE49-F238E27FC236}">
+                <a16:creationId xmlns:a16="http://schemas.microsoft.com/office/drawing/2014/main" id="{F3E6DEDF-917E-273A-9297-70C286B5B74C}"/>
+              </a:ext>
+            </a:extLst>
+          </p:cNvPr>
+          <p:cNvCxnSpPr>
+            <a:cxnSpLocks/>
+          </p:cNvCxnSpPr>
+          <p:nvPr/>
+        </p:nvCxnSpPr>
+        <p:spPr>
+          <a:xfrm rot="10800000" flipV="1">
+            <a:off x="7886174" y="5211453"/>
+            <a:ext cx="325500" cy="233977"/>
+          </a:xfrm>
+          <a:prstGeom prst="bentConnector3">
+            <a:avLst>
+              <a:gd name="adj1" fmla="val -3375"/>
+            </a:avLst>
+          </a:prstGeom>
+          <a:ln>
+            <a:prstDash val="sysDash"/>
+            <a:tailEnd type="triangle"/>
+          </a:ln>
+        </p:spPr>
+        <p:style>
+          <a:lnRef idx="2">
+            <a:schemeClr val="dk1"/>
+          </a:lnRef>
+          <a:fillRef idx="0">
+            <a:schemeClr val="dk1"/>
+          </a:fillRef>
+          <a:effectRef idx="1">
+            <a:schemeClr val="dk1"/>
+          </a:effectRef>
+          <a:fontRef idx="minor">
+            <a:schemeClr val="tx1"/>
+          </a:fontRef>
+        </p:style>
+      </p:cxnSp>
+      <p:cxnSp>
+        <p:nvCxnSpPr>
+          <p:cNvPr id="217" name="Straight Arrow Connector 216">
+            <a:extLst>
+              <a:ext uri="{FF2B5EF4-FFF2-40B4-BE49-F238E27FC236}">
+                <a16:creationId xmlns:a16="http://schemas.microsoft.com/office/drawing/2014/main" id="{22CF50AF-1D0B-D685-2C7C-F408A4C851B9}"/>
+              </a:ext>
+            </a:extLst>
+          </p:cNvPr>
+          <p:cNvCxnSpPr>
+            <a:cxnSpLocks/>
+          </p:cNvCxnSpPr>
+          <p:nvPr/>
+        </p:nvCxnSpPr>
+        <p:spPr>
+          <a:xfrm>
+            <a:off x="3924993" y="2443555"/>
+            <a:ext cx="865036" cy="0"/>
+          </a:xfrm>
+          <a:prstGeom prst="straightConnector1">
+            <a:avLst/>
+          </a:prstGeom>
+          <a:ln>
+            <a:prstDash val="sysDash"/>
+            <a:tailEnd type="triangle"/>
+          </a:ln>
+        </p:spPr>
+        <p:style>
+          <a:lnRef idx="2">
+            <a:schemeClr val="dk1"/>
+          </a:lnRef>
+          <a:fillRef idx="0">
+            <a:schemeClr val="dk1"/>
+          </a:fillRef>
+          <a:effectRef idx="1">
+            <a:schemeClr val="dk1"/>
+          </a:effectRef>
+          <a:fontRef idx="minor">
+            <a:schemeClr val="tx1"/>
+          </a:fontRef>
+        </p:style>
+      </p:cxnSp>
+      <p:cxnSp>
+        <p:nvCxnSpPr>
+          <p:cNvPr id="219" name="Straight Arrow Connector 218">
+            <a:extLst>
+              <a:ext uri="{FF2B5EF4-FFF2-40B4-BE49-F238E27FC236}">
+                <a16:creationId xmlns:a16="http://schemas.microsoft.com/office/drawing/2014/main" id="{ACB49EAC-37F4-3A25-9F5A-C41A403D7CC6}"/>
+              </a:ext>
+            </a:extLst>
+          </p:cNvPr>
+          <p:cNvCxnSpPr>
+            <a:cxnSpLocks/>
+          </p:cNvCxnSpPr>
+          <p:nvPr/>
+        </p:nvCxnSpPr>
+        <p:spPr>
+          <a:xfrm flipH="1">
+            <a:off x="3780622" y="5038530"/>
+            <a:ext cx="949965" cy="0"/>
+          </a:xfrm>
+          <a:prstGeom prst="straightConnector1">
+            <a:avLst/>
+          </a:prstGeom>
+          <a:ln>
+            <a:prstDash val="sysDash"/>
+            <a:tailEnd type="triangle"/>
+          </a:ln>
+        </p:spPr>
+        <p:style>
+          <a:lnRef idx="2">
+            <a:schemeClr val="dk1"/>
+          </a:lnRef>
+          <a:fillRef idx="0">
+            <a:schemeClr val="dk1"/>
+          </a:fillRef>
+          <a:effectRef idx="1">
+            <a:schemeClr val="dk1"/>
+          </a:effectRef>
+          <a:fontRef idx="minor">
+            <a:schemeClr val="tx1"/>
+          </a:fontRef>
+        </p:style>
+      </p:cxnSp>
+      <p:sp>
+        <p:nvSpPr>
+          <p:cNvPr id="83" name="Rectangle 82">
+            <a:extLst>
+              <a:ext uri="{FF2B5EF4-FFF2-40B4-BE49-F238E27FC236}">
+                <a16:creationId xmlns:a16="http://schemas.microsoft.com/office/drawing/2014/main" id="{A2733834-1F35-5EC2-2694-CCCF1592DCF7}"/>
+              </a:ext>
+            </a:extLst>
+          </p:cNvPr>
+          <p:cNvSpPr/>
+          <p:nvPr/>
+        </p:nvSpPr>
+        <p:spPr>
+          <a:xfrm>
+            <a:off x="5219105" y="4918959"/>
+            <a:ext cx="1668721" cy="295727"/>
+          </a:xfrm>
+          <a:prstGeom prst="rect">
+            <a:avLst/>
+          </a:prstGeom>
+          <a:solidFill>
+            <a:schemeClr val="accent6">
+              <a:lumMod val="75000"/>
+            </a:schemeClr>
+          </a:solidFill>
+          <a:ln>
+            <a:solidFill>
+              <a:schemeClr val="tx1"/>
+            </a:solidFill>
+          </a:ln>
+        </p:spPr>
+        <p:style>
+          <a:lnRef idx="2">
+            <a:schemeClr val="accent1">
+              <a:shade val="50000"/>
+            </a:schemeClr>
+          </a:lnRef>
+          <a:fillRef idx="1">
+            <a:schemeClr val="accent1"/>
+          </a:fillRef>
+          <a:effectRef idx="0">
+            <a:schemeClr val="accent1"/>
+          </a:effectRef>
+          <a:fontRef idx="minor">
+            <a:schemeClr val="lt1"/>
+          </a:fontRef>
+        </p:style>
+        <p:txBody>
+          <a:bodyPr rtlCol="0" anchor="ctr"/>
+          <a:lstStyle/>
+          <a:p>
+            <a:pPr algn="ctr"/>
+            <a:r>
+              <a:rPr lang="en-US" sz="1050" b="1" dirty="0"/>
+              <a:t>BAC Analog Objects [W]</a:t>
+            </a:r>
+            <a:endParaRPr lang="en-SG" sz="1050" b="1" dirty="0"/>
+          </a:p>
+        </p:txBody>
+      </p:sp>
+    </p:spTree>
+    <p:extLst>
+      <p:ext uri="{BB962C8B-B14F-4D97-AF65-F5344CB8AC3E}">
+        <p14:creationId xmlns:p14="http://schemas.microsoft.com/office/powerpoint/2010/main" val="1693198638"/>
       </p:ext>
     </p:extLst>
   </p:cSld>

</xml_diff>

<commit_message>
Update the BACnet lib document.
</commit_message>
<xml_diff>
--- a/BACnet_PLC_Simulator/doc/designDoc.pptx
+++ b/BACnet_PLC_Simulator/doc/designDoc.pptx
@@ -5,13 +5,14 @@
     <p:sldMasterId id="2147483648" r:id="rId1"/>
   </p:sldMasterIdLst>
   <p:notesMasterIdLst>
-    <p:notesMasterId r:id="rId6"/>
+    <p:notesMasterId r:id="rId7"/>
   </p:notesMasterIdLst>
   <p:sldIdLst>
     <p:sldId id="256" r:id="rId2"/>
     <p:sldId id="257" r:id="rId3"/>
     <p:sldId id="258" r:id="rId4"/>
     <p:sldId id="259" r:id="rId5"/>
+    <p:sldId id="260" r:id="rId6"/>
   </p:sldIdLst>
   <p:sldSz cx="12192000" cy="6858000"/>
   <p:notesSz cx="6858000" cy="9144000"/>
@@ -200,7 +201,7 @@
           <a:p>
             <a:fld id="{293D8FD3-42E6-4115-9E5E-A8FCCF6B73B5}" type="datetimeFigureOut">
               <a:rPr lang="en-SG" smtClean="0"/>
-              <a:t>15/1/2026</a:t>
+              <a:t>16/1/2026</a:t>
             </a:fld>
             <a:endParaRPr lang="en-SG"/>
           </a:p>
@@ -785,7 +786,7 @@
           <a:p>
             <a:fld id="{FEFAAF38-9343-4D68-A973-A40334CBD430}" type="datetimeFigureOut">
               <a:rPr lang="en-SG" smtClean="0"/>
-              <a:t>15/1/2026</a:t>
+              <a:t>16/1/2026</a:t>
             </a:fld>
             <a:endParaRPr lang="en-SG"/>
           </a:p>
@@ -985,7 +986,7 @@
           <a:p>
             <a:fld id="{FEFAAF38-9343-4D68-A973-A40334CBD430}" type="datetimeFigureOut">
               <a:rPr lang="en-SG" smtClean="0"/>
-              <a:t>15/1/2026</a:t>
+              <a:t>16/1/2026</a:t>
             </a:fld>
             <a:endParaRPr lang="en-SG"/>
           </a:p>
@@ -1195,7 +1196,7 @@
           <a:p>
             <a:fld id="{FEFAAF38-9343-4D68-A973-A40334CBD430}" type="datetimeFigureOut">
               <a:rPr lang="en-SG" smtClean="0"/>
-              <a:t>15/1/2026</a:t>
+              <a:t>16/1/2026</a:t>
             </a:fld>
             <a:endParaRPr lang="en-SG"/>
           </a:p>
@@ -1395,7 +1396,7 @@
           <a:p>
             <a:fld id="{FEFAAF38-9343-4D68-A973-A40334CBD430}" type="datetimeFigureOut">
               <a:rPr lang="en-SG" smtClean="0"/>
-              <a:t>15/1/2026</a:t>
+              <a:t>16/1/2026</a:t>
             </a:fld>
             <a:endParaRPr lang="en-SG"/>
           </a:p>
@@ -1671,7 +1672,7 @@
           <a:p>
             <a:fld id="{FEFAAF38-9343-4D68-A973-A40334CBD430}" type="datetimeFigureOut">
               <a:rPr lang="en-SG" smtClean="0"/>
-              <a:t>15/1/2026</a:t>
+              <a:t>16/1/2026</a:t>
             </a:fld>
             <a:endParaRPr lang="en-SG"/>
           </a:p>
@@ -1939,7 +1940,7 @@
           <a:p>
             <a:fld id="{FEFAAF38-9343-4D68-A973-A40334CBD430}" type="datetimeFigureOut">
               <a:rPr lang="en-SG" smtClean="0"/>
-              <a:t>15/1/2026</a:t>
+              <a:t>16/1/2026</a:t>
             </a:fld>
             <a:endParaRPr lang="en-SG"/>
           </a:p>
@@ -2354,7 +2355,7 @@
           <a:p>
             <a:fld id="{FEFAAF38-9343-4D68-A973-A40334CBD430}" type="datetimeFigureOut">
               <a:rPr lang="en-SG" smtClean="0"/>
-              <a:t>15/1/2026</a:t>
+              <a:t>16/1/2026</a:t>
             </a:fld>
             <a:endParaRPr lang="en-SG"/>
           </a:p>
@@ -2496,7 +2497,7 @@
           <a:p>
             <a:fld id="{FEFAAF38-9343-4D68-A973-A40334CBD430}" type="datetimeFigureOut">
               <a:rPr lang="en-SG" smtClean="0"/>
-              <a:t>15/1/2026</a:t>
+              <a:t>16/1/2026</a:t>
             </a:fld>
             <a:endParaRPr lang="en-SG"/>
           </a:p>
@@ -2609,7 +2610,7 @@
           <a:p>
             <a:fld id="{FEFAAF38-9343-4D68-A973-A40334CBD430}" type="datetimeFigureOut">
               <a:rPr lang="en-SG" smtClean="0"/>
-              <a:t>15/1/2026</a:t>
+              <a:t>16/1/2026</a:t>
             </a:fld>
             <a:endParaRPr lang="en-SG"/>
           </a:p>
@@ -2922,7 +2923,7 @@
           <a:p>
             <a:fld id="{FEFAAF38-9343-4D68-A973-A40334CBD430}" type="datetimeFigureOut">
               <a:rPr lang="en-SG" smtClean="0"/>
-              <a:t>15/1/2026</a:t>
+              <a:t>16/1/2026</a:t>
             </a:fld>
             <a:endParaRPr lang="en-SG"/>
           </a:p>
@@ -3211,7 +3212,7 @@
           <a:p>
             <a:fld id="{FEFAAF38-9343-4D68-A973-A40334CBD430}" type="datetimeFigureOut">
               <a:rPr lang="en-SG" smtClean="0"/>
-              <a:t>15/1/2026</a:t>
+              <a:t>16/1/2026</a:t>
             </a:fld>
             <a:endParaRPr lang="en-SG"/>
           </a:p>
@@ -3454,7 +3455,7 @@
           <a:p>
             <a:fld id="{FEFAAF38-9343-4D68-A973-A40334CBD430}" type="datetimeFigureOut">
               <a:rPr lang="en-SG" smtClean="0"/>
-              <a:t>15/1/2026</a:t>
+              <a:t>16/1/2026</a:t>
             </a:fld>
             <a:endParaRPr lang="en-SG"/>
           </a:p>
@@ -8374,6 +8375,778 @@
     <p:extLst>
       <p:ext uri="{BB962C8B-B14F-4D97-AF65-F5344CB8AC3E}">
         <p14:creationId xmlns:p14="http://schemas.microsoft.com/office/powerpoint/2010/main" val="1693198638"/>
+      </p:ext>
+    </p:extLst>
+  </p:cSld>
+  <p:clrMapOvr>
+    <a:masterClrMapping/>
+  </p:clrMapOvr>
+</p:sld>
+</file>
+
+<file path=ppt/slides/slide5.xml><?xml version="1.0" encoding="utf-8"?>
+<p:sld xmlns:a="http://schemas.openxmlformats.org/drawingml/2006/main" xmlns:r="http://schemas.openxmlformats.org/officeDocument/2006/relationships" xmlns:p="http://schemas.openxmlformats.org/presentationml/2006/main">
+  <p:cSld>
+    <p:spTree>
+      <p:nvGrpSpPr>
+        <p:cNvPr id="1" name=""/>
+        <p:cNvGrpSpPr/>
+        <p:nvPr/>
+      </p:nvGrpSpPr>
+      <p:grpSpPr>
+        <a:xfrm>
+          <a:off x="0" y="0"/>
+          <a:ext cx="0" cy="0"/>
+          <a:chOff x="0" y="0"/>
+          <a:chExt cx="0" cy="0"/>
+        </a:xfrm>
+      </p:grpSpPr>
+      <p:pic>
+        <p:nvPicPr>
+          <p:cNvPr id="5" name="Picture 4">
+            <a:extLst>
+              <a:ext uri="{FF2B5EF4-FFF2-40B4-BE49-F238E27FC236}">
+                <a16:creationId xmlns:a16="http://schemas.microsoft.com/office/drawing/2014/main" id="{CD39AE3F-F849-615D-A741-C3FBF3FE32B6}"/>
+              </a:ext>
+            </a:extLst>
+          </p:cNvPr>
+          <p:cNvPicPr>
+            <a:picLocks noChangeAspect="1"/>
+          </p:cNvPicPr>
+          <p:nvPr/>
+        </p:nvPicPr>
+        <p:blipFill>
+          <a:blip r:embed="rId2">
+            <a:extLst>
+              <a:ext uri="{28A0092B-C50C-407E-A947-70E740481C1C}">
+                <a14:useLocalDpi xmlns:a14="http://schemas.microsoft.com/office/drawing/2010/main" val="0"/>
+              </a:ext>
+            </a:extLst>
+          </a:blip>
+          <a:stretch>
+            <a:fillRect/>
+          </a:stretch>
+        </p:blipFill>
+        <p:spPr>
+          <a:xfrm>
+            <a:off x="3372901" y="1011467"/>
+            <a:ext cx="5580952" cy="4219048"/>
+          </a:xfrm>
+          <a:prstGeom prst="rect">
+            <a:avLst/>
+          </a:prstGeom>
+        </p:spPr>
+      </p:pic>
+      <p:sp>
+        <p:nvSpPr>
+          <p:cNvPr id="10" name="TextBox 9">
+            <a:extLst>
+              <a:ext uri="{FF2B5EF4-FFF2-40B4-BE49-F238E27FC236}">
+                <a16:creationId xmlns:a16="http://schemas.microsoft.com/office/drawing/2014/main" id="{07D8C83A-2CC2-88E4-72EC-5661138773E7}"/>
+              </a:ext>
+            </a:extLst>
+          </p:cNvPr>
+          <p:cNvSpPr txBox="1"/>
+          <p:nvPr/>
+        </p:nvSpPr>
+        <p:spPr>
+          <a:xfrm>
+            <a:off x="694961" y="1288737"/>
+            <a:ext cx="2606505" cy="523220"/>
+          </a:xfrm>
+          <a:prstGeom prst="rect">
+            <a:avLst/>
+          </a:prstGeom>
+          <a:noFill/>
+        </p:spPr>
+        <p:txBody>
+          <a:bodyPr wrap="square" rtlCol="0">
+            <a:spAutoFit/>
+          </a:bodyPr>
+          <a:lstStyle/>
+          <a:p>
+            <a:r>
+              <a:rPr lang="en-US" sz="1400" b="1" dirty="0">
+                <a:solidFill>
+                  <a:srgbClr val="C00000"/>
+                </a:solidFill>
+              </a:rPr>
+              <a:t>Current Air Conditioner State:</a:t>
+            </a:r>
+          </a:p>
+          <a:p>
+            <a:r>
+              <a:rPr lang="en-US" sz="1400" b="1" dirty="0">
+                <a:solidFill>
+                  <a:srgbClr val="C00000"/>
+                </a:solidFill>
+              </a:rPr>
+              <a:t>Cooling/Heating/Power OFF</a:t>
+            </a:r>
+            <a:endParaRPr lang="en-SG" sz="1400" b="1" dirty="0">
+              <a:solidFill>
+                <a:srgbClr val="C00000"/>
+              </a:solidFill>
+            </a:endParaRPr>
+          </a:p>
+        </p:txBody>
+      </p:sp>
+      <p:cxnSp>
+        <p:nvCxnSpPr>
+          <p:cNvPr id="12" name="Connector: Elbow 11">
+            <a:extLst>
+              <a:ext uri="{FF2B5EF4-FFF2-40B4-BE49-F238E27FC236}">
+                <a16:creationId xmlns:a16="http://schemas.microsoft.com/office/drawing/2014/main" id="{E4E12006-C8BE-AC70-9B27-358F07986CE1}"/>
+              </a:ext>
+            </a:extLst>
+          </p:cNvPr>
+          <p:cNvCxnSpPr>
+            <a:stCxn id="10" idx="2"/>
+          </p:cNvCxnSpPr>
+          <p:nvPr/>
+        </p:nvCxnSpPr>
+        <p:spPr>
+          <a:xfrm rot="16200000" flipH="1">
+            <a:off x="2819485" y="990685"/>
+            <a:ext cx="315226" cy="1957769"/>
+          </a:xfrm>
+          <a:prstGeom prst="bentConnector2">
+            <a:avLst/>
+          </a:prstGeom>
+          <a:ln>
+            <a:solidFill>
+              <a:srgbClr val="C00000"/>
+            </a:solidFill>
+            <a:prstDash val="sysDash"/>
+            <a:tailEnd type="triangle"/>
+          </a:ln>
+        </p:spPr>
+        <p:style>
+          <a:lnRef idx="2">
+            <a:schemeClr val="accent1"/>
+          </a:lnRef>
+          <a:fillRef idx="0">
+            <a:schemeClr val="accent1"/>
+          </a:fillRef>
+          <a:effectRef idx="1">
+            <a:schemeClr val="accent1"/>
+          </a:effectRef>
+          <a:fontRef idx="minor">
+            <a:schemeClr val="tx1"/>
+          </a:fontRef>
+        </p:style>
+      </p:cxnSp>
+      <p:sp>
+        <p:nvSpPr>
+          <p:cNvPr id="13" name="TextBox 12">
+            <a:extLst>
+              <a:ext uri="{FF2B5EF4-FFF2-40B4-BE49-F238E27FC236}">
+                <a16:creationId xmlns:a16="http://schemas.microsoft.com/office/drawing/2014/main" id="{C19B8621-9AA9-EB84-F480-9971422E5F40}"/>
+              </a:ext>
+            </a:extLst>
+          </p:cNvPr>
+          <p:cNvSpPr txBox="1"/>
+          <p:nvPr/>
+        </p:nvSpPr>
+        <p:spPr>
+          <a:xfrm>
+            <a:off x="694960" y="2127183"/>
+            <a:ext cx="2606505" cy="523220"/>
+          </a:xfrm>
+          <a:prstGeom prst="rect">
+            <a:avLst/>
+          </a:prstGeom>
+          <a:noFill/>
+        </p:spPr>
+        <p:txBody>
+          <a:bodyPr wrap="square" rtlCol="0">
+            <a:spAutoFit/>
+          </a:bodyPr>
+          <a:lstStyle/>
+          <a:p>
+            <a:r>
+              <a:rPr lang="en-US" sz="1400" b="1" dirty="0">
+                <a:solidFill>
+                  <a:srgbClr val="C00000"/>
+                </a:solidFill>
+              </a:rPr>
+              <a:t>Current Room Temperature Sensor Reading (C)</a:t>
+            </a:r>
+            <a:endParaRPr lang="en-SG" sz="1400" b="1" dirty="0">
+              <a:solidFill>
+                <a:srgbClr val="C00000"/>
+              </a:solidFill>
+            </a:endParaRPr>
+          </a:p>
+        </p:txBody>
+      </p:sp>
+      <p:cxnSp>
+        <p:nvCxnSpPr>
+          <p:cNvPr id="14" name="Connector: Elbow 13">
+            <a:extLst>
+              <a:ext uri="{FF2B5EF4-FFF2-40B4-BE49-F238E27FC236}">
+                <a16:creationId xmlns:a16="http://schemas.microsoft.com/office/drawing/2014/main" id="{C8C880EF-72E5-2B71-D689-386F8FF13BC9}"/>
+              </a:ext>
+            </a:extLst>
+          </p:cNvPr>
+          <p:cNvCxnSpPr>
+            <a:cxnSpLocks/>
+            <a:stCxn id="13" idx="2"/>
+          </p:cNvCxnSpPr>
+          <p:nvPr/>
+        </p:nvCxnSpPr>
+        <p:spPr>
+          <a:xfrm rot="16200000" flipH="1">
+            <a:off x="2987625" y="1660991"/>
+            <a:ext cx="80769" cy="2059592"/>
+          </a:xfrm>
+          <a:prstGeom prst="bentConnector2">
+            <a:avLst/>
+          </a:prstGeom>
+          <a:ln>
+            <a:solidFill>
+              <a:srgbClr val="C00000"/>
+            </a:solidFill>
+            <a:prstDash val="sysDash"/>
+            <a:tailEnd type="triangle"/>
+          </a:ln>
+        </p:spPr>
+        <p:style>
+          <a:lnRef idx="2">
+            <a:schemeClr val="accent1"/>
+          </a:lnRef>
+          <a:fillRef idx="0">
+            <a:schemeClr val="accent1"/>
+          </a:fillRef>
+          <a:effectRef idx="1">
+            <a:schemeClr val="accent1"/>
+          </a:effectRef>
+          <a:fontRef idx="minor">
+            <a:schemeClr val="tx1"/>
+          </a:fontRef>
+        </p:style>
+      </p:cxnSp>
+      <p:sp>
+        <p:nvSpPr>
+          <p:cNvPr id="17" name="TextBox 16">
+            <a:extLst>
+              <a:ext uri="{FF2B5EF4-FFF2-40B4-BE49-F238E27FC236}">
+                <a16:creationId xmlns:a16="http://schemas.microsoft.com/office/drawing/2014/main" id="{3A6D085C-7C2A-6CEB-8D3B-82C1165EB296}"/>
+              </a:ext>
+            </a:extLst>
+          </p:cNvPr>
+          <p:cNvSpPr txBox="1"/>
+          <p:nvPr/>
+        </p:nvSpPr>
+        <p:spPr>
+          <a:xfrm>
+            <a:off x="694959" y="2992781"/>
+            <a:ext cx="2211869" cy="523220"/>
+          </a:xfrm>
+          <a:prstGeom prst="rect">
+            <a:avLst/>
+          </a:prstGeom>
+          <a:noFill/>
+        </p:spPr>
+        <p:txBody>
+          <a:bodyPr wrap="square" rtlCol="0">
+            <a:spAutoFit/>
+          </a:bodyPr>
+          <a:lstStyle/>
+          <a:p>
+            <a:r>
+              <a:rPr lang="en-US" sz="1400" b="1" dirty="0">
+                <a:solidFill>
+                  <a:srgbClr val="C00000"/>
+                </a:solidFill>
+              </a:rPr>
+              <a:t>Current Room Humidity Sensor Reading (%)</a:t>
+            </a:r>
+            <a:endParaRPr lang="en-SG" sz="1400" b="1" dirty="0">
+              <a:solidFill>
+                <a:srgbClr val="C00000"/>
+              </a:solidFill>
+            </a:endParaRPr>
+          </a:p>
+        </p:txBody>
+      </p:sp>
+      <p:cxnSp>
+        <p:nvCxnSpPr>
+          <p:cNvPr id="22" name="Straight Arrow Connector 21">
+            <a:extLst>
+              <a:ext uri="{FF2B5EF4-FFF2-40B4-BE49-F238E27FC236}">
+                <a16:creationId xmlns:a16="http://schemas.microsoft.com/office/drawing/2014/main" id="{935D3BCD-5E0F-4FDC-9855-FE6E9DB3E44C}"/>
+              </a:ext>
+            </a:extLst>
+          </p:cNvPr>
+          <p:cNvCxnSpPr>
+            <a:cxnSpLocks/>
+          </p:cNvCxnSpPr>
+          <p:nvPr/>
+        </p:nvCxnSpPr>
+        <p:spPr>
+          <a:xfrm>
+            <a:off x="2734848" y="3309427"/>
+            <a:ext cx="1276105" cy="0"/>
+          </a:xfrm>
+          <a:prstGeom prst="straightConnector1">
+            <a:avLst/>
+          </a:prstGeom>
+          <a:ln>
+            <a:solidFill>
+              <a:srgbClr val="C00000"/>
+            </a:solidFill>
+            <a:prstDash val="sysDash"/>
+            <a:tailEnd type="triangle"/>
+          </a:ln>
+        </p:spPr>
+        <p:style>
+          <a:lnRef idx="2">
+            <a:schemeClr val="accent1"/>
+          </a:lnRef>
+          <a:fillRef idx="0">
+            <a:schemeClr val="accent1"/>
+          </a:fillRef>
+          <a:effectRef idx="1">
+            <a:schemeClr val="accent1"/>
+          </a:effectRef>
+          <a:fontRef idx="minor">
+            <a:schemeClr val="tx1"/>
+          </a:fontRef>
+        </p:style>
+      </p:cxnSp>
+      <p:sp>
+        <p:nvSpPr>
+          <p:cNvPr id="24" name="TextBox 23">
+            <a:extLst>
+              <a:ext uri="{FF2B5EF4-FFF2-40B4-BE49-F238E27FC236}">
+                <a16:creationId xmlns:a16="http://schemas.microsoft.com/office/drawing/2014/main" id="{00A00CE9-9845-5029-0085-9A12591E0652}"/>
+              </a:ext>
+            </a:extLst>
+          </p:cNvPr>
+          <p:cNvSpPr txBox="1"/>
+          <p:nvPr/>
+        </p:nvSpPr>
+        <p:spPr>
+          <a:xfrm>
+            <a:off x="694959" y="3516863"/>
+            <a:ext cx="2606505" cy="523220"/>
+          </a:xfrm>
+          <a:prstGeom prst="rect">
+            <a:avLst/>
+          </a:prstGeom>
+          <a:noFill/>
+        </p:spPr>
+        <p:txBody>
+          <a:bodyPr wrap="square" rtlCol="0">
+            <a:spAutoFit/>
+          </a:bodyPr>
+          <a:lstStyle/>
+          <a:p>
+            <a:r>
+              <a:rPr lang="en-US" sz="1400" b="1" dirty="0">
+                <a:solidFill>
+                  <a:srgbClr val="C00000"/>
+                </a:solidFill>
+              </a:rPr>
+              <a:t>Current compressor and heater State from OPS sensor </a:t>
+            </a:r>
+            <a:endParaRPr lang="en-SG" sz="1400" b="1" dirty="0">
+              <a:solidFill>
+                <a:srgbClr val="C00000"/>
+              </a:solidFill>
+            </a:endParaRPr>
+          </a:p>
+        </p:txBody>
+      </p:sp>
+      <p:cxnSp>
+        <p:nvCxnSpPr>
+          <p:cNvPr id="25" name="Straight Arrow Connector 24">
+            <a:extLst>
+              <a:ext uri="{FF2B5EF4-FFF2-40B4-BE49-F238E27FC236}">
+                <a16:creationId xmlns:a16="http://schemas.microsoft.com/office/drawing/2014/main" id="{454FF695-4261-F021-A3DB-691A954159DC}"/>
+              </a:ext>
+            </a:extLst>
+          </p:cNvPr>
+          <p:cNvCxnSpPr>
+            <a:cxnSpLocks/>
+          </p:cNvCxnSpPr>
+          <p:nvPr/>
+        </p:nvCxnSpPr>
+        <p:spPr>
+          <a:xfrm>
+            <a:off x="2977098" y="3778473"/>
+            <a:ext cx="622750" cy="0"/>
+          </a:xfrm>
+          <a:prstGeom prst="straightConnector1">
+            <a:avLst/>
+          </a:prstGeom>
+          <a:ln>
+            <a:solidFill>
+              <a:srgbClr val="C00000"/>
+            </a:solidFill>
+            <a:prstDash val="sysDash"/>
+            <a:tailEnd type="triangle"/>
+          </a:ln>
+        </p:spPr>
+        <p:style>
+          <a:lnRef idx="2">
+            <a:schemeClr val="accent1"/>
+          </a:lnRef>
+          <a:fillRef idx="0">
+            <a:schemeClr val="accent1"/>
+          </a:fillRef>
+          <a:effectRef idx="1">
+            <a:schemeClr val="accent1"/>
+          </a:effectRef>
+          <a:fontRef idx="minor">
+            <a:schemeClr val="tx1"/>
+          </a:fontRef>
+        </p:style>
+      </p:cxnSp>
+      <p:sp>
+        <p:nvSpPr>
+          <p:cNvPr id="27" name="TextBox 26">
+            <a:extLst>
+              <a:ext uri="{FF2B5EF4-FFF2-40B4-BE49-F238E27FC236}">
+                <a16:creationId xmlns:a16="http://schemas.microsoft.com/office/drawing/2014/main" id="{C65A3286-1560-6A6F-4EBB-04420C50F73D}"/>
+              </a:ext>
+            </a:extLst>
+          </p:cNvPr>
+          <p:cNvSpPr txBox="1"/>
+          <p:nvPr/>
+        </p:nvSpPr>
+        <p:spPr>
+          <a:xfrm>
+            <a:off x="694959" y="4173605"/>
+            <a:ext cx="2052880" cy="523220"/>
+          </a:xfrm>
+          <a:prstGeom prst="rect">
+            <a:avLst/>
+          </a:prstGeom>
+          <a:noFill/>
+        </p:spPr>
+        <p:txBody>
+          <a:bodyPr wrap="square" rtlCol="0">
+            <a:spAutoFit/>
+          </a:bodyPr>
+          <a:lstStyle/>
+          <a:p>
+            <a:r>
+              <a:rPr lang="en-US" sz="1400" b="1" dirty="0">
+                <a:solidFill>
+                  <a:srgbClr val="C00000"/>
+                </a:solidFill>
+              </a:rPr>
+              <a:t>Current Room Fan Speed Sensor Guage </a:t>
+            </a:r>
+            <a:endParaRPr lang="en-SG" sz="1400" b="1" dirty="0">
+              <a:solidFill>
+                <a:srgbClr val="C00000"/>
+              </a:solidFill>
+            </a:endParaRPr>
+          </a:p>
+        </p:txBody>
+      </p:sp>
+      <p:cxnSp>
+        <p:nvCxnSpPr>
+          <p:cNvPr id="28" name="Straight Arrow Connector 27">
+            <a:extLst>
+              <a:ext uri="{FF2B5EF4-FFF2-40B4-BE49-F238E27FC236}">
+                <a16:creationId xmlns:a16="http://schemas.microsoft.com/office/drawing/2014/main" id="{CE235BBB-F131-2831-03D6-1DF87163DE74}"/>
+              </a:ext>
+            </a:extLst>
+          </p:cNvPr>
+          <p:cNvCxnSpPr>
+            <a:cxnSpLocks/>
+          </p:cNvCxnSpPr>
+          <p:nvPr/>
+        </p:nvCxnSpPr>
+        <p:spPr>
+          <a:xfrm>
+            <a:off x="2535138" y="4458232"/>
+            <a:ext cx="883920" cy="0"/>
+          </a:xfrm>
+          <a:prstGeom prst="straightConnector1">
+            <a:avLst/>
+          </a:prstGeom>
+          <a:ln>
+            <a:solidFill>
+              <a:srgbClr val="C00000"/>
+            </a:solidFill>
+            <a:prstDash val="sysDash"/>
+            <a:tailEnd type="triangle"/>
+          </a:ln>
+        </p:spPr>
+        <p:style>
+          <a:lnRef idx="2">
+            <a:schemeClr val="accent1"/>
+          </a:lnRef>
+          <a:fillRef idx="0">
+            <a:schemeClr val="accent1"/>
+          </a:fillRef>
+          <a:effectRef idx="1">
+            <a:schemeClr val="accent1"/>
+          </a:effectRef>
+          <a:fontRef idx="minor">
+            <a:schemeClr val="tx1"/>
+          </a:fontRef>
+        </p:style>
+      </p:cxnSp>
+      <p:sp>
+        <p:nvSpPr>
+          <p:cNvPr id="30" name="TextBox 29">
+            <a:extLst>
+              <a:ext uri="{FF2B5EF4-FFF2-40B4-BE49-F238E27FC236}">
+                <a16:creationId xmlns:a16="http://schemas.microsoft.com/office/drawing/2014/main" id="{73C6ACBF-2A70-87BD-E05A-1DDD398B8F58}"/>
+              </a:ext>
+            </a:extLst>
+          </p:cNvPr>
+          <p:cNvSpPr txBox="1"/>
+          <p:nvPr/>
+        </p:nvSpPr>
+        <p:spPr>
+          <a:xfrm>
+            <a:off x="9163588" y="1478904"/>
+            <a:ext cx="1825681" cy="523220"/>
+          </a:xfrm>
+          <a:prstGeom prst="rect">
+            <a:avLst/>
+          </a:prstGeom>
+          <a:noFill/>
+        </p:spPr>
+        <p:txBody>
+          <a:bodyPr wrap="square" rtlCol="0">
+            <a:spAutoFit/>
+          </a:bodyPr>
+          <a:lstStyle/>
+          <a:p>
+            <a:r>
+              <a:rPr lang="en-US" sz="1400" b="1" dirty="0">
+                <a:solidFill>
+                  <a:srgbClr val="C00000"/>
+                </a:solidFill>
+              </a:rPr>
+              <a:t>Temperature control rotate knob</a:t>
+            </a:r>
+            <a:endParaRPr lang="en-SG" sz="1400" b="1" dirty="0">
+              <a:solidFill>
+                <a:srgbClr val="C00000"/>
+              </a:solidFill>
+            </a:endParaRPr>
+          </a:p>
+        </p:txBody>
+      </p:sp>
+      <p:cxnSp>
+        <p:nvCxnSpPr>
+          <p:cNvPr id="32" name="Connector: Elbow 31">
+            <a:extLst>
+              <a:ext uri="{FF2B5EF4-FFF2-40B4-BE49-F238E27FC236}">
+                <a16:creationId xmlns:a16="http://schemas.microsoft.com/office/drawing/2014/main" id="{2FE28D0A-EC54-A3A8-299A-2083D99D5796}"/>
+              </a:ext>
+            </a:extLst>
+          </p:cNvPr>
+          <p:cNvCxnSpPr>
+            <a:cxnSpLocks/>
+            <a:stCxn id="30" idx="2"/>
+          </p:cNvCxnSpPr>
+          <p:nvPr/>
+        </p:nvCxnSpPr>
+        <p:spPr>
+          <a:xfrm rot="5400000">
+            <a:off x="8455218" y="688851"/>
+            <a:ext cx="307939" cy="2934484"/>
+          </a:xfrm>
+          <a:prstGeom prst="bentConnector2">
+            <a:avLst/>
+          </a:prstGeom>
+          <a:ln>
+            <a:solidFill>
+              <a:srgbClr val="C00000"/>
+            </a:solidFill>
+            <a:prstDash val="sysDash"/>
+            <a:tailEnd type="triangle"/>
+          </a:ln>
+        </p:spPr>
+        <p:style>
+          <a:lnRef idx="2">
+            <a:schemeClr val="accent1"/>
+          </a:lnRef>
+          <a:fillRef idx="0">
+            <a:schemeClr val="accent1"/>
+          </a:fillRef>
+          <a:effectRef idx="1">
+            <a:schemeClr val="accent1"/>
+          </a:effectRef>
+          <a:fontRef idx="minor">
+            <a:schemeClr val="tx1"/>
+          </a:fontRef>
+        </p:style>
+      </p:cxnSp>
+      <p:sp>
+        <p:nvSpPr>
+          <p:cNvPr id="35" name="TextBox 34">
+            <a:extLst>
+              <a:ext uri="{FF2B5EF4-FFF2-40B4-BE49-F238E27FC236}">
+                <a16:creationId xmlns:a16="http://schemas.microsoft.com/office/drawing/2014/main" id="{75D73370-6777-9F08-CDBC-20D40E485D27}"/>
+              </a:ext>
+            </a:extLst>
+          </p:cNvPr>
+          <p:cNvSpPr txBox="1"/>
+          <p:nvPr/>
+        </p:nvSpPr>
+        <p:spPr>
+          <a:xfrm>
+            <a:off x="9117839" y="2760789"/>
+            <a:ext cx="2149643" cy="1815882"/>
+          </a:xfrm>
+          <a:prstGeom prst="rect">
+            <a:avLst/>
+          </a:prstGeom>
+          <a:noFill/>
+        </p:spPr>
+        <p:txBody>
+          <a:bodyPr wrap="square" rtlCol="0">
+            <a:spAutoFit/>
+          </a:bodyPr>
+          <a:lstStyle/>
+          <a:p>
+            <a:r>
+              <a:rPr lang="en-US" sz="1400" b="1" dirty="0">
+                <a:solidFill>
+                  <a:srgbClr val="C00000"/>
+                </a:solidFill>
+              </a:rPr>
+              <a:t>HVAC Basic Function Control Buttons</a:t>
+            </a:r>
+          </a:p>
+          <a:p>
+            <a:pPr marL="285750" indent="-285750">
+              <a:buFont typeface="Arial" panose="020B0604020202020204" pitchFamily="34" charset="0"/>
+              <a:buChar char="•"/>
+            </a:pPr>
+            <a:r>
+              <a:rPr lang="en-US" sz="1400" b="1" dirty="0">
+                <a:solidFill>
+                  <a:srgbClr val="C00000"/>
+                </a:solidFill>
+              </a:rPr>
+              <a:t>Power On/Off</a:t>
+            </a:r>
+          </a:p>
+          <a:p>
+            <a:pPr marL="285750" indent="-285750">
+              <a:buFont typeface="Arial" panose="020B0604020202020204" pitchFamily="34" charset="0"/>
+              <a:buChar char="•"/>
+            </a:pPr>
+            <a:r>
+              <a:rPr lang="en-US" sz="1400" b="1" dirty="0">
+                <a:solidFill>
+                  <a:srgbClr val="C00000"/>
+                </a:solidFill>
+              </a:rPr>
+              <a:t>Cooling Pump On/Off</a:t>
+            </a:r>
+          </a:p>
+          <a:p>
+            <a:pPr marL="285750" indent="-285750">
+              <a:buFont typeface="Arial" panose="020B0604020202020204" pitchFamily="34" charset="0"/>
+              <a:buChar char="•"/>
+            </a:pPr>
+            <a:r>
+              <a:rPr lang="en-US" sz="1400" b="1" dirty="0">
+                <a:solidFill>
+                  <a:srgbClr val="C00000"/>
+                </a:solidFill>
+              </a:rPr>
+              <a:t>Heater On/Off</a:t>
+            </a:r>
+          </a:p>
+          <a:p>
+            <a:pPr marL="285750" indent="-285750">
+              <a:buFont typeface="Arial" panose="020B0604020202020204" pitchFamily="34" charset="0"/>
+              <a:buChar char="•"/>
+            </a:pPr>
+            <a:r>
+              <a:rPr lang="en-US" sz="1400" b="1" dirty="0">
+                <a:solidFill>
+                  <a:srgbClr val="C00000"/>
+                </a:solidFill>
+              </a:rPr>
+              <a:t>Fan Speed Decrease </a:t>
+            </a:r>
+          </a:p>
+          <a:p>
+            <a:pPr marL="285750" indent="-285750">
+              <a:buFont typeface="Arial" panose="020B0604020202020204" pitchFamily="34" charset="0"/>
+              <a:buChar char="•"/>
+            </a:pPr>
+            <a:r>
+              <a:rPr lang="en-US" sz="1400" b="1" dirty="0">
+                <a:solidFill>
+                  <a:srgbClr val="C00000"/>
+                </a:solidFill>
+              </a:rPr>
+              <a:t>Fan Speed Increase </a:t>
+            </a:r>
+            <a:endParaRPr lang="en-SG" sz="1400" b="1" dirty="0">
+              <a:solidFill>
+                <a:srgbClr val="C00000"/>
+              </a:solidFill>
+            </a:endParaRPr>
+          </a:p>
+        </p:txBody>
+      </p:sp>
+      <p:cxnSp>
+        <p:nvCxnSpPr>
+          <p:cNvPr id="36" name="Connector: Elbow 35">
+            <a:extLst>
+              <a:ext uri="{FF2B5EF4-FFF2-40B4-BE49-F238E27FC236}">
+                <a16:creationId xmlns:a16="http://schemas.microsoft.com/office/drawing/2014/main" id="{6AE9C002-7C1D-F5CC-7DC4-F916643E4973}"/>
+              </a:ext>
+            </a:extLst>
+          </p:cNvPr>
+          <p:cNvCxnSpPr>
+            <a:cxnSpLocks/>
+            <a:stCxn id="35" idx="2"/>
+          </p:cNvCxnSpPr>
+          <p:nvPr/>
+        </p:nvCxnSpPr>
+        <p:spPr>
+          <a:xfrm rot="5400000">
+            <a:off x="9380739" y="4091671"/>
+            <a:ext cx="326923" cy="1296923"/>
+          </a:xfrm>
+          <a:prstGeom prst="bentConnector2">
+            <a:avLst/>
+          </a:prstGeom>
+          <a:ln>
+            <a:solidFill>
+              <a:srgbClr val="C00000"/>
+            </a:solidFill>
+            <a:prstDash val="sysDash"/>
+            <a:tailEnd type="triangle"/>
+          </a:ln>
+        </p:spPr>
+        <p:style>
+          <a:lnRef idx="2">
+            <a:schemeClr val="accent1"/>
+          </a:lnRef>
+          <a:fillRef idx="0">
+            <a:schemeClr val="accent1"/>
+          </a:fillRef>
+          <a:effectRef idx="1">
+            <a:schemeClr val="accent1"/>
+          </a:effectRef>
+          <a:fontRef idx="minor">
+            <a:schemeClr val="tx1"/>
+          </a:fontRef>
+        </p:style>
+      </p:cxnSp>
+    </p:spTree>
+    <p:extLst>
+      <p:ext uri="{BB962C8B-B14F-4D97-AF65-F5344CB8AC3E}">
+        <p14:creationId xmlns:p14="http://schemas.microsoft.com/office/powerpoint/2010/main" val="1365783110"/>
       </p:ext>
     </p:extLst>
   </p:cSld>

</xml_diff>

<commit_message>
update the table of contents.
</commit_message>
<xml_diff>
--- a/BACnet_PLC_Simulator/doc/designDoc.pptx
+++ b/BACnet_PLC_Simulator/doc/designDoc.pptx
@@ -5,7 +5,7 @@
     <p:sldMasterId id="2147483648" r:id="rId1"/>
   </p:sldMasterIdLst>
   <p:notesMasterIdLst>
-    <p:notesMasterId r:id="rId7"/>
+    <p:notesMasterId r:id="rId8"/>
   </p:notesMasterIdLst>
   <p:sldIdLst>
     <p:sldId id="256" r:id="rId2"/>
@@ -13,6 +13,7 @@
     <p:sldId id="258" r:id="rId4"/>
     <p:sldId id="259" r:id="rId5"/>
     <p:sldId id="260" r:id="rId6"/>
+    <p:sldId id="261" r:id="rId7"/>
   </p:sldIdLst>
   <p:sldSz cx="12192000" cy="6858000"/>
   <p:notesSz cx="6858000" cy="9144000"/>
@@ -9147,6 +9148,558 @@
     <p:extLst>
       <p:ext uri="{BB962C8B-B14F-4D97-AF65-F5344CB8AC3E}">
         <p14:creationId xmlns:p14="http://schemas.microsoft.com/office/powerpoint/2010/main" val="1365783110"/>
+      </p:ext>
+    </p:extLst>
+  </p:cSld>
+  <p:clrMapOvr>
+    <a:masterClrMapping/>
+  </p:clrMapOvr>
+</p:sld>
+</file>
+
+<file path=ppt/slides/slide6.xml><?xml version="1.0" encoding="utf-8"?>
+<p:sld xmlns:a="http://schemas.openxmlformats.org/drawingml/2006/main" xmlns:r="http://schemas.openxmlformats.org/officeDocument/2006/relationships" xmlns:p="http://schemas.openxmlformats.org/presentationml/2006/main">
+  <p:cSld>
+    <p:spTree>
+      <p:nvGrpSpPr>
+        <p:cNvPr id="1" name=""/>
+        <p:cNvGrpSpPr/>
+        <p:nvPr/>
+      </p:nvGrpSpPr>
+      <p:grpSpPr>
+        <a:xfrm>
+          <a:off x="0" y="0"/>
+          <a:ext cx="0" cy="0"/>
+          <a:chOff x="0" y="0"/>
+          <a:chExt cx="0" cy="0"/>
+        </a:xfrm>
+      </p:grpSpPr>
+      <p:pic>
+        <p:nvPicPr>
+          <p:cNvPr id="6" name="Picture 5">
+            <a:extLst>
+              <a:ext uri="{FF2B5EF4-FFF2-40B4-BE49-F238E27FC236}">
+                <a16:creationId xmlns:a16="http://schemas.microsoft.com/office/drawing/2014/main" id="{80CE39F6-B203-48BD-4831-5C93DA7711D4}"/>
+              </a:ext>
+            </a:extLst>
+          </p:cNvPr>
+          <p:cNvPicPr>
+            <a:picLocks noChangeAspect="1"/>
+          </p:cNvPicPr>
+          <p:nvPr/>
+        </p:nvPicPr>
+        <p:blipFill>
+          <a:blip r:embed="rId2">
+            <a:extLst>
+              <a:ext uri="{28A0092B-C50C-407E-A947-70E740481C1C}">
+                <a14:useLocalDpi xmlns:a14="http://schemas.microsoft.com/office/drawing/2010/main" val="0"/>
+              </a:ext>
+            </a:extLst>
+          </a:blip>
+          <a:srcRect l="8376" t="8190" r="7294" b="4360"/>
+          <a:stretch>
+            <a:fillRect/>
+          </a:stretch>
+        </p:blipFill>
+        <p:spPr>
+          <a:xfrm>
+            <a:off x="237246" y="1327541"/>
+            <a:ext cx="5593080" cy="3453109"/>
+          </a:xfrm>
+          <a:prstGeom prst="rect">
+            <a:avLst/>
+          </a:prstGeom>
+        </p:spPr>
+      </p:pic>
+      <p:sp>
+        <p:nvSpPr>
+          <p:cNvPr id="4" name="TextBox 3">
+            <a:extLst>
+              <a:ext uri="{FF2B5EF4-FFF2-40B4-BE49-F238E27FC236}">
+                <a16:creationId xmlns:a16="http://schemas.microsoft.com/office/drawing/2014/main" id="{DEFD2352-2245-EE71-5720-790AB6B1764F}"/>
+              </a:ext>
+            </a:extLst>
+          </p:cNvPr>
+          <p:cNvSpPr txBox="1"/>
+          <p:nvPr/>
+        </p:nvSpPr>
+        <p:spPr>
+          <a:xfrm>
+            <a:off x="228102" y="323493"/>
+            <a:ext cx="11649954" cy="830997"/>
+          </a:xfrm>
+          <a:prstGeom prst="rect">
+            <a:avLst/>
+          </a:prstGeom>
+          <a:noFill/>
+          <a:ln w="19050">
+            <a:solidFill>
+              <a:schemeClr val="tx1"/>
+            </a:solidFill>
+            <a:prstDash val="sysDash"/>
+          </a:ln>
+        </p:spPr>
+        <p:txBody>
+          <a:bodyPr wrap="square" rtlCol="0">
+            <a:spAutoFit/>
+          </a:bodyPr>
+          <a:lstStyle/>
+          <a:p>
+            <a:r>
+              <a:rPr lang="en-US" sz="2400" b="1" dirty="0"/>
+              <a:t>Python Visual Building Controller (RTU) with ISO 16484-5 BACnet to Simulate the  Building HVAC System</a:t>
+            </a:r>
+            <a:endParaRPr lang="en-SG" sz="2400" b="1" dirty="0"/>
+          </a:p>
+        </p:txBody>
+      </p:sp>
+      <p:cxnSp>
+        <p:nvCxnSpPr>
+          <p:cNvPr id="10" name="Straight Arrow Connector 9">
+            <a:extLst>
+              <a:ext uri="{FF2B5EF4-FFF2-40B4-BE49-F238E27FC236}">
+                <a16:creationId xmlns:a16="http://schemas.microsoft.com/office/drawing/2014/main" id="{CEF548D5-4DED-2E9A-06B0-1E7F1577E9EA}"/>
+              </a:ext>
+            </a:extLst>
+          </p:cNvPr>
+          <p:cNvCxnSpPr/>
+          <p:nvPr/>
+        </p:nvCxnSpPr>
+        <p:spPr>
+          <a:xfrm>
+            <a:off x="4837176" y="4443984"/>
+            <a:ext cx="978408" cy="0"/>
+          </a:xfrm>
+          <a:prstGeom prst="straightConnector1">
+            <a:avLst/>
+          </a:prstGeom>
+          <a:ln>
+            <a:tailEnd type="triangle"/>
+          </a:ln>
+        </p:spPr>
+        <p:style>
+          <a:lnRef idx="2">
+            <a:schemeClr val="accent1"/>
+          </a:lnRef>
+          <a:fillRef idx="0">
+            <a:schemeClr val="accent1"/>
+          </a:fillRef>
+          <a:effectRef idx="1">
+            <a:schemeClr val="accent1"/>
+          </a:effectRef>
+          <a:fontRef idx="minor">
+            <a:schemeClr val="tx1"/>
+          </a:fontRef>
+        </p:style>
+      </p:cxnSp>
+      <p:sp>
+        <p:nvSpPr>
+          <p:cNvPr id="13" name="Oval 12">
+            <a:extLst>
+              <a:ext uri="{FF2B5EF4-FFF2-40B4-BE49-F238E27FC236}">
+                <a16:creationId xmlns:a16="http://schemas.microsoft.com/office/drawing/2014/main" id="{0F3A4C87-900B-B63E-39B5-E492C3C9EA2B}"/>
+              </a:ext>
+            </a:extLst>
+          </p:cNvPr>
+          <p:cNvSpPr/>
+          <p:nvPr/>
+        </p:nvSpPr>
+        <p:spPr>
+          <a:xfrm rot="1880163">
+            <a:off x="126582" y="2922901"/>
+            <a:ext cx="4275020" cy="1211904"/>
+          </a:xfrm>
+          <a:prstGeom prst="ellipse">
+            <a:avLst/>
+          </a:prstGeom>
+          <a:noFill/>
+          <a:ln>
+            <a:solidFill>
+              <a:srgbClr val="C00000"/>
+            </a:solidFill>
+            <a:prstDash val="sysDash"/>
+          </a:ln>
+        </p:spPr>
+        <p:style>
+          <a:lnRef idx="2">
+            <a:schemeClr val="accent1">
+              <a:shade val="15000"/>
+            </a:schemeClr>
+          </a:lnRef>
+          <a:fillRef idx="1">
+            <a:schemeClr val="accent1"/>
+          </a:fillRef>
+          <a:effectRef idx="0">
+            <a:schemeClr val="accent1"/>
+          </a:effectRef>
+          <a:fontRef idx="minor">
+            <a:schemeClr val="lt1"/>
+          </a:fontRef>
+        </p:style>
+        <p:txBody>
+          <a:bodyPr rtlCol="0" anchor="ctr"/>
+          <a:lstStyle/>
+          <a:p>
+            <a:pPr algn="ctr"/>
+            <a:endParaRPr lang="en-SG" dirty="0"/>
+          </a:p>
+        </p:txBody>
+      </p:sp>
+      <p:pic>
+        <p:nvPicPr>
+          <p:cNvPr id="12" name="Picture 11">
+            <a:extLst>
+              <a:ext uri="{FF2B5EF4-FFF2-40B4-BE49-F238E27FC236}">
+                <a16:creationId xmlns:a16="http://schemas.microsoft.com/office/drawing/2014/main" id="{F368AF78-01BF-C696-44DA-39C726E5DF30}"/>
+              </a:ext>
+            </a:extLst>
+          </p:cNvPr>
+          <p:cNvPicPr>
+            <a:picLocks noChangeAspect="1"/>
+          </p:cNvPicPr>
+          <p:nvPr/>
+        </p:nvPicPr>
+        <p:blipFill>
+          <a:blip r:embed="rId3">
+            <a:extLst>
+              <a:ext uri="{28A0092B-C50C-407E-A947-70E740481C1C}">
+                <a14:useLocalDpi xmlns:a14="http://schemas.microsoft.com/office/drawing/2010/main" val="0"/>
+              </a:ext>
+            </a:extLst>
+          </a:blip>
+          <a:stretch>
+            <a:fillRect/>
+          </a:stretch>
+        </p:blipFill>
+        <p:spPr>
+          <a:xfrm>
+            <a:off x="4559040" y="2702999"/>
+            <a:ext cx="7423095" cy="3911971"/>
+          </a:xfrm>
+          <a:prstGeom prst="rect">
+            <a:avLst/>
+          </a:prstGeom>
+          <a:ln w="19050">
+            <a:solidFill>
+              <a:srgbClr val="C00000"/>
+            </a:solidFill>
+            <a:prstDash val="sysDash"/>
+          </a:ln>
+        </p:spPr>
+      </p:pic>
+      <p:cxnSp>
+        <p:nvCxnSpPr>
+          <p:cNvPr id="15" name="Straight Arrow Connector 14">
+            <a:extLst>
+              <a:ext uri="{FF2B5EF4-FFF2-40B4-BE49-F238E27FC236}">
+                <a16:creationId xmlns:a16="http://schemas.microsoft.com/office/drawing/2014/main" id="{F76F2492-85D3-ADC9-41FD-1C9DA16F5117}"/>
+              </a:ext>
+            </a:extLst>
+          </p:cNvPr>
+          <p:cNvCxnSpPr>
+            <a:cxnSpLocks/>
+          </p:cNvCxnSpPr>
+          <p:nvPr/>
+        </p:nvCxnSpPr>
+        <p:spPr>
+          <a:xfrm>
+            <a:off x="4108564" y="4443984"/>
+            <a:ext cx="432239" cy="0"/>
+          </a:xfrm>
+          <a:prstGeom prst="straightConnector1">
+            <a:avLst/>
+          </a:prstGeom>
+          <a:ln w="19050">
+            <a:solidFill>
+              <a:srgbClr val="C00000"/>
+            </a:solidFill>
+            <a:prstDash val="sysDash"/>
+            <a:tailEnd type="triangle"/>
+          </a:ln>
+        </p:spPr>
+        <p:style>
+          <a:lnRef idx="2">
+            <a:schemeClr val="accent1"/>
+          </a:lnRef>
+          <a:fillRef idx="0">
+            <a:schemeClr val="accent1"/>
+          </a:fillRef>
+          <a:effectRef idx="1">
+            <a:schemeClr val="accent1"/>
+          </a:effectRef>
+          <a:fontRef idx="minor">
+            <a:schemeClr val="tx1"/>
+          </a:fontRef>
+        </p:style>
+      </p:cxnSp>
+      <p:sp>
+        <p:nvSpPr>
+          <p:cNvPr id="18" name="TextBox 17">
+            <a:extLst>
+              <a:ext uri="{FF2B5EF4-FFF2-40B4-BE49-F238E27FC236}">
+                <a16:creationId xmlns:a16="http://schemas.microsoft.com/office/drawing/2014/main" id="{9359B433-6E46-A240-3363-19816E2C596B}"/>
+              </a:ext>
+            </a:extLst>
+          </p:cNvPr>
+          <p:cNvSpPr txBox="1"/>
+          <p:nvPr/>
+        </p:nvSpPr>
+        <p:spPr>
+          <a:xfrm>
+            <a:off x="228102" y="1376443"/>
+            <a:ext cx="1612265" cy="523220"/>
+          </a:xfrm>
+          <a:prstGeom prst="rect">
+            <a:avLst/>
+          </a:prstGeom>
+          <a:noFill/>
+        </p:spPr>
+        <p:txBody>
+          <a:bodyPr wrap="square" rtlCol="0">
+            <a:spAutoFit/>
+          </a:bodyPr>
+          <a:lstStyle/>
+          <a:p>
+            <a:r>
+              <a:rPr lang="en-US" sz="1400" b="1" dirty="0">
+                <a:solidFill>
+                  <a:schemeClr val="accent1"/>
+                </a:solidFill>
+              </a:rPr>
+              <a:t>Building Environment</a:t>
+            </a:r>
+            <a:endParaRPr lang="en-SG" sz="1400" b="1" dirty="0">
+              <a:solidFill>
+                <a:schemeClr val="accent1"/>
+              </a:solidFill>
+            </a:endParaRPr>
+          </a:p>
+        </p:txBody>
+      </p:sp>
+      <p:sp>
+        <p:nvSpPr>
+          <p:cNvPr id="25" name="Oval 24">
+            <a:extLst>
+              <a:ext uri="{FF2B5EF4-FFF2-40B4-BE49-F238E27FC236}">
+                <a16:creationId xmlns:a16="http://schemas.microsoft.com/office/drawing/2014/main" id="{93DE3227-58B8-DF2A-BBA2-41647A71CFA7}"/>
+              </a:ext>
+            </a:extLst>
+          </p:cNvPr>
+          <p:cNvSpPr/>
+          <p:nvPr/>
+        </p:nvSpPr>
+        <p:spPr>
+          <a:xfrm>
+            <a:off x="7461504" y="4202130"/>
+            <a:ext cx="1362456" cy="1211904"/>
+          </a:xfrm>
+          <a:prstGeom prst="ellipse">
+            <a:avLst/>
+          </a:prstGeom>
+          <a:noFill/>
+          <a:ln>
+            <a:solidFill>
+              <a:srgbClr val="C00000"/>
+            </a:solidFill>
+            <a:prstDash val="sysDash"/>
+          </a:ln>
+        </p:spPr>
+        <p:style>
+          <a:lnRef idx="2">
+            <a:schemeClr val="accent1">
+              <a:shade val="15000"/>
+            </a:schemeClr>
+          </a:lnRef>
+          <a:fillRef idx="1">
+            <a:schemeClr val="accent1"/>
+          </a:fillRef>
+          <a:effectRef idx="0">
+            <a:schemeClr val="accent1"/>
+          </a:effectRef>
+          <a:fontRef idx="minor">
+            <a:schemeClr val="lt1"/>
+          </a:fontRef>
+        </p:style>
+        <p:txBody>
+          <a:bodyPr rtlCol="0" anchor="ctr"/>
+          <a:lstStyle/>
+          <a:p>
+            <a:pPr algn="ctr"/>
+            <a:endParaRPr lang="en-SG" dirty="0"/>
+          </a:p>
+        </p:txBody>
+      </p:sp>
+      <p:cxnSp>
+        <p:nvCxnSpPr>
+          <p:cNvPr id="27" name="Connector: Elbow 26">
+            <a:extLst>
+              <a:ext uri="{FF2B5EF4-FFF2-40B4-BE49-F238E27FC236}">
+                <a16:creationId xmlns:a16="http://schemas.microsoft.com/office/drawing/2014/main" id="{720BB6FC-D327-C283-1914-1EAFC391319E}"/>
+              </a:ext>
+            </a:extLst>
+          </p:cNvPr>
+          <p:cNvCxnSpPr>
+            <a:stCxn id="25" idx="4"/>
+          </p:cNvCxnSpPr>
+          <p:nvPr/>
+        </p:nvCxnSpPr>
+        <p:spPr>
+          <a:xfrm rot="5400000">
+            <a:off x="5845695" y="3820299"/>
+            <a:ext cx="703302" cy="3890772"/>
+          </a:xfrm>
+          <a:prstGeom prst="bentConnector2">
+            <a:avLst/>
+          </a:prstGeom>
+          <a:ln>
+            <a:solidFill>
+              <a:srgbClr val="C00000"/>
+            </a:solidFill>
+            <a:prstDash val="sysDash"/>
+            <a:tailEnd type="triangle"/>
+          </a:ln>
+        </p:spPr>
+        <p:style>
+          <a:lnRef idx="2">
+            <a:schemeClr val="accent1"/>
+          </a:lnRef>
+          <a:fillRef idx="0">
+            <a:schemeClr val="accent1"/>
+          </a:fillRef>
+          <a:effectRef idx="1">
+            <a:schemeClr val="accent1"/>
+          </a:effectRef>
+          <a:fontRef idx="minor">
+            <a:schemeClr val="tx1"/>
+          </a:fontRef>
+        </p:style>
+      </p:cxnSp>
+      <p:pic>
+        <p:nvPicPr>
+          <p:cNvPr id="29" name="Picture 28">
+            <a:extLst>
+              <a:ext uri="{FF2B5EF4-FFF2-40B4-BE49-F238E27FC236}">
+                <a16:creationId xmlns:a16="http://schemas.microsoft.com/office/drawing/2014/main" id="{1C01D5D1-CA81-8215-15CF-8615349C0CBA}"/>
+              </a:ext>
+            </a:extLst>
+          </p:cNvPr>
+          <p:cNvPicPr>
+            <a:picLocks noChangeAspect="1"/>
+          </p:cNvPicPr>
+          <p:nvPr/>
+        </p:nvPicPr>
+        <p:blipFill>
+          <a:blip r:embed="rId4">
+            <a:extLst>
+              <a:ext uri="{28A0092B-C50C-407E-A947-70E740481C1C}">
+                <a14:useLocalDpi xmlns:a14="http://schemas.microsoft.com/office/drawing/2010/main" val="0"/>
+              </a:ext>
+            </a:extLst>
+          </a:blip>
+          <a:stretch>
+            <a:fillRect/>
+          </a:stretch>
+        </p:blipFill>
+        <p:spPr>
+          <a:xfrm>
+            <a:off x="5815584" y="901893"/>
+            <a:ext cx="5917063" cy="1572949"/>
+          </a:xfrm>
+          <a:prstGeom prst="rect">
+            <a:avLst/>
+          </a:prstGeom>
+          <a:ln w="9525">
+            <a:solidFill>
+              <a:schemeClr val="tx1"/>
+            </a:solidFill>
+          </a:ln>
+        </p:spPr>
+      </p:pic>
+      <p:cxnSp>
+        <p:nvCxnSpPr>
+          <p:cNvPr id="31" name="Straight Arrow Connector 30">
+            <a:extLst>
+              <a:ext uri="{FF2B5EF4-FFF2-40B4-BE49-F238E27FC236}">
+                <a16:creationId xmlns:a16="http://schemas.microsoft.com/office/drawing/2014/main" id="{4AEEF743-823C-12C7-87B8-D9F366751450}"/>
+              </a:ext>
+            </a:extLst>
+          </p:cNvPr>
+          <p:cNvCxnSpPr>
+            <a:cxnSpLocks/>
+          </p:cNvCxnSpPr>
+          <p:nvPr/>
+        </p:nvCxnSpPr>
+        <p:spPr>
+          <a:xfrm flipV="1">
+            <a:off x="9390748" y="2496312"/>
+            <a:ext cx="0" cy="509663"/>
+          </a:xfrm>
+          <a:prstGeom prst="straightConnector1">
+            <a:avLst/>
+          </a:prstGeom>
+          <a:ln w="19050">
+            <a:solidFill>
+              <a:srgbClr val="C00000"/>
+            </a:solidFill>
+            <a:prstDash val="sysDash"/>
+            <a:tailEnd type="triangle"/>
+          </a:ln>
+        </p:spPr>
+        <p:style>
+          <a:lnRef idx="2">
+            <a:schemeClr val="accent1"/>
+          </a:lnRef>
+          <a:fillRef idx="0">
+            <a:schemeClr val="accent1"/>
+          </a:fillRef>
+          <a:effectRef idx="1">
+            <a:schemeClr val="accent1"/>
+          </a:effectRef>
+          <a:fontRef idx="minor">
+            <a:schemeClr val="tx1"/>
+          </a:fontRef>
+        </p:style>
+      </p:cxnSp>
+      <p:pic>
+        <p:nvPicPr>
+          <p:cNvPr id="22" name="Picture 21">
+            <a:extLst>
+              <a:ext uri="{FF2B5EF4-FFF2-40B4-BE49-F238E27FC236}">
+                <a16:creationId xmlns:a16="http://schemas.microsoft.com/office/drawing/2014/main" id="{CF70AF2D-FCD0-5A35-3145-13658550ADF3}"/>
+              </a:ext>
+            </a:extLst>
+          </p:cNvPr>
+          <p:cNvPicPr>
+            <a:picLocks noChangeAspect="1"/>
+          </p:cNvPicPr>
+          <p:nvPr/>
+        </p:nvPicPr>
+        <p:blipFill>
+          <a:blip r:embed="rId5">
+            <a:extLst>
+              <a:ext uri="{28A0092B-C50C-407E-A947-70E740481C1C}">
+                <a14:useLocalDpi xmlns:a14="http://schemas.microsoft.com/office/drawing/2010/main" val="0"/>
+              </a:ext>
+            </a:extLst>
+          </a:blip>
+          <a:stretch>
+            <a:fillRect/>
+          </a:stretch>
+        </p:blipFill>
+        <p:spPr>
+          <a:xfrm>
+            <a:off x="237246" y="4808082"/>
+            <a:ext cx="4023858" cy="1840282"/>
+          </a:xfrm>
+          <a:prstGeom prst="rect">
+            <a:avLst/>
+          </a:prstGeom>
+        </p:spPr>
+      </p:pic>
+    </p:spTree>
+    <p:extLst>
+      <p:ext uri="{BB962C8B-B14F-4D97-AF65-F5344CB8AC3E}">
+        <p14:creationId xmlns:p14="http://schemas.microsoft.com/office/powerpoint/2010/main" val="338666657"/>
       </p:ext>
     </p:extLst>
   </p:cSld>

</xml_diff>